<commit_message>
fixed some subtitles color added the slides needed with all there information some slides have transitions the rest will be done later
</commit_message>
<xml_diff>
--- a/report presenatation.pptx
+++ b/report presenatation.pptx
@@ -8,9 +8,22 @@
     <p:sldId id="256" r:id="rId2"/>
     <p:sldId id="257" r:id="rId3"/>
     <p:sldId id="258" r:id="rId4"/>
-    <p:sldId id="259" r:id="rId5"/>
-    <p:sldId id="260" r:id="rId6"/>
-    <p:sldId id="261" r:id="rId7"/>
+    <p:sldId id="262" r:id="rId5"/>
+    <p:sldId id="271" r:id="rId6"/>
+    <p:sldId id="268" r:id="rId7"/>
+    <p:sldId id="269" r:id="rId8"/>
+    <p:sldId id="270" r:id="rId9"/>
+    <p:sldId id="265" r:id="rId10"/>
+    <p:sldId id="264" r:id="rId11"/>
+    <p:sldId id="266" r:id="rId12"/>
+    <p:sldId id="263" r:id="rId13"/>
+    <p:sldId id="267" r:id="rId14"/>
+    <p:sldId id="272" r:id="rId15"/>
+    <p:sldId id="273" r:id="rId16"/>
+    <p:sldId id="274" r:id="rId17"/>
+    <p:sldId id="275" r:id="rId18"/>
+    <p:sldId id="276" r:id="rId19"/>
+    <p:sldId id="261" r:id="rId20"/>
   </p:sldIdLst>
   <p:sldSz cx="12192000" cy="6858000"/>
   <p:notesSz cx="6858000" cy="9144000"/>
@@ -109,6 +122,11 @@
       </a:defRPr>
     </a:lvl9pPr>
   </p:defaultTextStyle>
+  <p:extLst>
+    <p:ext uri="{EFAFB233-063F-42B5-8137-9DF3F51BA10A}">
+      <p15:sldGuideLst xmlns:p15="http://schemas.microsoft.com/office/powerpoint/2012/main"/>
+    </p:ext>
+  </p:extLst>
 </p:presentation>
 </file>
 
@@ -3559,7 +3577,10 @@
           <a:lstStyle/>
           <a:p>
             <a:r>
-              <a:rPr lang="en-US" dirty="0"/>
+              <a:rPr lang="en-US" dirty="0">
+                <a:latin typeface="Times New Roman" panose="02020603050405020304" pitchFamily="18" charset="0"/>
+                <a:cs typeface="Times New Roman" panose="02020603050405020304" pitchFamily="18" charset="0"/>
+              </a:rPr>
               <a:t>Icare System </a:t>
             </a:r>
           </a:p>
@@ -4053,13 +4074,13 @@
   <p:clrMapOvr>
     <a:masterClrMapping/>
   </p:clrMapOvr>
-  <mc:AlternateContent xmlns:mc="http://schemas.openxmlformats.org/markup-compatibility/2006">
-    <mc:Choice xmlns:p14="http://schemas.microsoft.com/office/powerpoint/2010/main" Requires="p14">
+  <mc:AlternateContent xmlns:mc="http://schemas.openxmlformats.org/markup-compatibility/2006" xmlns:p14="http://schemas.microsoft.com/office/powerpoint/2010/main">
+    <mc:Choice Requires="p14">
       <p:transition spd="slow" p14:dur="3400">
         <p14:reveal/>
       </p:transition>
     </mc:Choice>
-    <mc:Fallback>
+    <mc:Fallback xmlns="">
       <p:transition spd="slow">
         <p:fade/>
       </p:transition>
@@ -4068,7 +4089,7 @@
 </p:sld>
 </file>
 
-<file path=ppt/slides/slide2.xml><?xml version="1.0" encoding="utf-8"?>
+<file path=ppt/slides/slide10.xml><?xml version="1.0" encoding="utf-8"?>
 <p:sld xmlns:a="http://schemas.openxmlformats.org/drawingml/2006/main" xmlns:r="http://schemas.openxmlformats.org/officeDocument/2006/relationships" xmlns:p="http://schemas.openxmlformats.org/presentationml/2006/main">
   <p:cSld>
     <p:spTree>
@@ -4090,7 +4111,7 @@
           <p:cNvPr id="2" name="Title 1">
             <a:extLst>
               <a:ext uri="{FF2B5EF4-FFF2-40B4-BE49-F238E27FC236}">
-                <a16:creationId xmlns:a16="http://schemas.microsoft.com/office/drawing/2014/main" id="{1A724BDD-C95E-9BD8-A09A-ED9D2543CFB8}"/>
+                <a16:creationId xmlns:a16="http://schemas.microsoft.com/office/drawing/2014/main" id="{D1B61474-3D2F-8E62-9988-D1D5F8497CDF}"/>
               </a:ext>
             </a:extLst>
           </p:cNvPr>
@@ -4108,32 +4129,75 @@
           <a:p>
             <a:r>
               <a:rPr lang="en-US" dirty="0"/>
-              <a:t>Introduction </a:t>
-            </a:r>
-          </a:p>
-        </p:txBody>
-      </p:sp>
-      <p:sp>
-        <p:nvSpPr>
-          <p:cNvPr id="3" name="Content Placeholder 2">
-            <a:extLst>
-              <a:ext uri="{FF2B5EF4-FFF2-40B4-BE49-F238E27FC236}">
-                <a16:creationId xmlns:a16="http://schemas.microsoft.com/office/drawing/2014/main" id="{F08F9300-1FCE-2E32-A075-75A246279FA6}"/>
-              </a:ext>
-            </a:extLst>
-          </p:cNvPr>
-          <p:cNvSpPr>
-            <a:spLocks noGrp="1"/>
-          </p:cNvSpPr>
+              <a:t>Class diagram </a:t>
+            </a:r>
+          </a:p>
+        </p:txBody>
+      </p:sp>
+      <p:pic>
+        <p:nvPicPr>
+          <p:cNvPr id="7" name="Content Placeholder 6" descr="Diagram&#10;&#10;Description automatically generated">
+            <a:extLst>
+              <a:ext uri="{FF2B5EF4-FFF2-40B4-BE49-F238E27FC236}">
+                <a16:creationId xmlns:a16="http://schemas.microsoft.com/office/drawing/2014/main" id="{05E8AAA8-8112-40E5-1CC9-6152A0484959}"/>
+              </a:ext>
+            </a:extLst>
+          </p:cNvPr>
+          <p:cNvPicPr>
+            <a:picLocks noGrp="1" noChangeAspect="1"/>
+          </p:cNvPicPr>
           <p:nvPr>
             <p:ph idx="1"/>
           </p:nvPr>
+        </p:nvPicPr>
+        <p:blipFill>
+          <a:blip r:embed="rId2">
+            <a:extLst>
+              <a:ext uri="{28A0092B-C50C-407E-A947-70E740481C1C}">
+                <a14:useLocalDpi xmlns:a14="http://schemas.microsoft.com/office/drawing/2010/main" val="0"/>
+              </a:ext>
+            </a:extLst>
+          </a:blip>
+          <a:stretch>
+            <a:fillRect/>
+          </a:stretch>
+        </p:blipFill>
+        <p:spPr>
+          <a:xfrm>
+            <a:off x="5010468" y="1193290"/>
+            <a:ext cx="6760350" cy="4973830"/>
+          </a:xfrm>
+        </p:spPr>
+      </p:pic>
+      <p:sp>
+        <p:nvSpPr>
+          <p:cNvPr id="5" name="Text Placeholder 4">
+            <a:extLst>
+              <a:ext uri="{FF2B5EF4-FFF2-40B4-BE49-F238E27FC236}">
+                <a16:creationId xmlns:a16="http://schemas.microsoft.com/office/drawing/2014/main" id="{C4A9253A-097F-CAAC-67BF-5F832599C6B3}"/>
+              </a:ext>
+            </a:extLst>
+          </p:cNvPr>
+          <p:cNvSpPr>
+            <a:spLocks noGrp="1"/>
+          </p:cNvSpPr>
+          <p:nvPr>
+            <p:ph type="body" sz="half" idx="2"/>
+          </p:nvPr>
         </p:nvSpPr>
         <p:spPr/>
         <p:txBody>
           <a:bodyPr/>
           <a:lstStyle/>
           <a:p>
+            <a:r>
+              <a:rPr lang="en-US" sz="1800" dirty="0">
+                <a:effectLst/>
+                <a:latin typeface="Times New Roman" panose="02020603050405020304" pitchFamily="18" charset="0"/>
+                <a:ea typeface="Calibri" panose="020F0502020204030204" pitchFamily="34" charset="0"/>
+              </a:rPr>
+              <a:t>A class diagram is a type of diagram and part of a unified modeling language (UML) that defines and provides the overview and structure of a system in terms of classes, attributes and methods, and the relationships between different classes.</a:t>
+            </a:r>
             <a:endParaRPr lang="en-US" dirty="0"/>
           </a:p>
         </p:txBody>
@@ -4141,7 +4205,7 @@
     </p:spTree>
     <p:extLst>
       <p:ext uri="{BB962C8B-B14F-4D97-AF65-F5344CB8AC3E}">
-        <p14:creationId xmlns:p14="http://schemas.microsoft.com/office/powerpoint/2010/main" val="39134136"/>
+        <p14:creationId xmlns:p14="http://schemas.microsoft.com/office/powerpoint/2010/main" val="3249128194"/>
       </p:ext>
     </p:extLst>
   </p:cSld>
@@ -4151,7 +4215,7 @@
 </p:sld>
 </file>
 
-<file path=ppt/slides/slide3.xml><?xml version="1.0" encoding="utf-8"?>
+<file path=ppt/slides/slide11.xml><?xml version="1.0" encoding="utf-8"?>
 <p:sld xmlns:a="http://schemas.openxmlformats.org/drawingml/2006/main" xmlns:r="http://schemas.openxmlformats.org/officeDocument/2006/relationships" xmlns:p="http://schemas.openxmlformats.org/presentationml/2006/main">
   <p:cSld>
     <p:spTree>
@@ -4173,7 +4237,7 @@
           <p:cNvPr id="2" name="Title 1">
             <a:extLst>
               <a:ext uri="{FF2B5EF4-FFF2-40B4-BE49-F238E27FC236}">
-                <a16:creationId xmlns:a16="http://schemas.microsoft.com/office/drawing/2014/main" id="{DA5965EC-96D0-1BCE-0FDD-5BCEFBE88F6A}"/>
+                <a16:creationId xmlns:a16="http://schemas.microsoft.com/office/drawing/2014/main" id="{135A3CB7-FA8D-1006-952D-86B9FDC519AA}"/>
               </a:ext>
             </a:extLst>
           </p:cNvPr>
@@ -4186,45 +4250,100 @@
         </p:nvSpPr>
         <p:spPr/>
         <p:txBody>
+          <a:bodyPr>
+            <a:normAutofit fontScale="90000"/>
+          </a:bodyPr>
+          <a:lstStyle/>
+          <a:p>
+            <a:br>
+              <a:rPr lang="en-US"/>
+            </a:br>
+            <a:r>
+              <a:rPr lang="en-US"/>
+              <a:t> Software Architecture Diagram </a:t>
+            </a:r>
+            <a:endParaRPr lang="en-US" dirty="0"/>
+          </a:p>
+        </p:txBody>
+      </p:sp>
+      <p:pic>
+        <p:nvPicPr>
+          <p:cNvPr id="5" name="Content Placeholder 4">
+            <a:extLst>
+              <a:ext uri="{FF2B5EF4-FFF2-40B4-BE49-F238E27FC236}">
+                <a16:creationId xmlns:a16="http://schemas.microsoft.com/office/drawing/2014/main" id="{3327F6F8-3A54-C72D-FE6D-88F72FB13E55}"/>
+              </a:ext>
+            </a:extLst>
+          </p:cNvPr>
+          <p:cNvPicPr>
+            <a:picLocks noGrp="1" noChangeAspect="1"/>
+          </p:cNvPicPr>
+          <p:nvPr>
+            <p:ph idx="1"/>
+          </p:nvPr>
+        </p:nvPicPr>
+        <p:blipFill>
+          <a:blip r:embed="rId2"/>
+          <a:stretch>
+            <a:fillRect/>
+          </a:stretch>
+        </p:blipFill>
+        <p:spPr>
+          <a:xfrm>
+            <a:off x="4583748" y="1561026"/>
+            <a:ext cx="7608252" cy="3735947"/>
+          </a:xfrm>
+          <a:prstGeom prst="rect">
+            <a:avLst/>
+          </a:prstGeom>
+        </p:spPr>
+      </p:pic>
+      <p:sp>
+        <p:nvSpPr>
+          <p:cNvPr id="4" name="Text Placeholder 3">
+            <a:extLst>
+              <a:ext uri="{FF2B5EF4-FFF2-40B4-BE49-F238E27FC236}">
+                <a16:creationId xmlns:a16="http://schemas.microsoft.com/office/drawing/2014/main" id="{A1A9FCB4-C8A1-E8BF-3E44-8D5EDEF42DD4}"/>
+              </a:ext>
+            </a:extLst>
+          </p:cNvPr>
+          <p:cNvSpPr>
+            <a:spLocks noGrp="1"/>
+          </p:cNvSpPr>
+          <p:nvPr>
+            <p:ph type="body" sz="half" idx="2"/>
+          </p:nvPr>
+        </p:nvSpPr>
+        <p:spPr/>
+        <p:txBody>
           <a:bodyPr/>
           <a:lstStyle/>
           <a:p>
             <a:r>
-              <a:rPr lang="en-US" dirty="0"/>
-              <a:t>System analysis</a:t>
-            </a:r>
-          </a:p>
-        </p:txBody>
-      </p:sp>
-      <p:sp>
-        <p:nvSpPr>
-          <p:cNvPr id="3" name="Content Placeholder 2">
-            <a:extLst>
-              <a:ext uri="{FF2B5EF4-FFF2-40B4-BE49-F238E27FC236}">
-                <a16:creationId xmlns:a16="http://schemas.microsoft.com/office/drawing/2014/main" id="{32079805-3161-6089-BDAB-44A175EFF185}"/>
-              </a:ext>
-            </a:extLst>
-          </p:cNvPr>
-          <p:cNvSpPr>
-            <a:spLocks noGrp="1"/>
-          </p:cNvSpPr>
-          <p:nvPr>
-            <p:ph idx="1"/>
-          </p:nvPr>
-        </p:nvSpPr>
-        <p:spPr/>
-        <p:txBody>
-          <a:bodyPr/>
-          <a:lstStyle/>
-          <a:p>
-            <a:endParaRPr lang="en-US"/>
+              <a:rPr lang="en-US" sz="1800">
+                <a:effectLst/>
+                <a:latin typeface="Times New Roman" panose="02020603050405020304" pitchFamily="18" charset="0"/>
+                <a:ea typeface="Calibri" panose="020F0502020204030204" pitchFamily="34" charset="0"/>
+                <a:cs typeface="Arial" panose="020B0604020202020204" pitchFamily="34" charset="0"/>
+              </a:rPr>
+              <a:t>Software architecture is the defining and structuring of a solution that meets technical and operational requirements. Software architecture optimizes attributes involving a series of decisions, such as security, performance, and manageability. These decisions ultimately impact application quality, maintenance, performance, and overall success.</a:t>
+            </a:r>
+            <a:endParaRPr lang="en-US" sz="1800">
+              <a:effectLst/>
+              <a:latin typeface="Calibri" panose="020F0502020204030204" pitchFamily="34" charset="0"/>
+              <a:ea typeface="Calibri" panose="020F0502020204030204" pitchFamily="34" charset="0"/>
+              <a:cs typeface="Arial" panose="020B0604020202020204" pitchFamily="34" charset="0"/>
+            </a:endParaRPr>
+          </a:p>
+          <a:p>
+            <a:endParaRPr lang="en-US" dirty="0"/>
           </a:p>
         </p:txBody>
       </p:sp>
     </p:spTree>
     <p:extLst>
       <p:ext uri="{BB962C8B-B14F-4D97-AF65-F5344CB8AC3E}">
-        <p14:creationId xmlns:p14="http://schemas.microsoft.com/office/powerpoint/2010/main" val="302333784"/>
+        <p14:creationId xmlns:p14="http://schemas.microsoft.com/office/powerpoint/2010/main" val="2231670881"/>
       </p:ext>
     </p:extLst>
   </p:cSld>
@@ -4234,7 +4353,7 @@
 </p:sld>
 </file>
 
-<file path=ppt/slides/slide4.xml><?xml version="1.0" encoding="utf-8"?>
+<file path=ppt/slides/slide12.xml><?xml version="1.0" encoding="utf-8"?>
 <p:sld xmlns:a="http://schemas.openxmlformats.org/drawingml/2006/main" xmlns:r="http://schemas.openxmlformats.org/officeDocument/2006/relationships" xmlns:p="http://schemas.openxmlformats.org/presentationml/2006/main">
   <p:cSld>
     <p:spTree>
@@ -4256,7 +4375,7 @@
           <p:cNvPr id="2" name="Title 1">
             <a:extLst>
               <a:ext uri="{FF2B5EF4-FFF2-40B4-BE49-F238E27FC236}">
-                <a16:creationId xmlns:a16="http://schemas.microsoft.com/office/drawing/2014/main" id="{7FE8F918-59D7-41AE-A73E-6299021362A0}"/>
+                <a16:creationId xmlns:a16="http://schemas.microsoft.com/office/drawing/2014/main" id="{27DE5754-8DD7-7FAE-D22B-4D8CA2F9D9CA}"/>
               </a:ext>
             </a:extLst>
           </p:cNvPr>
@@ -4269,41 +4388,87 @@
         </p:nvSpPr>
         <p:spPr/>
         <p:txBody>
+          <a:bodyPr>
+            <a:normAutofit fontScale="90000"/>
+          </a:bodyPr>
+          <a:lstStyle/>
+          <a:p>
+            <a:r>
+              <a:rPr lang="en-US" dirty="0"/>
+              <a:t> Layered Architecture Diagram </a:t>
+            </a:r>
+          </a:p>
+        </p:txBody>
+      </p:sp>
+      <p:pic>
+        <p:nvPicPr>
+          <p:cNvPr id="6" name="Content Placeholder 5">
+            <a:extLst>
+              <a:ext uri="{FF2B5EF4-FFF2-40B4-BE49-F238E27FC236}">
+                <a16:creationId xmlns:a16="http://schemas.microsoft.com/office/drawing/2014/main" id="{135B199F-4FE3-2585-5057-615ABA6094D4}"/>
+              </a:ext>
+            </a:extLst>
+          </p:cNvPr>
+          <p:cNvPicPr>
+            <a:picLocks noGrp="1" noChangeAspect="1"/>
+          </p:cNvPicPr>
+          <p:nvPr>
+            <p:ph idx="1"/>
+          </p:nvPr>
+        </p:nvPicPr>
+        <p:blipFill>
+          <a:blip r:embed="rId2"/>
+          <a:stretch>
+            <a:fillRect/>
+          </a:stretch>
+        </p:blipFill>
+        <p:spPr>
+          <a:xfrm>
+            <a:off x="5183188" y="2087704"/>
+            <a:ext cx="6830195" cy="3124376"/>
+          </a:xfrm>
+          <a:prstGeom prst="rect">
+            <a:avLst/>
+          </a:prstGeom>
+        </p:spPr>
+      </p:pic>
+      <p:sp>
+        <p:nvSpPr>
+          <p:cNvPr id="5" name="Text Placeholder 4">
+            <a:extLst>
+              <a:ext uri="{FF2B5EF4-FFF2-40B4-BE49-F238E27FC236}">
+                <a16:creationId xmlns:a16="http://schemas.microsoft.com/office/drawing/2014/main" id="{4DB6EC30-5D0A-E627-ECA9-D71BAF50A3D2}"/>
+              </a:ext>
+            </a:extLst>
+          </p:cNvPr>
+          <p:cNvSpPr>
+            <a:spLocks noGrp="1"/>
+          </p:cNvSpPr>
+          <p:nvPr>
+            <p:ph type="body" sz="half" idx="2"/>
+          </p:nvPr>
+        </p:nvSpPr>
+        <p:spPr/>
+        <p:txBody>
           <a:bodyPr/>
           <a:lstStyle/>
           <a:p>
             <a:r>
-              <a:rPr lang="en-US" dirty="0"/>
-              <a:t>Design </a:t>
-            </a:r>
-            <a:r>
-              <a:rPr lang="en-US" dirty="0" err="1"/>
-              <a:t>considirations</a:t>
-            </a:r>
-            <a:endParaRPr lang="en-US" dirty="0"/>
-          </a:p>
-        </p:txBody>
-      </p:sp>
-      <p:sp>
-        <p:nvSpPr>
-          <p:cNvPr id="3" name="Content Placeholder 2">
-            <a:extLst>
-              <a:ext uri="{FF2B5EF4-FFF2-40B4-BE49-F238E27FC236}">
-                <a16:creationId xmlns:a16="http://schemas.microsoft.com/office/drawing/2014/main" id="{AB4F6BF2-D555-9C41-9DBE-458ABBCB9F36}"/>
-              </a:ext>
-            </a:extLst>
-          </p:cNvPr>
-          <p:cNvSpPr>
-            <a:spLocks noGrp="1"/>
-          </p:cNvSpPr>
-          <p:nvPr>
-            <p:ph idx="1"/>
-          </p:nvPr>
-        </p:nvSpPr>
-        <p:spPr/>
-        <p:txBody>
-          <a:bodyPr/>
-          <a:lstStyle/>
+              <a:rPr lang="en-US" sz="1800" dirty="0">
+                <a:effectLst/>
+                <a:latin typeface="Times New Roman" panose="02020603050405020304" pitchFamily="18" charset="0"/>
+                <a:ea typeface="Calibri" panose="020F0502020204030204" pitchFamily="34" charset="0"/>
+                <a:cs typeface="Arial" panose="020B0604020202020204" pitchFamily="34" charset="0"/>
+              </a:rPr>
+              <a:t>Layered architectures are said to be the most common and widely used architectural framework in software development. It is also known as an n-tier architecture and describes an architectural pattern composed of several separate horizontal layers that function together as a single unit of software.</a:t>
+            </a:r>
+            <a:endParaRPr lang="en-US" sz="1800" dirty="0">
+              <a:effectLst/>
+              <a:latin typeface="Calibri" panose="020F0502020204030204" pitchFamily="34" charset="0"/>
+              <a:ea typeface="Calibri" panose="020F0502020204030204" pitchFamily="34" charset="0"/>
+              <a:cs typeface="Arial" panose="020B0604020202020204" pitchFamily="34" charset="0"/>
+            </a:endParaRPr>
+          </a:p>
           <a:p>
             <a:endParaRPr lang="en-US" dirty="0"/>
           </a:p>
@@ -4312,7 +4477,7 @@
     </p:spTree>
     <p:extLst>
       <p:ext uri="{BB962C8B-B14F-4D97-AF65-F5344CB8AC3E}">
-        <p14:creationId xmlns:p14="http://schemas.microsoft.com/office/powerpoint/2010/main" val="2943115563"/>
+        <p14:creationId xmlns:p14="http://schemas.microsoft.com/office/powerpoint/2010/main" val="1552527050"/>
       </p:ext>
     </p:extLst>
   </p:cSld>
@@ -4322,7 +4487,7 @@
 </p:sld>
 </file>
 
-<file path=ppt/slides/slide5.xml><?xml version="1.0" encoding="utf-8"?>
+<file path=ppt/slides/slide13.xml><?xml version="1.0" encoding="utf-8"?>
 <p:sld xmlns:a="http://schemas.openxmlformats.org/drawingml/2006/main" xmlns:r="http://schemas.openxmlformats.org/officeDocument/2006/relationships" xmlns:p="http://schemas.openxmlformats.org/presentationml/2006/main">
   <p:cSld>
     <p:spTree>
@@ -4344,7 +4509,7 @@
           <p:cNvPr id="2" name="Title 1">
             <a:extLst>
               <a:ext uri="{FF2B5EF4-FFF2-40B4-BE49-F238E27FC236}">
-                <a16:creationId xmlns:a16="http://schemas.microsoft.com/office/drawing/2014/main" id="{B6E9ED8D-ABB8-99CA-7935-A3F39D5CE4BA}"/>
+                <a16:creationId xmlns:a16="http://schemas.microsoft.com/office/drawing/2014/main" id="{0D3676BF-152B-943C-62DA-B03F1B332920}"/>
               </a:ext>
             </a:extLst>
           </p:cNvPr>
@@ -4362,40 +4527,80 @@
           <a:p>
             <a:r>
               <a:rPr lang="en-US" dirty="0"/>
-              <a:t>Testing </a:t>
-            </a:r>
-          </a:p>
-        </p:txBody>
-      </p:sp>
-      <p:sp>
-        <p:nvSpPr>
-          <p:cNvPr id="3" name="Content Placeholder 2">
-            <a:extLst>
-              <a:ext uri="{FF2B5EF4-FFF2-40B4-BE49-F238E27FC236}">
-                <a16:creationId xmlns:a16="http://schemas.microsoft.com/office/drawing/2014/main" id="{987F0DDC-8B02-7AF6-614C-DE1DFCA3B07E}"/>
-              </a:ext>
-            </a:extLst>
-          </p:cNvPr>
-          <p:cNvSpPr>
-            <a:spLocks noGrp="1"/>
-          </p:cNvSpPr>
+              <a:t>The Component and Link Diagram</a:t>
+            </a:r>
+          </a:p>
+        </p:txBody>
+      </p:sp>
+      <p:pic>
+        <p:nvPicPr>
+          <p:cNvPr id="7" name="Content Placeholder 6">
+            <a:extLst>
+              <a:ext uri="{FF2B5EF4-FFF2-40B4-BE49-F238E27FC236}">
+                <a16:creationId xmlns:a16="http://schemas.microsoft.com/office/drawing/2014/main" id="{28405D70-08DA-58B5-4B2D-F74D381F5071}"/>
+              </a:ext>
+            </a:extLst>
+          </p:cNvPr>
+          <p:cNvPicPr>
+            <a:picLocks noGrp="1" noChangeAspect="1"/>
+          </p:cNvPicPr>
           <p:nvPr>
             <p:ph idx="1"/>
           </p:nvPr>
+        </p:nvPicPr>
+        <p:blipFill>
+          <a:blip r:embed="rId2"/>
+          <a:stretch>
+            <a:fillRect/>
+          </a:stretch>
+        </p:blipFill>
+        <p:spPr>
+          <a:xfrm>
+            <a:off x="4772025" y="1442564"/>
+            <a:ext cx="7062192" cy="3708556"/>
+          </a:xfrm>
+          <a:prstGeom prst="rect">
+            <a:avLst/>
+          </a:prstGeom>
+        </p:spPr>
+      </p:pic>
+      <p:sp>
+        <p:nvSpPr>
+          <p:cNvPr id="4" name="Text Placeholder 3">
+            <a:extLst>
+              <a:ext uri="{FF2B5EF4-FFF2-40B4-BE49-F238E27FC236}">
+                <a16:creationId xmlns:a16="http://schemas.microsoft.com/office/drawing/2014/main" id="{EF3C0983-6152-BE67-74D2-76E6A1F91FC8}"/>
+              </a:ext>
+            </a:extLst>
+          </p:cNvPr>
+          <p:cNvSpPr>
+            <a:spLocks noGrp="1"/>
+          </p:cNvSpPr>
+          <p:nvPr>
+            <p:ph type="body" sz="half" idx="2"/>
+          </p:nvPr>
         </p:nvSpPr>
         <p:spPr/>
         <p:txBody>
           <a:bodyPr/>
           <a:lstStyle/>
           <a:p>
-            <a:endParaRPr lang="en-US"/>
+            <a:r>
+              <a:rPr lang="en-US" sz="1800" dirty="0">
+                <a:effectLst/>
+                <a:latin typeface="Times New Roman" panose="02020603050405020304" pitchFamily="18" charset="0"/>
+                <a:ea typeface="Calibri" panose="020F0502020204030204" pitchFamily="34" charset="0"/>
+              </a:rPr>
+              <a:t>A link component is a reusable link definition that can be used to describe how various values returned by one operation can be used as input for other operations. In this way, links provide a known relationship and traversal mechanism between the operations. </a:t>
+            </a:r>
+            <a:endParaRPr lang="en-US" dirty="0"/>
           </a:p>
         </p:txBody>
       </p:sp>
     </p:spTree>
     <p:extLst>
       <p:ext uri="{BB962C8B-B14F-4D97-AF65-F5344CB8AC3E}">
-        <p14:creationId xmlns:p14="http://schemas.microsoft.com/office/powerpoint/2010/main" val="2872346394"/>
+        <p14:creationId xmlns:p14="http://schemas.microsoft.com/office/powerpoint/2010/main" val="2220142010"/>
       </p:ext>
     </p:extLst>
   </p:cSld>
@@ -4405,7 +4610,666 @@
 </p:sld>
 </file>
 
-<file path=ppt/slides/slide6.xml><?xml version="1.0" encoding="utf-8"?>
+<file path=ppt/slides/slide14.xml><?xml version="1.0" encoding="utf-8"?>
+<p:sld xmlns:a="http://schemas.openxmlformats.org/drawingml/2006/main" xmlns:r="http://schemas.openxmlformats.org/officeDocument/2006/relationships" xmlns:p="http://schemas.openxmlformats.org/presentationml/2006/main">
+  <p:cSld>
+    <p:spTree>
+      <p:nvGrpSpPr>
+        <p:cNvPr id="1" name=""/>
+        <p:cNvGrpSpPr/>
+        <p:nvPr/>
+      </p:nvGrpSpPr>
+      <p:grpSpPr>
+        <a:xfrm>
+          <a:off x="0" y="0"/>
+          <a:ext cx="0" cy="0"/>
+          <a:chOff x="0" y="0"/>
+          <a:chExt cx="0" cy="0"/>
+        </a:xfrm>
+      </p:grpSpPr>
+      <p:sp>
+        <p:nvSpPr>
+          <p:cNvPr id="5" name="Title 4">
+            <a:extLst>
+              <a:ext uri="{FF2B5EF4-FFF2-40B4-BE49-F238E27FC236}">
+                <a16:creationId xmlns:a16="http://schemas.microsoft.com/office/drawing/2014/main" id="{306DED71-D71D-A485-572C-56B74FBC864A}"/>
+              </a:ext>
+            </a:extLst>
+          </p:cNvPr>
+          <p:cNvSpPr>
+            <a:spLocks noGrp="1"/>
+          </p:cNvSpPr>
+          <p:nvPr>
+            <p:ph type="title"/>
+          </p:nvPr>
+        </p:nvSpPr>
+        <p:spPr/>
+        <p:txBody>
+          <a:bodyPr/>
+          <a:lstStyle/>
+          <a:p>
+            <a:r>
+              <a:rPr lang="en-US" dirty="0"/>
+              <a:t>Implementation </a:t>
+            </a:r>
+          </a:p>
+        </p:txBody>
+      </p:sp>
+      <p:sp>
+        <p:nvSpPr>
+          <p:cNvPr id="6" name="Content Placeholder 5">
+            <a:extLst>
+              <a:ext uri="{FF2B5EF4-FFF2-40B4-BE49-F238E27FC236}">
+                <a16:creationId xmlns:a16="http://schemas.microsoft.com/office/drawing/2014/main" id="{9F5D0FDB-9AB9-0AE5-2139-7C012A18D286}"/>
+              </a:ext>
+            </a:extLst>
+          </p:cNvPr>
+          <p:cNvSpPr>
+            <a:spLocks noGrp="1"/>
+          </p:cNvSpPr>
+          <p:nvPr>
+            <p:ph idx="1"/>
+          </p:nvPr>
+        </p:nvSpPr>
+        <p:spPr/>
+        <p:txBody>
+          <a:bodyPr/>
+          <a:lstStyle/>
+          <a:p>
+            <a:r>
+              <a:rPr lang="en-US" dirty="0">
+                <a:latin typeface="Times New Roman" panose="02020603050405020304" pitchFamily="18" charset="0"/>
+                <a:ea typeface="Calibri" panose="020F0502020204030204" pitchFamily="34" charset="0"/>
+                <a:cs typeface="Arial" panose="020B0604020202020204" pitchFamily="34" charset="0"/>
+              </a:rPr>
+              <a:t>In the next slides we will show how we implemented the application </a:t>
+            </a:r>
+            <a:r>
+              <a:rPr lang="en-US" sz="1800" dirty="0">
+                <a:effectLst/>
+                <a:latin typeface="Times New Roman" panose="02020603050405020304" pitchFamily="18" charset="0"/>
+                <a:ea typeface="Calibri" panose="020F0502020204030204" pitchFamily="34" charset="0"/>
+                <a:cs typeface="Arial" panose="020B0604020202020204" pitchFamily="34" charset="0"/>
+              </a:rPr>
+              <a:t> from the start up to how we coded some of the main functionality like logging and singing in for the different users.</a:t>
+            </a:r>
+            <a:endParaRPr lang="en-US" sz="1800" dirty="0">
+              <a:effectLst/>
+              <a:latin typeface="Calibri" panose="020F0502020204030204" pitchFamily="34" charset="0"/>
+              <a:ea typeface="Calibri" panose="020F0502020204030204" pitchFamily="34" charset="0"/>
+              <a:cs typeface="Arial" panose="020B0604020202020204" pitchFamily="34" charset="0"/>
+            </a:endParaRPr>
+          </a:p>
+          <a:p>
+            <a:endParaRPr lang="en-US" dirty="0"/>
+          </a:p>
+        </p:txBody>
+      </p:sp>
+    </p:spTree>
+    <p:extLst>
+      <p:ext uri="{BB962C8B-B14F-4D97-AF65-F5344CB8AC3E}">
+        <p14:creationId xmlns:p14="http://schemas.microsoft.com/office/powerpoint/2010/main" val="1818136937"/>
+      </p:ext>
+    </p:extLst>
+  </p:cSld>
+  <p:clrMapOvr>
+    <a:masterClrMapping/>
+  </p:clrMapOvr>
+</p:sld>
+</file>
+
+<file path=ppt/slides/slide15.xml><?xml version="1.0" encoding="utf-8"?>
+<p:sld xmlns:a="http://schemas.openxmlformats.org/drawingml/2006/main" xmlns:r="http://schemas.openxmlformats.org/officeDocument/2006/relationships" xmlns:p="http://schemas.openxmlformats.org/presentationml/2006/main">
+  <p:cSld>
+    <p:spTree>
+      <p:nvGrpSpPr>
+        <p:cNvPr id="1" name=""/>
+        <p:cNvGrpSpPr/>
+        <p:nvPr/>
+      </p:nvGrpSpPr>
+      <p:grpSpPr>
+        <a:xfrm>
+          <a:off x="0" y="0"/>
+          <a:ext cx="0" cy="0"/>
+          <a:chOff x="0" y="0"/>
+          <a:chExt cx="0" cy="0"/>
+        </a:xfrm>
+      </p:grpSpPr>
+      <p:sp>
+        <p:nvSpPr>
+          <p:cNvPr id="2" name="Title 1">
+            <a:extLst>
+              <a:ext uri="{FF2B5EF4-FFF2-40B4-BE49-F238E27FC236}">
+                <a16:creationId xmlns:a16="http://schemas.microsoft.com/office/drawing/2014/main" id="{5D6FE5B0-3A65-A816-83B3-2495C91A2740}"/>
+              </a:ext>
+            </a:extLst>
+          </p:cNvPr>
+          <p:cNvSpPr>
+            <a:spLocks noGrp="1"/>
+          </p:cNvSpPr>
+          <p:nvPr>
+            <p:ph type="title"/>
+          </p:nvPr>
+        </p:nvSpPr>
+        <p:spPr/>
+        <p:txBody>
+          <a:bodyPr/>
+          <a:lstStyle/>
+          <a:p>
+            <a:r>
+              <a:rPr lang="en-US" dirty="0"/>
+              <a:t>Main Method</a:t>
+            </a:r>
+          </a:p>
+        </p:txBody>
+      </p:sp>
+      <p:pic>
+        <p:nvPicPr>
+          <p:cNvPr id="6" name="Content Placeholder 5">
+            <a:extLst>
+              <a:ext uri="{FF2B5EF4-FFF2-40B4-BE49-F238E27FC236}">
+                <a16:creationId xmlns:a16="http://schemas.microsoft.com/office/drawing/2014/main" id="{A834802D-EC02-2ECF-DB74-B41B26BB3692}"/>
+              </a:ext>
+            </a:extLst>
+          </p:cNvPr>
+          <p:cNvPicPr>
+            <a:picLocks noGrp="1" noChangeAspect="1"/>
+          </p:cNvPicPr>
+          <p:nvPr>
+            <p:ph idx="1"/>
+          </p:nvPr>
+        </p:nvPicPr>
+        <p:blipFill>
+          <a:blip r:embed="rId2"/>
+          <a:stretch>
+            <a:fillRect/>
+          </a:stretch>
+        </p:blipFill>
+        <p:spPr>
+          <a:xfrm>
+            <a:off x="5020628" y="2057400"/>
+            <a:ext cx="6658759" cy="2950342"/>
+          </a:xfrm>
+          <a:prstGeom prst="rect">
+            <a:avLst/>
+          </a:prstGeom>
+        </p:spPr>
+      </p:pic>
+      <p:sp>
+        <p:nvSpPr>
+          <p:cNvPr id="5" name="Text Placeholder 4">
+            <a:extLst>
+              <a:ext uri="{FF2B5EF4-FFF2-40B4-BE49-F238E27FC236}">
+                <a16:creationId xmlns:a16="http://schemas.microsoft.com/office/drawing/2014/main" id="{50E22D83-1972-54C7-64DA-737B0AFE7F55}"/>
+              </a:ext>
+            </a:extLst>
+          </p:cNvPr>
+          <p:cNvSpPr>
+            <a:spLocks noGrp="1"/>
+          </p:cNvSpPr>
+          <p:nvPr>
+            <p:ph type="body" sz="half" idx="2"/>
+          </p:nvPr>
+        </p:nvSpPr>
+        <p:spPr/>
+        <p:txBody>
+          <a:bodyPr/>
+          <a:lstStyle/>
+          <a:p>
+            <a:pPr marL="285750" indent="-285750">
+              <a:buFont typeface="Arial" panose="020B0604020202020204" pitchFamily="34" charset="0"/>
+              <a:buChar char="•"/>
+            </a:pPr>
+            <a:r>
+              <a:rPr lang="en-US" dirty="0">
+                <a:latin typeface="Times New Roman" panose="02020603050405020304" pitchFamily="18" charset="0"/>
+                <a:cs typeface="Times New Roman" panose="02020603050405020304" pitchFamily="18" charset="0"/>
+              </a:rPr>
+              <a:t>The main method Inherits from the Application class to provide the start up to the application, where using the FXMLLoeader we can provide the fxml file we want to show at the start .</a:t>
+            </a:r>
+          </a:p>
+          <a:p>
+            <a:pPr marL="285750" indent="-285750">
+              <a:buFont typeface="Arial" panose="020B0604020202020204" pitchFamily="34" charset="0"/>
+              <a:buChar char="•"/>
+            </a:pPr>
+            <a:r>
+              <a:rPr lang="en-US" dirty="0">
+                <a:latin typeface="Times New Roman" panose="02020603050405020304" pitchFamily="18" charset="0"/>
+                <a:cs typeface="Times New Roman" panose="02020603050405020304" pitchFamily="18" charset="0"/>
+              </a:rPr>
+              <a:t>The fxml files contain the visual elements  and settings whereas there is another class tied to each fxml that is called a controller that’s how this project is laid out</a:t>
+            </a:r>
+          </a:p>
+          <a:p>
+            <a:endParaRPr lang="en-US" dirty="0"/>
+          </a:p>
+        </p:txBody>
+      </p:sp>
+    </p:spTree>
+    <p:extLst>
+      <p:ext uri="{BB962C8B-B14F-4D97-AF65-F5344CB8AC3E}">
+        <p14:creationId xmlns:p14="http://schemas.microsoft.com/office/powerpoint/2010/main" val="3312088198"/>
+      </p:ext>
+    </p:extLst>
+  </p:cSld>
+  <p:clrMapOvr>
+    <a:masterClrMapping/>
+  </p:clrMapOvr>
+</p:sld>
+</file>
+
+<file path=ppt/slides/slide16.xml><?xml version="1.0" encoding="utf-8"?>
+<p:sld xmlns:a="http://schemas.openxmlformats.org/drawingml/2006/main" xmlns:r="http://schemas.openxmlformats.org/officeDocument/2006/relationships" xmlns:p="http://schemas.openxmlformats.org/presentationml/2006/main">
+  <p:cSld>
+    <p:spTree>
+      <p:nvGrpSpPr>
+        <p:cNvPr id="1" name=""/>
+        <p:cNvGrpSpPr/>
+        <p:nvPr/>
+      </p:nvGrpSpPr>
+      <p:grpSpPr>
+        <a:xfrm>
+          <a:off x="0" y="0"/>
+          <a:ext cx="0" cy="0"/>
+          <a:chOff x="0" y="0"/>
+          <a:chExt cx="0" cy="0"/>
+        </a:xfrm>
+      </p:grpSpPr>
+      <p:sp>
+        <p:nvSpPr>
+          <p:cNvPr id="2" name="Title 1">
+            <a:extLst>
+              <a:ext uri="{FF2B5EF4-FFF2-40B4-BE49-F238E27FC236}">
+                <a16:creationId xmlns:a16="http://schemas.microsoft.com/office/drawing/2014/main" id="{54078453-27B1-C859-7CDE-90F208069D6D}"/>
+              </a:ext>
+            </a:extLst>
+          </p:cNvPr>
+          <p:cNvSpPr>
+            <a:spLocks noGrp="1"/>
+          </p:cNvSpPr>
+          <p:nvPr>
+            <p:ph type="title"/>
+          </p:nvPr>
+        </p:nvSpPr>
+        <p:spPr/>
+        <p:txBody>
+          <a:bodyPr/>
+          <a:lstStyle/>
+          <a:p>
+            <a:r>
+              <a:rPr lang="en-US" dirty="0"/>
+              <a:t>Login Method:</a:t>
+            </a:r>
+          </a:p>
+        </p:txBody>
+      </p:sp>
+      <p:pic>
+        <p:nvPicPr>
+          <p:cNvPr id="5" name="Content Placeholder 4">
+            <a:extLst>
+              <a:ext uri="{FF2B5EF4-FFF2-40B4-BE49-F238E27FC236}">
+                <a16:creationId xmlns:a16="http://schemas.microsoft.com/office/drawing/2014/main" id="{340C0318-7F33-75A8-63A7-7DF85E16AF6D}"/>
+              </a:ext>
+            </a:extLst>
+          </p:cNvPr>
+          <p:cNvPicPr>
+            <a:picLocks noGrp="1" noChangeAspect="1"/>
+          </p:cNvPicPr>
+          <p:nvPr>
+            <p:ph idx="1"/>
+          </p:nvPr>
+        </p:nvPicPr>
+        <p:blipFill>
+          <a:blip r:embed="rId2"/>
+          <a:stretch>
+            <a:fillRect/>
+          </a:stretch>
+        </p:blipFill>
+        <p:spPr>
+          <a:xfrm>
+            <a:off x="5223828" y="1383235"/>
+            <a:ext cx="6582908" cy="4091529"/>
+          </a:xfrm>
+          <a:prstGeom prst="rect">
+            <a:avLst/>
+          </a:prstGeom>
+        </p:spPr>
+      </p:pic>
+      <p:sp>
+        <p:nvSpPr>
+          <p:cNvPr id="4" name="Text Placeholder 3">
+            <a:extLst>
+              <a:ext uri="{FF2B5EF4-FFF2-40B4-BE49-F238E27FC236}">
+                <a16:creationId xmlns:a16="http://schemas.microsoft.com/office/drawing/2014/main" id="{9104FF8D-D55B-05A6-B167-50F70A35020A}"/>
+              </a:ext>
+            </a:extLst>
+          </p:cNvPr>
+          <p:cNvSpPr>
+            <a:spLocks noGrp="1"/>
+          </p:cNvSpPr>
+          <p:nvPr>
+            <p:ph type="body" sz="half" idx="2"/>
+          </p:nvPr>
+        </p:nvSpPr>
+        <p:spPr/>
+        <p:txBody>
+          <a:bodyPr>
+            <a:normAutofit/>
+          </a:bodyPr>
+          <a:lstStyle/>
+          <a:p>
+            <a:r>
+              <a:rPr lang="en-US" sz="1800" dirty="0">
+                <a:effectLst/>
+                <a:latin typeface="Times New Roman" panose="02020603050405020304" pitchFamily="18" charset="0"/>
+                <a:ea typeface="Calibri" panose="020F0502020204030204" pitchFamily="34" charset="0"/>
+                <a:cs typeface="Arial" panose="020B0604020202020204" pitchFamily="34" charset="0"/>
+              </a:rPr>
+              <a:t>The login method is inside the login Controller class and when the user clicks the login button the method is called, when its called it reads the prefix of the username and compares it to the user prefixes we specified in the </a:t>
+            </a:r>
+            <a:r>
+              <a:rPr lang="en-US" sz="1800" b="1" dirty="0">
+                <a:effectLst/>
+                <a:latin typeface="Times New Roman" panose="02020603050405020304" pitchFamily="18" charset="0"/>
+                <a:ea typeface="Calibri" panose="020F0502020204030204" pitchFamily="34" charset="0"/>
+                <a:cs typeface="Arial" panose="020B0604020202020204" pitchFamily="34" charset="0"/>
+              </a:rPr>
+              <a:t>Req002a.</a:t>
+            </a:r>
+            <a:endParaRPr lang="en-US" dirty="0"/>
+          </a:p>
+        </p:txBody>
+      </p:sp>
+    </p:spTree>
+    <p:extLst>
+      <p:ext uri="{BB962C8B-B14F-4D97-AF65-F5344CB8AC3E}">
+        <p14:creationId xmlns:p14="http://schemas.microsoft.com/office/powerpoint/2010/main" val="1579263405"/>
+      </p:ext>
+    </p:extLst>
+  </p:cSld>
+  <p:clrMapOvr>
+    <a:masterClrMapping/>
+  </p:clrMapOvr>
+</p:sld>
+</file>
+
+<file path=ppt/slides/slide17.xml><?xml version="1.0" encoding="utf-8"?>
+<p:sld xmlns:a="http://schemas.openxmlformats.org/drawingml/2006/main" xmlns:r="http://schemas.openxmlformats.org/officeDocument/2006/relationships" xmlns:p="http://schemas.openxmlformats.org/presentationml/2006/main">
+  <p:cSld>
+    <p:spTree>
+      <p:nvGrpSpPr>
+        <p:cNvPr id="1" name=""/>
+        <p:cNvGrpSpPr/>
+        <p:nvPr/>
+      </p:nvGrpSpPr>
+      <p:grpSpPr>
+        <a:xfrm>
+          <a:off x="0" y="0"/>
+          <a:ext cx="0" cy="0"/>
+          <a:chOff x="0" y="0"/>
+          <a:chExt cx="0" cy="0"/>
+        </a:xfrm>
+      </p:grpSpPr>
+      <p:sp>
+        <p:nvSpPr>
+          <p:cNvPr id="2" name="Title 1">
+            <a:extLst>
+              <a:ext uri="{FF2B5EF4-FFF2-40B4-BE49-F238E27FC236}">
+                <a16:creationId xmlns:a16="http://schemas.microsoft.com/office/drawing/2014/main" id="{F80EA01B-0085-4E0A-B254-0CD04E616194}"/>
+              </a:ext>
+            </a:extLst>
+          </p:cNvPr>
+          <p:cNvSpPr>
+            <a:spLocks noGrp="1"/>
+          </p:cNvSpPr>
+          <p:nvPr>
+            <p:ph type="title"/>
+          </p:nvPr>
+        </p:nvSpPr>
+        <p:spPr/>
+        <p:txBody>
+          <a:bodyPr/>
+          <a:lstStyle/>
+          <a:p>
+            <a:r>
+              <a:rPr lang="en-US" dirty="0"/>
+              <a:t>The Object class</a:t>
+            </a:r>
+          </a:p>
+        </p:txBody>
+      </p:sp>
+      <p:pic>
+        <p:nvPicPr>
+          <p:cNvPr id="5" name="Content Placeholder 4">
+            <a:extLst>
+              <a:ext uri="{FF2B5EF4-FFF2-40B4-BE49-F238E27FC236}">
+                <a16:creationId xmlns:a16="http://schemas.microsoft.com/office/drawing/2014/main" id="{17C5D9BF-5780-2CF3-25E6-D5809F42F247}"/>
+              </a:ext>
+            </a:extLst>
+          </p:cNvPr>
+          <p:cNvPicPr>
+            <a:picLocks noGrp="1" noChangeAspect="1"/>
+          </p:cNvPicPr>
+          <p:nvPr>
+            <p:ph idx="1"/>
+          </p:nvPr>
+        </p:nvPicPr>
+        <p:blipFill>
+          <a:blip r:embed="rId2"/>
+          <a:stretch>
+            <a:fillRect/>
+          </a:stretch>
+        </p:blipFill>
+        <p:spPr>
+          <a:xfrm>
+            <a:off x="5817193" y="987425"/>
+            <a:ext cx="4575577" cy="4873625"/>
+          </a:xfrm>
+          <a:prstGeom prst="rect">
+            <a:avLst/>
+          </a:prstGeom>
+        </p:spPr>
+      </p:pic>
+      <p:sp>
+        <p:nvSpPr>
+          <p:cNvPr id="4" name="Text Placeholder 3">
+            <a:extLst>
+              <a:ext uri="{FF2B5EF4-FFF2-40B4-BE49-F238E27FC236}">
+                <a16:creationId xmlns:a16="http://schemas.microsoft.com/office/drawing/2014/main" id="{8D59FB00-03F0-6DED-4BC4-50E2192BDEF8}"/>
+              </a:ext>
+            </a:extLst>
+          </p:cNvPr>
+          <p:cNvSpPr>
+            <a:spLocks noGrp="1"/>
+          </p:cNvSpPr>
+          <p:nvPr>
+            <p:ph type="body" sz="half" idx="2"/>
+          </p:nvPr>
+        </p:nvSpPr>
+        <p:spPr/>
+        <p:txBody>
+          <a:bodyPr/>
+          <a:lstStyle/>
+          <a:p>
+            <a:r>
+              <a:rPr lang="en-US" sz="1800" dirty="0">
+                <a:effectLst/>
+                <a:latin typeface="Times New Roman" panose="02020603050405020304" pitchFamily="18" charset="0"/>
+                <a:ea typeface="Calibri" panose="020F0502020204030204" pitchFamily="34" charset="0"/>
+                <a:cs typeface="Arial" panose="020B0604020202020204" pitchFamily="34" charset="0"/>
+              </a:rPr>
+              <a:t>The object class is your standard OOP Object class containing the main variables of that object and the corresponding constructor and setter and getter classes.</a:t>
+            </a:r>
+            <a:endParaRPr lang="en-US" sz="1800" dirty="0">
+              <a:effectLst/>
+              <a:latin typeface="Calibri" panose="020F0502020204030204" pitchFamily="34" charset="0"/>
+              <a:ea typeface="Calibri" panose="020F0502020204030204" pitchFamily="34" charset="0"/>
+              <a:cs typeface="Arial" panose="020B0604020202020204" pitchFamily="34" charset="0"/>
+            </a:endParaRPr>
+          </a:p>
+          <a:p>
+            <a:endParaRPr lang="en-US" dirty="0"/>
+          </a:p>
+        </p:txBody>
+      </p:sp>
+    </p:spTree>
+    <p:extLst>
+      <p:ext uri="{BB962C8B-B14F-4D97-AF65-F5344CB8AC3E}">
+        <p14:creationId xmlns:p14="http://schemas.microsoft.com/office/powerpoint/2010/main" val="1560858129"/>
+      </p:ext>
+    </p:extLst>
+  </p:cSld>
+  <p:clrMapOvr>
+    <a:masterClrMapping/>
+  </p:clrMapOvr>
+</p:sld>
+</file>
+
+<file path=ppt/slides/slide18.xml><?xml version="1.0" encoding="utf-8"?>
+<p:sld xmlns:a="http://schemas.openxmlformats.org/drawingml/2006/main" xmlns:r="http://schemas.openxmlformats.org/officeDocument/2006/relationships" xmlns:p="http://schemas.openxmlformats.org/presentationml/2006/main">
+  <p:cSld>
+    <p:spTree>
+      <p:nvGrpSpPr>
+        <p:cNvPr id="1" name=""/>
+        <p:cNvGrpSpPr/>
+        <p:nvPr/>
+      </p:nvGrpSpPr>
+      <p:grpSpPr>
+        <a:xfrm>
+          <a:off x="0" y="0"/>
+          <a:ext cx="0" cy="0"/>
+          <a:chOff x="0" y="0"/>
+          <a:chExt cx="0" cy="0"/>
+        </a:xfrm>
+      </p:grpSpPr>
+      <p:sp>
+        <p:nvSpPr>
+          <p:cNvPr id="2" name="Title 1">
+            <a:extLst>
+              <a:ext uri="{FF2B5EF4-FFF2-40B4-BE49-F238E27FC236}">
+                <a16:creationId xmlns:a16="http://schemas.microsoft.com/office/drawing/2014/main" id="{18F708F7-31FA-5FAC-E5C8-BD5155BFE69E}"/>
+              </a:ext>
+            </a:extLst>
+          </p:cNvPr>
+          <p:cNvSpPr>
+            <a:spLocks noGrp="1"/>
+          </p:cNvSpPr>
+          <p:nvPr>
+            <p:ph type="title"/>
+          </p:nvPr>
+        </p:nvSpPr>
+        <p:spPr/>
+        <p:txBody>
+          <a:bodyPr/>
+          <a:lstStyle/>
+          <a:p>
+            <a:r>
+              <a:rPr lang="en-US" dirty="0"/>
+              <a:t>The ObjectQuries classes</a:t>
+            </a:r>
+          </a:p>
+        </p:txBody>
+      </p:sp>
+      <p:pic>
+        <p:nvPicPr>
+          <p:cNvPr id="5" name="Content Placeholder 4">
+            <a:extLst>
+              <a:ext uri="{FF2B5EF4-FFF2-40B4-BE49-F238E27FC236}">
+                <a16:creationId xmlns:a16="http://schemas.microsoft.com/office/drawing/2014/main" id="{BC6C90CE-C0EE-85E0-6305-50F28FB48E14}"/>
+              </a:ext>
+            </a:extLst>
+          </p:cNvPr>
+          <p:cNvPicPr>
+            <a:picLocks noGrp="1" noChangeAspect="1"/>
+          </p:cNvPicPr>
+          <p:nvPr>
+            <p:ph idx="1"/>
+          </p:nvPr>
+        </p:nvPicPr>
+        <p:blipFill>
+          <a:blip r:embed="rId2"/>
+          <a:stretch>
+            <a:fillRect/>
+          </a:stretch>
+        </p:blipFill>
+        <p:spPr>
+          <a:xfrm>
+            <a:off x="4675188" y="1717521"/>
+            <a:ext cx="6838902" cy="3422958"/>
+          </a:xfrm>
+          <a:prstGeom prst="rect">
+            <a:avLst/>
+          </a:prstGeom>
+        </p:spPr>
+      </p:pic>
+      <p:sp>
+        <p:nvSpPr>
+          <p:cNvPr id="4" name="Text Placeholder 3">
+            <a:extLst>
+              <a:ext uri="{FF2B5EF4-FFF2-40B4-BE49-F238E27FC236}">
+                <a16:creationId xmlns:a16="http://schemas.microsoft.com/office/drawing/2014/main" id="{31E725D7-1DAD-87F4-2998-528827FEF4F0}"/>
+              </a:ext>
+            </a:extLst>
+          </p:cNvPr>
+          <p:cNvSpPr>
+            <a:spLocks noGrp="1"/>
+          </p:cNvSpPr>
+          <p:nvPr>
+            <p:ph type="body" sz="half" idx="2"/>
+          </p:nvPr>
+        </p:nvSpPr>
+        <p:spPr/>
+        <p:txBody>
+          <a:bodyPr/>
+          <a:lstStyle/>
+          <a:p>
+            <a:pPr marL="0" marR="0">
+              <a:lnSpc>
+                <a:spcPct val="107000"/>
+              </a:lnSpc>
+              <a:spcBef>
+                <a:spcPts val="0"/>
+              </a:spcBef>
+              <a:spcAft>
+                <a:spcPts val="800"/>
+              </a:spcAft>
+            </a:pPr>
+            <a:r>
+              <a:rPr lang="en-US" sz="1600" dirty="0">
+                <a:effectLst/>
+                <a:latin typeface="Times New Roman" panose="02020603050405020304" pitchFamily="18" charset="0"/>
+                <a:ea typeface="Calibri" panose="020F0502020204030204" pitchFamily="34" charset="0"/>
+                <a:cs typeface="Arial" panose="020B0604020202020204" pitchFamily="34" charset="0"/>
+              </a:rPr>
+              <a:t>The objectQuries classes will have a connection variable that will allow it to connect to the database, after successful  connection the class has several methods that use Prepared statements that have been set as variables  but missing the needed information from the user which will be given by the user at run time to execute the query.</a:t>
+            </a:r>
+            <a:endParaRPr lang="en-US" sz="1400" dirty="0">
+              <a:effectLst/>
+              <a:latin typeface="Calibri" panose="020F0502020204030204" pitchFamily="34" charset="0"/>
+              <a:ea typeface="Calibri" panose="020F0502020204030204" pitchFamily="34" charset="0"/>
+              <a:cs typeface="Arial" panose="020B0604020202020204" pitchFamily="34" charset="0"/>
+            </a:endParaRPr>
+          </a:p>
+          <a:p>
+            <a:endParaRPr lang="en-US" dirty="0"/>
+          </a:p>
+        </p:txBody>
+      </p:sp>
+    </p:spTree>
+    <p:extLst>
+      <p:ext uri="{BB962C8B-B14F-4D97-AF65-F5344CB8AC3E}">
+        <p14:creationId xmlns:p14="http://schemas.microsoft.com/office/powerpoint/2010/main" val="157637417"/>
+      </p:ext>
+    </p:extLst>
+  </p:cSld>
+  <p:clrMapOvr>
+    <a:masterClrMapping/>
+  </p:clrMapOvr>
+</p:sld>
+</file>
+
+<file path=ppt/slides/slide19.xml><?xml version="1.0" encoding="utf-8"?>
 <p:sld xmlns:a="http://schemas.openxmlformats.org/drawingml/2006/main" xmlns:r="http://schemas.openxmlformats.org/officeDocument/2006/relationships" xmlns:p="http://schemas.openxmlformats.org/presentationml/2006/main">
   <p:cSld>
     <p:bg>
@@ -5164,6 +6028,2549 @@
     <p:extLst>
       <p:ext uri="{BB962C8B-B14F-4D97-AF65-F5344CB8AC3E}">
         <p14:creationId xmlns:p14="http://schemas.microsoft.com/office/powerpoint/2010/main" val="1270682953"/>
+      </p:ext>
+    </p:extLst>
+  </p:cSld>
+  <p:clrMapOvr>
+    <a:masterClrMapping/>
+  </p:clrMapOvr>
+</p:sld>
+</file>
+
+<file path=ppt/slides/slide2.xml><?xml version="1.0" encoding="utf-8"?>
+<p:sld xmlns:a="http://schemas.openxmlformats.org/drawingml/2006/main" xmlns:r="http://schemas.openxmlformats.org/officeDocument/2006/relationships" xmlns:p="http://schemas.openxmlformats.org/presentationml/2006/main">
+  <p:cSld>
+    <p:spTree>
+      <p:nvGrpSpPr>
+        <p:cNvPr id="1" name=""/>
+        <p:cNvGrpSpPr/>
+        <p:nvPr/>
+      </p:nvGrpSpPr>
+      <p:grpSpPr>
+        <a:xfrm>
+          <a:off x="0" y="0"/>
+          <a:ext cx="0" cy="0"/>
+          <a:chOff x="0" y="0"/>
+          <a:chExt cx="0" cy="0"/>
+        </a:xfrm>
+      </p:grpSpPr>
+      <p:sp>
+        <p:nvSpPr>
+          <p:cNvPr id="2" name="Title 1">
+            <a:extLst>
+              <a:ext uri="{FF2B5EF4-FFF2-40B4-BE49-F238E27FC236}">
+                <a16:creationId xmlns:a16="http://schemas.microsoft.com/office/drawing/2014/main" id="{1A724BDD-C95E-9BD8-A09A-ED9D2543CFB8}"/>
+              </a:ext>
+            </a:extLst>
+          </p:cNvPr>
+          <p:cNvSpPr>
+            <a:spLocks noGrp="1"/>
+          </p:cNvSpPr>
+          <p:nvPr>
+            <p:ph type="title"/>
+          </p:nvPr>
+        </p:nvSpPr>
+        <p:spPr/>
+        <p:txBody>
+          <a:bodyPr/>
+          <a:lstStyle/>
+          <a:p>
+            <a:r>
+              <a:rPr lang="en-US" dirty="0">
+                <a:latin typeface="Times New Roman" panose="02020603050405020304" pitchFamily="18" charset="0"/>
+                <a:cs typeface="Times New Roman" panose="02020603050405020304" pitchFamily="18" charset="0"/>
+              </a:rPr>
+              <a:t>1. Introduction </a:t>
+            </a:r>
+          </a:p>
+        </p:txBody>
+      </p:sp>
+      <p:sp>
+        <p:nvSpPr>
+          <p:cNvPr id="3" name="Content Placeholder 2">
+            <a:extLst>
+              <a:ext uri="{FF2B5EF4-FFF2-40B4-BE49-F238E27FC236}">
+                <a16:creationId xmlns:a16="http://schemas.microsoft.com/office/drawing/2014/main" id="{F08F9300-1FCE-2E32-A075-75A246279FA6}"/>
+              </a:ext>
+            </a:extLst>
+          </p:cNvPr>
+          <p:cNvSpPr>
+            <a:spLocks noGrp="1"/>
+          </p:cNvSpPr>
+          <p:nvPr>
+            <p:ph idx="1"/>
+          </p:nvPr>
+        </p:nvSpPr>
+        <p:spPr/>
+        <p:txBody>
+          <a:bodyPr/>
+          <a:lstStyle/>
+          <a:p>
+            <a:r>
+              <a:rPr lang="en-US" sz="1800" dirty="0">
+                <a:effectLst/>
+                <a:latin typeface="Times New Roman" panose="02020603050405020304" pitchFamily="18" charset="0"/>
+                <a:ea typeface="Calibri" panose="020F0502020204030204" pitchFamily="34" charset="0"/>
+                <a:cs typeface="Arial" panose="020B0604020202020204" pitchFamily="34" charset="0"/>
+              </a:rPr>
+              <a:t>Today's world is driven by data and everyday the standard to handle that data in everyday life increases </a:t>
+            </a:r>
+          </a:p>
+          <a:p>
+            <a:r>
+              <a:rPr lang="en-US" sz="1800" dirty="0">
+                <a:effectLst/>
+                <a:latin typeface="Times New Roman" panose="02020603050405020304" pitchFamily="18" charset="0"/>
+                <a:ea typeface="Calibri" panose="020F0502020204030204" pitchFamily="34" charset="0"/>
+                <a:cs typeface="Arial" panose="020B0604020202020204" pitchFamily="34" charset="0"/>
+              </a:rPr>
+              <a:t>Therefore, businesses  must adopt ways to handle the data well that’s where the Icare system comes in</a:t>
+            </a:r>
+            <a:endParaRPr lang="en-US" dirty="0">
+              <a:latin typeface="Times New Roman" panose="02020603050405020304" pitchFamily="18" charset="0"/>
+              <a:ea typeface="Calibri" panose="020F0502020204030204" pitchFamily="34" charset="0"/>
+              <a:cs typeface="Arial" panose="020B0604020202020204" pitchFamily="34" charset="0"/>
+            </a:endParaRPr>
+          </a:p>
+          <a:p>
+            <a:r>
+              <a:rPr lang="en-US" sz="1800" dirty="0">
+                <a:effectLst/>
+                <a:latin typeface="Times New Roman" panose="02020603050405020304" pitchFamily="18" charset="0"/>
+                <a:ea typeface="Calibri" panose="020F0502020204030204" pitchFamily="34" charset="0"/>
+                <a:cs typeface="Arial" panose="020B0604020202020204" pitchFamily="34" charset="0"/>
+              </a:rPr>
+              <a:t>Icare provide an application for clinics of small to medium size that will provide the core necessary functions the establishment would need without any over the board capabilities  that won’t be utilized </a:t>
+            </a:r>
+          </a:p>
+          <a:p>
+            <a:pPr lvl="1"/>
+            <a:r>
+              <a:rPr lang="en-US" dirty="0">
+                <a:latin typeface="Times New Roman" panose="02020603050405020304" pitchFamily="18" charset="0"/>
+                <a:ea typeface="Calibri" panose="020F0502020204030204" pitchFamily="34" charset="0"/>
+                <a:cs typeface="Arial" panose="020B0604020202020204" pitchFamily="34" charset="0"/>
+              </a:rPr>
+              <a:t>	</a:t>
+            </a:r>
+            <a:endParaRPr lang="en-US" dirty="0">
+              <a:effectLst/>
+              <a:latin typeface="Calibri" panose="020F0502020204030204" pitchFamily="34" charset="0"/>
+              <a:ea typeface="Calibri" panose="020F0502020204030204" pitchFamily="34" charset="0"/>
+              <a:cs typeface="Arial" panose="020B0604020202020204" pitchFamily="34" charset="0"/>
+            </a:endParaRPr>
+          </a:p>
+          <a:p>
+            <a:endParaRPr lang="en-US" dirty="0"/>
+          </a:p>
+        </p:txBody>
+      </p:sp>
+    </p:spTree>
+    <p:extLst>
+      <p:ext uri="{BB962C8B-B14F-4D97-AF65-F5344CB8AC3E}">
+        <p14:creationId xmlns:p14="http://schemas.microsoft.com/office/powerpoint/2010/main" val="39134136"/>
+      </p:ext>
+    </p:extLst>
+  </p:cSld>
+  <p:clrMapOvr>
+    <a:masterClrMapping/>
+  </p:clrMapOvr>
+  <p:timing>
+    <p:tnLst>
+      <p:par>
+        <p:cTn id="1" dur="indefinite" restart="never" nodeType="tmRoot">
+          <p:childTnLst>
+            <p:seq concurrent="1" nextAc="seek">
+              <p:cTn id="2" dur="indefinite" nodeType="mainSeq">
+                <p:childTnLst>
+                  <p:par>
+                    <p:cTn id="3" fill="hold">
+                      <p:stCondLst>
+                        <p:cond delay="indefinite"/>
+                      </p:stCondLst>
+                      <p:childTnLst>
+                        <p:par>
+                          <p:cTn id="4" fill="hold">
+                            <p:stCondLst>
+                              <p:cond delay="0"/>
+                            </p:stCondLst>
+                            <p:childTnLst>
+                              <p:par>
+                                <p:cTn id="5" presetID="1" presetClass="entr" presetSubtype="0" fill="hold" nodeType="clickEffect">
+                                  <p:stCondLst>
+                                    <p:cond delay="0"/>
+                                  </p:stCondLst>
+                                  <p:childTnLst>
+                                    <p:set>
+                                      <p:cBhvr>
+                                        <p:cTn id="6" dur="1" fill="hold">
+                                          <p:stCondLst>
+                                            <p:cond delay="0"/>
+                                          </p:stCondLst>
+                                        </p:cTn>
+                                        <p:tgtEl>
+                                          <p:spTgt spid="3">
+                                            <p:txEl>
+                                              <p:pRg st="0" end="0"/>
+                                            </p:txEl>
+                                          </p:spTgt>
+                                        </p:tgtEl>
+                                        <p:attrNameLst>
+                                          <p:attrName>style.visibility</p:attrName>
+                                        </p:attrNameLst>
+                                      </p:cBhvr>
+                                      <p:to>
+                                        <p:strVal val="visible"/>
+                                      </p:to>
+                                    </p:set>
+                                  </p:childTnLst>
+                                </p:cTn>
+                              </p:par>
+                            </p:childTnLst>
+                          </p:cTn>
+                        </p:par>
+                      </p:childTnLst>
+                    </p:cTn>
+                  </p:par>
+                  <p:par>
+                    <p:cTn id="7" fill="hold">
+                      <p:stCondLst>
+                        <p:cond delay="indefinite"/>
+                      </p:stCondLst>
+                      <p:childTnLst>
+                        <p:par>
+                          <p:cTn id="8" fill="hold">
+                            <p:stCondLst>
+                              <p:cond delay="0"/>
+                            </p:stCondLst>
+                            <p:childTnLst>
+                              <p:par>
+                                <p:cTn id="9" presetID="1" presetClass="entr" presetSubtype="0" fill="hold" nodeType="clickEffect">
+                                  <p:stCondLst>
+                                    <p:cond delay="0"/>
+                                  </p:stCondLst>
+                                  <p:childTnLst>
+                                    <p:set>
+                                      <p:cBhvr>
+                                        <p:cTn id="10" dur="1" fill="hold">
+                                          <p:stCondLst>
+                                            <p:cond delay="0"/>
+                                          </p:stCondLst>
+                                        </p:cTn>
+                                        <p:tgtEl>
+                                          <p:spTgt spid="3">
+                                            <p:txEl>
+                                              <p:pRg st="1" end="1"/>
+                                            </p:txEl>
+                                          </p:spTgt>
+                                        </p:tgtEl>
+                                        <p:attrNameLst>
+                                          <p:attrName>style.visibility</p:attrName>
+                                        </p:attrNameLst>
+                                      </p:cBhvr>
+                                      <p:to>
+                                        <p:strVal val="visible"/>
+                                      </p:to>
+                                    </p:set>
+                                  </p:childTnLst>
+                                </p:cTn>
+                              </p:par>
+                            </p:childTnLst>
+                          </p:cTn>
+                        </p:par>
+                      </p:childTnLst>
+                    </p:cTn>
+                  </p:par>
+                  <p:par>
+                    <p:cTn id="11" fill="hold">
+                      <p:stCondLst>
+                        <p:cond delay="indefinite"/>
+                      </p:stCondLst>
+                      <p:childTnLst>
+                        <p:par>
+                          <p:cTn id="12" fill="hold">
+                            <p:stCondLst>
+                              <p:cond delay="0"/>
+                            </p:stCondLst>
+                            <p:childTnLst>
+                              <p:par>
+                                <p:cTn id="13" presetID="1" presetClass="entr" presetSubtype="0" fill="hold" nodeType="clickEffect">
+                                  <p:stCondLst>
+                                    <p:cond delay="0"/>
+                                  </p:stCondLst>
+                                  <p:childTnLst>
+                                    <p:set>
+                                      <p:cBhvr>
+                                        <p:cTn id="14" dur="1" fill="hold">
+                                          <p:stCondLst>
+                                            <p:cond delay="0"/>
+                                          </p:stCondLst>
+                                        </p:cTn>
+                                        <p:tgtEl>
+                                          <p:spTgt spid="3">
+                                            <p:txEl>
+                                              <p:pRg st="2" end="2"/>
+                                            </p:txEl>
+                                          </p:spTgt>
+                                        </p:tgtEl>
+                                        <p:attrNameLst>
+                                          <p:attrName>style.visibility</p:attrName>
+                                        </p:attrNameLst>
+                                      </p:cBhvr>
+                                      <p:to>
+                                        <p:strVal val="visible"/>
+                                      </p:to>
+                                    </p:set>
+                                  </p:childTnLst>
+                                </p:cTn>
+                              </p:par>
+                            </p:childTnLst>
+                          </p:cTn>
+                        </p:par>
+                      </p:childTnLst>
+                    </p:cTn>
+                  </p:par>
+                </p:childTnLst>
+              </p:cTn>
+              <p:prevCondLst>
+                <p:cond evt="onPrev" delay="0">
+                  <p:tgtEl>
+                    <p:sldTgt/>
+                  </p:tgtEl>
+                </p:cond>
+              </p:prevCondLst>
+              <p:nextCondLst>
+                <p:cond evt="onNext" delay="0">
+                  <p:tgtEl>
+                    <p:sldTgt/>
+                  </p:tgtEl>
+                </p:cond>
+              </p:nextCondLst>
+            </p:seq>
+          </p:childTnLst>
+        </p:cTn>
+      </p:par>
+    </p:tnLst>
+  </p:timing>
+</p:sld>
+</file>
+
+<file path=ppt/slides/slide3.xml><?xml version="1.0" encoding="utf-8"?>
+<p:sld xmlns:a="http://schemas.openxmlformats.org/drawingml/2006/main" xmlns:r="http://schemas.openxmlformats.org/officeDocument/2006/relationships" xmlns:p="http://schemas.openxmlformats.org/presentationml/2006/main">
+  <p:cSld>
+    <p:spTree>
+      <p:nvGrpSpPr>
+        <p:cNvPr id="1" name=""/>
+        <p:cNvGrpSpPr/>
+        <p:nvPr/>
+      </p:nvGrpSpPr>
+      <p:grpSpPr>
+        <a:xfrm>
+          <a:off x="0" y="0"/>
+          <a:ext cx="0" cy="0"/>
+          <a:chOff x="0" y="0"/>
+          <a:chExt cx="0" cy="0"/>
+        </a:xfrm>
+      </p:grpSpPr>
+      <p:sp>
+        <p:nvSpPr>
+          <p:cNvPr id="2" name="Title 1">
+            <a:extLst>
+              <a:ext uri="{FF2B5EF4-FFF2-40B4-BE49-F238E27FC236}">
+                <a16:creationId xmlns:a16="http://schemas.microsoft.com/office/drawing/2014/main" id="{DA5965EC-96D0-1BCE-0FDD-5BCEFBE88F6A}"/>
+              </a:ext>
+            </a:extLst>
+          </p:cNvPr>
+          <p:cNvSpPr>
+            <a:spLocks noGrp="1"/>
+          </p:cNvSpPr>
+          <p:nvPr>
+            <p:ph type="title"/>
+          </p:nvPr>
+        </p:nvSpPr>
+        <p:spPr/>
+        <p:txBody>
+          <a:bodyPr/>
+          <a:lstStyle/>
+          <a:p>
+            <a:r>
+              <a:rPr lang="en-US" dirty="0">
+                <a:latin typeface="Times New Roman" panose="02020603050405020304" pitchFamily="18" charset="0"/>
+                <a:cs typeface="Times New Roman" panose="02020603050405020304" pitchFamily="18" charset="0"/>
+              </a:rPr>
+              <a:t>System analysis</a:t>
+            </a:r>
+          </a:p>
+        </p:txBody>
+      </p:sp>
+      <p:sp>
+        <p:nvSpPr>
+          <p:cNvPr id="3" name="Content Placeholder 2">
+            <a:extLst>
+              <a:ext uri="{FF2B5EF4-FFF2-40B4-BE49-F238E27FC236}">
+                <a16:creationId xmlns:a16="http://schemas.microsoft.com/office/drawing/2014/main" id="{32079805-3161-6089-BDAB-44A175EFF185}"/>
+              </a:ext>
+            </a:extLst>
+          </p:cNvPr>
+          <p:cNvSpPr>
+            <a:spLocks noGrp="1"/>
+          </p:cNvSpPr>
+          <p:nvPr>
+            <p:ph idx="1"/>
+          </p:nvPr>
+        </p:nvSpPr>
+        <p:spPr>
+          <a:xfrm>
+            <a:off x="1077362" y="2427316"/>
+            <a:ext cx="9950103" cy="1098204"/>
+          </a:xfrm>
+        </p:spPr>
+        <p:txBody>
+          <a:bodyPr>
+            <a:normAutofit fontScale="77500" lnSpcReduction="20000"/>
+          </a:bodyPr>
+          <a:lstStyle/>
+          <a:p>
+            <a:pPr>
+              <a:lnSpc>
+                <a:spcPct val="107000"/>
+              </a:lnSpc>
+              <a:spcBef>
+                <a:spcPts val="0"/>
+              </a:spcBef>
+              <a:spcAft>
+                <a:spcPts val="800"/>
+              </a:spcAft>
+            </a:pPr>
+            <a:r>
+              <a:rPr lang="en-US" sz="2500" b="1" dirty="0">
+                <a:latin typeface="Times New Roman" panose="02020603050405020304" pitchFamily="18" charset="0"/>
+                <a:ea typeface="Calibri" panose="020F0502020204030204" pitchFamily="34" charset="0"/>
+                <a:cs typeface="Arial" panose="020B0604020202020204" pitchFamily="34" charset="0"/>
+              </a:rPr>
+              <a:t>Project Scope:</a:t>
+            </a:r>
+            <a:endParaRPr lang="en-US" sz="2500" b="1" dirty="0">
+              <a:effectLst/>
+              <a:latin typeface="Times New Roman" panose="02020603050405020304" pitchFamily="18" charset="0"/>
+              <a:ea typeface="Calibri" panose="020F0502020204030204" pitchFamily="34" charset="0"/>
+              <a:cs typeface="Arial" panose="020B0604020202020204" pitchFamily="34" charset="0"/>
+            </a:endParaRPr>
+          </a:p>
+          <a:p>
+            <a:pPr marL="331470" lvl="1" indent="-285750">
+              <a:lnSpc>
+                <a:spcPct val="107000"/>
+              </a:lnSpc>
+              <a:spcBef>
+                <a:spcPts val="0"/>
+              </a:spcBef>
+              <a:spcAft>
+                <a:spcPts val="800"/>
+              </a:spcAft>
+            </a:pPr>
+            <a:r>
+              <a:rPr lang="en-US" sz="2300" b="0" dirty="0">
+                <a:effectLst/>
+                <a:latin typeface="Times New Roman" panose="02020603050405020304" pitchFamily="18" charset="0"/>
+                <a:ea typeface="Calibri" panose="020F0502020204030204" pitchFamily="34" charset="0"/>
+                <a:cs typeface="Arial" panose="020B0604020202020204" pitchFamily="34" charset="0"/>
+              </a:rPr>
+              <a:t>The scope of the project is to design a desktop application that can provide the core functions in a lightweight and cost-effective way for small to medium size clinics</a:t>
+            </a:r>
+            <a:r>
+              <a:rPr lang="en-US" sz="2800" b="0" dirty="0">
+                <a:effectLst/>
+                <a:latin typeface="Times New Roman" panose="02020603050405020304" pitchFamily="18" charset="0"/>
+                <a:ea typeface="Calibri" panose="020F0502020204030204" pitchFamily="34" charset="0"/>
+                <a:cs typeface="Arial" panose="020B0604020202020204" pitchFamily="34" charset="0"/>
+              </a:rPr>
+              <a:t>.</a:t>
+            </a:r>
+            <a:endParaRPr lang="en-US" sz="2800" b="0" dirty="0">
+              <a:effectLst/>
+              <a:latin typeface="Calibri" panose="020F0502020204030204" pitchFamily="34" charset="0"/>
+              <a:ea typeface="Calibri" panose="020F0502020204030204" pitchFamily="34" charset="0"/>
+              <a:cs typeface="Arial" panose="020B0604020202020204" pitchFamily="34" charset="0"/>
+            </a:endParaRPr>
+          </a:p>
+          <a:p>
+            <a:endParaRPr lang="en-US" dirty="0"/>
+          </a:p>
+        </p:txBody>
+      </p:sp>
+      <p:sp>
+        <p:nvSpPr>
+          <p:cNvPr id="4" name="TextBox 3">
+            <a:extLst>
+              <a:ext uri="{FF2B5EF4-FFF2-40B4-BE49-F238E27FC236}">
+                <a16:creationId xmlns:a16="http://schemas.microsoft.com/office/drawing/2014/main" id="{0C18CD67-29FA-77E9-0CD1-4D9382F6FCBA}"/>
+              </a:ext>
+            </a:extLst>
+          </p:cNvPr>
+          <p:cNvSpPr txBox="1"/>
+          <p:nvPr/>
+        </p:nvSpPr>
+        <p:spPr>
+          <a:xfrm>
+            <a:off x="1229360" y="3799840"/>
+            <a:ext cx="9733280" cy="1477328"/>
+          </a:xfrm>
+          <a:prstGeom prst="rect">
+            <a:avLst/>
+          </a:prstGeom>
+          <a:noFill/>
+        </p:spPr>
+        <p:txBody>
+          <a:bodyPr wrap="square" rtlCol="0">
+            <a:spAutoFit/>
+          </a:bodyPr>
+          <a:lstStyle/>
+          <a:p>
+            <a:pPr marL="285750" indent="-285750">
+              <a:buFont typeface="Arial" panose="020B0604020202020204" pitchFamily="34" charset="0"/>
+              <a:buChar char="•"/>
+            </a:pPr>
+            <a:r>
+              <a:rPr lang="en-US" b="1" dirty="0">
+                <a:latin typeface="Times New Roman" panose="02020603050405020304" pitchFamily="18" charset="0"/>
+                <a:cs typeface="Times New Roman" panose="02020603050405020304" pitchFamily="18" charset="0"/>
+              </a:rPr>
+              <a:t>System Requirements :</a:t>
+            </a:r>
+          </a:p>
+          <a:p>
+            <a:r>
+              <a:rPr lang="en-US" b="1" dirty="0">
+                <a:latin typeface="Times New Roman" panose="02020603050405020304" pitchFamily="18" charset="0"/>
+                <a:cs typeface="Times New Roman" panose="02020603050405020304" pitchFamily="18" charset="0"/>
+              </a:rPr>
+              <a:t>	</a:t>
+            </a:r>
+            <a:r>
+              <a:rPr lang="en-US" dirty="0">
+                <a:latin typeface="Times New Roman" panose="02020603050405020304" pitchFamily="18" charset="0"/>
+                <a:cs typeface="Times New Roman" panose="02020603050405020304" pitchFamily="18" charset="0"/>
+              </a:rPr>
+              <a:t>Every system needs its requirements  set out to be able to know if they match the needs of the stakeholders and clients and there are two kinds of requirements :</a:t>
+            </a:r>
+          </a:p>
+          <a:p>
+            <a:pPr marL="742950" lvl="1" indent="-285750">
+              <a:buFont typeface="Arial" panose="020B0604020202020204" pitchFamily="34" charset="0"/>
+              <a:buChar char="•"/>
+            </a:pPr>
+            <a:r>
+              <a:rPr lang="en-US" b="1" dirty="0">
+                <a:latin typeface="Times New Roman" panose="02020603050405020304" pitchFamily="18" charset="0"/>
+                <a:cs typeface="Times New Roman" panose="02020603050405020304" pitchFamily="18" charset="0"/>
+              </a:rPr>
+              <a:t>Functional requirements : </a:t>
+            </a:r>
+            <a:r>
+              <a:rPr lang="en-US" dirty="0">
+                <a:latin typeface="Times New Roman" panose="02020603050405020304" pitchFamily="18" charset="0"/>
+                <a:cs typeface="Times New Roman" panose="02020603050405020304" pitchFamily="18" charset="0"/>
+              </a:rPr>
+              <a:t>explain how the system must work</a:t>
+            </a:r>
+          </a:p>
+          <a:p>
+            <a:pPr marL="742950" lvl="1" indent="-285750">
+              <a:buFont typeface="Arial" panose="020B0604020202020204" pitchFamily="34" charset="0"/>
+              <a:buChar char="•"/>
+            </a:pPr>
+            <a:r>
+              <a:rPr lang="en-US" b="1" dirty="0">
+                <a:latin typeface="Times New Roman" panose="02020603050405020304" pitchFamily="18" charset="0"/>
+                <a:cs typeface="Times New Roman" panose="02020603050405020304" pitchFamily="18" charset="0"/>
+              </a:rPr>
+              <a:t>Non-functional requirements : </a:t>
+            </a:r>
+            <a:r>
+              <a:rPr lang="en-US" dirty="0">
+                <a:latin typeface="Times New Roman" panose="02020603050405020304" pitchFamily="18" charset="0"/>
+                <a:cs typeface="Times New Roman" panose="02020603050405020304" pitchFamily="18" charset="0"/>
+              </a:rPr>
+              <a:t>explain how the system should perform.</a:t>
+            </a:r>
+          </a:p>
+        </p:txBody>
+      </p:sp>
+    </p:spTree>
+    <p:extLst>
+      <p:ext uri="{BB962C8B-B14F-4D97-AF65-F5344CB8AC3E}">
+        <p14:creationId xmlns:p14="http://schemas.microsoft.com/office/powerpoint/2010/main" val="302333784"/>
+      </p:ext>
+    </p:extLst>
+  </p:cSld>
+  <p:clrMapOvr>
+    <a:masterClrMapping/>
+  </p:clrMapOvr>
+  <p:timing>
+    <p:tnLst>
+      <p:par>
+        <p:cTn id="1" dur="indefinite" restart="never" nodeType="tmRoot">
+          <p:childTnLst>
+            <p:seq concurrent="1" nextAc="seek">
+              <p:cTn id="2" dur="indefinite" nodeType="mainSeq">
+                <p:childTnLst>
+                  <p:par>
+                    <p:cTn id="3" fill="hold">
+                      <p:stCondLst>
+                        <p:cond delay="indefinite"/>
+                        <p:cond evt="onBegin" delay="0">
+                          <p:tn val="2"/>
+                        </p:cond>
+                      </p:stCondLst>
+                      <p:childTnLst>
+                        <p:par>
+                          <p:cTn id="4" fill="hold">
+                            <p:stCondLst>
+                              <p:cond delay="0"/>
+                            </p:stCondLst>
+                            <p:childTnLst>
+                              <p:par>
+                                <p:cTn id="5" presetID="1" presetClass="entr" presetSubtype="0" fill="hold" nodeType="withEffect">
+                                  <p:stCondLst>
+                                    <p:cond delay="0"/>
+                                  </p:stCondLst>
+                                  <p:childTnLst>
+                                    <p:set>
+                                      <p:cBhvr>
+                                        <p:cTn id="6" dur="1" fill="hold">
+                                          <p:stCondLst>
+                                            <p:cond delay="0"/>
+                                          </p:stCondLst>
+                                        </p:cTn>
+                                        <p:tgtEl>
+                                          <p:spTgt spid="3">
+                                            <p:txEl>
+                                              <p:pRg st="1" end="1"/>
+                                            </p:txEl>
+                                          </p:spTgt>
+                                        </p:tgtEl>
+                                        <p:attrNameLst>
+                                          <p:attrName>style.visibility</p:attrName>
+                                        </p:attrNameLst>
+                                      </p:cBhvr>
+                                      <p:to>
+                                        <p:strVal val="visible"/>
+                                      </p:to>
+                                    </p:set>
+                                  </p:childTnLst>
+                                </p:cTn>
+                              </p:par>
+                              <p:par>
+                                <p:cTn id="7" presetID="1" presetClass="entr" presetSubtype="0" fill="hold" nodeType="withEffect">
+                                  <p:stCondLst>
+                                    <p:cond delay="0"/>
+                                  </p:stCondLst>
+                                  <p:childTnLst>
+                                    <p:set>
+                                      <p:cBhvr>
+                                        <p:cTn id="8" dur="1" fill="hold">
+                                          <p:stCondLst>
+                                            <p:cond delay="0"/>
+                                          </p:stCondLst>
+                                        </p:cTn>
+                                        <p:tgtEl>
+                                          <p:spTgt spid="3">
+                                            <p:txEl>
+                                              <p:pRg st="0" end="0"/>
+                                            </p:txEl>
+                                          </p:spTgt>
+                                        </p:tgtEl>
+                                        <p:attrNameLst>
+                                          <p:attrName>style.visibility</p:attrName>
+                                        </p:attrNameLst>
+                                      </p:cBhvr>
+                                      <p:to>
+                                        <p:strVal val="visible"/>
+                                      </p:to>
+                                    </p:set>
+                                  </p:childTnLst>
+                                </p:cTn>
+                              </p:par>
+                              <p:par>
+                                <p:cTn id="9" presetID="1" presetClass="entr" presetSubtype="0" fill="hold" nodeType="withEffect">
+                                  <p:stCondLst>
+                                    <p:cond delay="0"/>
+                                  </p:stCondLst>
+                                  <p:childTnLst>
+                                    <p:set>
+                                      <p:cBhvr>
+                                        <p:cTn id="10" dur="1" fill="hold">
+                                          <p:stCondLst>
+                                            <p:cond delay="0"/>
+                                          </p:stCondLst>
+                                        </p:cTn>
+                                        <p:tgtEl>
+                                          <p:spTgt spid="4">
+                                            <p:txEl>
+                                              <p:pRg st="1" end="1"/>
+                                            </p:txEl>
+                                          </p:spTgt>
+                                        </p:tgtEl>
+                                        <p:attrNameLst>
+                                          <p:attrName>style.visibility</p:attrName>
+                                        </p:attrNameLst>
+                                      </p:cBhvr>
+                                      <p:to>
+                                        <p:strVal val="visible"/>
+                                      </p:to>
+                                    </p:set>
+                                  </p:childTnLst>
+                                </p:cTn>
+                              </p:par>
+                              <p:par>
+                                <p:cTn id="11" presetID="1" presetClass="entr" presetSubtype="0" fill="hold" nodeType="withEffect">
+                                  <p:stCondLst>
+                                    <p:cond delay="0"/>
+                                  </p:stCondLst>
+                                  <p:childTnLst>
+                                    <p:set>
+                                      <p:cBhvr>
+                                        <p:cTn id="12" dur="1" fill="hold">
+                                          <p:stCondLst>
+                                            <p:cond delay="0"/>
+                                          </p:stCondLst>
+                                        </p:cTn>
+                                        <p:tgtEl>
+                                          <p:spTgt spid="4">
+                                            <p:txEl>
+                                              <p:pRg st="0" end="0"/>
+                                            </p:txEl>
+                                          </p:spTgt>
+                                        </p:tgtEl>
+                                        <p:attrNameLst>
+                                          <p:attrName>style.visibility</p:attrName>
+                                        </p:attrNameLst>
+                                      </p:cBhvr>
+                                      <p:to>
+                                        <p:strVal val="visible"/>
+                                      </p:to>
+                                    </p:set>
+                                  </p:childTnLst>
+                                </p:cTn>
+                              </p:par>
+                            </p:childTnLst>
+                          </p:cTn>
+                        </p:par>
+                      </p:childTnLst>
+                    </p:cTn>
+                  </p:par>
+                  <p:par>
+                    <p:cTn id="13" fill="hold">
+                      <p:stCondLst>
+                        <p:cond delay="indefinite"/>
+                      </p:stCondLst>
+                      <p:childTnLst>
+                        <p:par>
+                          <p:cTn id="14" fill="hold">
+                            <p:stCondLst>
+                              <p:cond delay="0"/>
+                            </p:stCondLst>
+                            <p:childTnLst>
+                              <p:par>
+                                <p:cTn id="15" presetID="1" presetClass="entr" presetSubtype="0" fill="hold" nodeType="clickEffect">
+                                  <p:stCondLst>
+                                    <p:cond delay="0"/>
+                                  </p:stCondLst>
+                                  <p:childTnLst>
+                                    <p:set>
+                                      <p:cBhvr>
+                                        <p:cTn id="16" dur="1" fill="hold">
+                                          <p:stCondLst>
+                                            <p:cond delay="0"/>
+                                          </p:stCondLst>
+                                        </p:cTn>
+                                        <p:tgtEl>
+                                          <p:spTgt spid="4">
+                                            <p:txEl>
+                                              <p:pRg st="2" end="2"/>
+                                            </p:txEl>
+                                          </p:spTgt>
+                                        </p:tgtEl>
+                                        <p:attrNameLst>
+                                          <p:attrName>style.visibility</p:attrName>
+                                        </p:attrNameLst>
+                                      </p:cBhvr>
+                                      <p:to>
+                                        <p:strVal val="visible"/>
+                                      </p:to>
+                                    </p:set>
+                                  </p:childTnLst>
+                                </p:cTn>
+                              </p:par>
+                            </p:childTnLst>
+                          </p:cTn>
+                        </p:par>
+                      </p:childTnLst>
+                    </p:cTn>
+                  </p:par>
+                  <p:par>
+                    <p:cTn id="17" fill="hold">
+                      <p:stCondLst>
+                        <p:cond delay="indefinite"/>
+                      </p:stCondLst>
+                      <p:childTnLst>
+                        <p:par>
+                          <p:cTn id="18" fill="hold">
+                            <p:stCondLst>
+                              <p:cond delay="0"/>
+                            </p:stCondLst>
+                            <p:childTnLst>
+                              <p:par>
+                                <p:cTn id="19" presetID="1" presetClass="entr" presetSubtype="0" fill="hold" nodeType="clickEffect">
+                                  <p:stCondLst>
+                                    <p:cond delay="0"/>
+                                  </p:stCondLst>
+                                  <p:childTnLst>
+                                    <p:set>
+                                      <p:cBhvr>
+                                        <p:cTn id="20" dur="1" fill="hold">
+                                          <p:stCondLst>
+                                            <p:cond delay="0"/>
+                                          </p:stCondLst>
+                                        </p:cTn>
+                                        <p:tgtEl>
+                                          <p:spTgt spid="4">
+                                            <p:txEl>
+                                              <p:pRg st="3" end="3"/>
+                                            </p:txEl>
+                                          </p:spTgt>
+                                        </p:tgtEl>
+                                        <p:attrNameLst>
+                                          <p:attrName>style.visibility</p:attrName>
+                                        </p:attrNameLst>
+                                      </p:cBhvr>
+                                      <p:to>
+                                        <p:strVal val="visible"/>
+                                      </p:to>
+                                    </p:set>
+                                  </p:childTnLst>
+                                </p:cTn>
+                              </p:par>
+                            </p:childTnLst>
+                          </p:cTn>
+                        </p:par>
+                      </p:childTnLst>
+                    </p:cTn>
+                  </p:par>
+                </p:childTnLst>
+              </p:cTn>
+              <p:prevCondLst>
+                <p:cond evt="onPrev" delay="0">
+                  <p:tgtEl>
+                    <p:sldTgt/>
+                  </p:tgtEl>
+                </p:cond>
+              </p:prevCondLst>
+              <p:nextCondLst>
+                <p:cond evt="onNext" delay="0">
+                  <p:tgtEl>
+                    <p:sldTgt/>
+                  </p:tgtEl>
+                </p:cond>
+              </p:nextCondLst>
+            </p:seq>
+          </p:childTnLst>
+        </p:cTn>
+      </p:par>
+    </p:tnLst>
+  </p:timing>
+</p:sld>
+</file>
+
+<file path=ppt/slides/slide4.xml><?xml version="1.0" encoding="utf-8"?>
+<p:sld xmlns:a="http://schemas.openxmlformats.org/drawingml/2006/main" xmlns:r="http://schemas.openxmlformats.org/officeDocument/2006/relationships" xmlns:p="http://schemas.openxmlformats.org/presentationml/2006/main">
+  <p:cSld>
+    <p:spTree>
+      <p:nvGrpSpPr>
+        <p:cNvPr id="1" name=""/>
+        <p:cNvGrpSpPr/>
+        <p:nvPr/>
+      </p:nvGrpSpPr>
+      <p:grpSpPr>
+        <a:xfrm>
+          <a:off x="0" y="0"/>
+          <a:ext cx="0" cy="0"/>
+          <a:chOff x="0" y="0"/>
+          <a:chExt cx="0" cy="0"/>
+        </a:xfrm>
+      </p:grpSpPr>
+      <p:sp>
+        <p:nvSpPr>
+          <p:cNvPr id="2" name="Title 1">
+            <a:extLst>
+              <a:ext uri="{FF2B5EF4-FFF2-40B4-BE49-F238E27FC236}">
+                <a16:creationId xmlns:a16="http://schemas.microsoft.com/office/drawing/2014/main" id="{71B74674-F17C-E81C-7E18-0C57F02A0D83}"/>
+              </a:ext>
+            </a:extLst>
+          </p:cNvPr>
+          <p:cNvSpPr>
+            <a:spLocks noGrp="1"/>
+          </p:cNvSpPr>
+          <p:nvPr>
+            <p:ph type="title"/>
+          </p:nvPr>
+        </p:nvSpPr>
+        <p:spPr/>
+        <p:txBody>
+          <a:bodyPr/>
+          <a:lstStyle/>
+          <a:p>
+            <a:r>
+              <a:rPr lang="en-US" dirty="0">
+                <a:latin typeface="Times New Roman" panose="02020603050405020304" pitchFamily="18" charset="0"/>
+                <a:cs typeface="Times New Roman" panose="02020603050405020304" pitchFamily="18" charset="0"/>
+              </a:rPr>
+              <a:t>Functional and non-functional requirements </a:t>
+            </a:r>
+          </a:p>
+        </p:txBody>
+      </p:sp>
+      <p:sp>
+        <p:nvSpPr>
+          <p:cNvPr id="4" name="Text Placeholder 3">
+            <a:extLst>
+              <a:ext uri="{FF2B5EF4-FFF2-40B4-BE49-F238E27FC236}">
+                <a16:creationId xmlns:a16="http://schemas.microsoft.com/office/drawing/2014/main" id="{57784313-5DE1-8FD4-0A39-C1F8F175AC3B}"/>
+              </a:ext>
+            </a:extLst>
+          </p:cNvPr>
+          <p:cNvSpPr>
+            <a:spLocks noGrp="1"/>
+          </p:cNvSpPr>
+          <p:nvPr>
+            <p:ph type="body" idx="1"/>
+          </p:nvPr>
+        </p:nvSpPr>
+        <p:spPr/>
+        <p:txBody>
+          <a:bodyPr/>
+          <a:lstStyle/>
+          <a:p>
+            <a:r>
+              <a:rPr lang="en-US" dirty="0">
+                <a:latin typeface="Times New Roman" panose="02020603050405020304" pitchFamily="18" charset="0"/>
+                <a:cs typeface="Times New Roman" panose="02020603050405020304" pitchFamily="18" charset="0"/>
+              </a:rPr>
+              <a:t>Functional</a:t>
+            </a:r>
+          </a:p>
+        </p:txBody>
+      </p:sp>
+      <p:sp>
+        <p:nvSpPr>
+          <p:cNvPr id="5" name="Content Placeholder 4">
+            <a:extLst>
+              <a:ext uri="{FF2B5EF4-FFF2-40B4-BE49-F238E27FC236}">
+                <a16:creationId xmlns:a16="http://schemas.microsoft.com/office/drawing/2014/main" id="{2707647F-B29A-1B68-B626-2DD9207647B5}"/>
+              </a:ext>
+            </a:extLst>
+          </p:cNvPr>
+          <p:cNvSpPr>
+            <a:spLocks noGrp="1"/>
+          </p:cNvSpPr>
+          <p:nvPr>
+            <p:ph sz="half" idx="2"/>
+          </p:nvPr>
+        </p:nvSpPr>
+        <p:spPr/>
+        <p:txBody>
+          <a:bodyPr>
+            <a:normAutofit fontScale="85000" lnSpcReduction="10000"/>
+          </a:bodyPr>
+          <a:lstStyle/>
+          <a:p>
+            <a:r>
+              <a:rPr lang="en-US" b="1" dirty="0">
+                <a:latin typeface="Times New Roman" panose="02020603050405020304" pitchFamily="18" charset="0"/>
+                <a:cs typeface="Times New Roman" panose="02020603050405020304" pitchFamily="18" charset="0"/>
+              </a:rPr>
+              <a:t>Sign in/out</a:t>
+            </a:r>
+          </a:p>
+          <a:p>
+            <a:r>
+              <a:rPr lang="en-US" b="1" dirty="0">
+                <a:latin typeface="Times New Roman" panose="02020603050405020304" pitchFamily="18" charset="0"/>
+                <a:cs typeface="Times New Roman" panose="02020603050405020304" pitchFamily="18" charset="0"/>
+              </a:rPr>
+              <a:t>Log sign ins/outs</a:t>
+            </a:r>
+          </a:p>
+          <a:p>
+            <a:r>
+              <a:rPr lang="en-US" b="1" dirty="0">
+                <a:latin typeface="Times New Roman" panose="02020603050405020304" pitchFamily="18" charset="0"/>
+                <a:cs typeface="Times New Roman" panose="02020603050405020304" pitchFamily="18" charset="0"/>
+              </a:rPr>
+              <a:t>Change user information</a:t>
+            </a:r>
+          </a:p>
+          <a:p>
+            <a:r>
+              <a:rPr lang="en-US" b="1" dirty="0">
+                <a:latin typeface="Times New Roman" panose="02020603050405020304" pitchFamily="18" charset="0"/>
+                <a:cs typeface="Times New Roman" panose="02020603050405020304" pitchFamily="18" charset="0"/>
+              </a:rPr>
+              <a:t>Add patients </a:t>
+            </a:r>
+          </a:p>
+          <a:p>
+            <a:r>
+              <a:rPr lang="en-US" b="1" dirty="0">
+                <a:latin typeface="Times New Roman" panose="02020603050405020304" pitchFamily="18" charset="0"/>
+                <a:cs typeface="Times New Roman" panose="02020603050405020304" pitchFamily="18" charset="0"/>
+              </a:rPr>
+              <a:t>Book appointments  </a:t>
+            </a:r>
+          </a:p>
+          <a:p>
+            <a:r>
+              <a:rPr lang="en-US" b="1" dirty="0">
+                <a:latin typeface="Times New Roman" panose="02020603050405020304" pitchFamily="18" charset="0"/>
+                <a:cs typeface="Times New Roman" panose="02020603050405020304" pitchFamily="18" charset="0"/>
+              </a:rPr>
+              <a:t>Make sure approximants don’t overlap by doctor or time </a:t>
+            </a:r>
+          </a:p>
+          <a:p>
+            <a:endParaRPr lang="en-US" dirty="0"/>
+          </a:p>
+        </p:txBody>
+      </p:sp>
+      <p:sp>
+        <p:nvSpPr>
+          <p:cNvPr id="6" name="Text Placeholder 5">
+            <a:extLst>
+              <a:ext uri="{FF2B5EF4-FFF2-40B4-BE49-F238E27FC236}">
+                <a16:creationId xmlns:a16="http://schemas.microsoft.com/office/drawing/2014/main" id="{5A63CA33-0747-A904-00B0-B36AC5FE3DFC}"/>
+              </a:ext>
+            </a:extLst>
+          </p:cNvPr>
+          <p:cNvSpPr>
+            <a:spLocks noGrp="1"/>
+          </p:cNvSpPr>
+          <p:nvPr>
+            <p:ph type="body" sz="quarter" idx="3"/>
+          </p:nvPr>
+        </p:nvSpPr>
+        <p:spPr/>
+        <p:txBody>
+          <a:bodyPr/>
+          <a:lstStyle/>
+          <a:p>
+            <a:r>
+              <a:rPr lang="en-US" dirty="0">
+                <a:latin typeface="Times New Roman" panose="02020603050405020304" pitchFamily="18" charset="0"/>
+                <a:cs typeface="Times New Roman" panose="02020603050405020304" pitchFamily="18" charset="0"/>
+              </a:rPr>
+              <a:t>Non-functional</a:t>
+            </a:r>
+          </a:p>
+        </p:txBody>
+      </p:sp>
+      <p:sp>
+        <p:nvSpPr>
+          <p:cNvPr id="7" name="Content Placeholder 6">
+            <a:extLst>
+              <a:ext uri="{FF2B5EF4-FFF2-40B4-BE49-F238E27FC236}">
+                <a16:creationId xmlns:a16="http://schemas.microsoft.com/office/drawing/2014/main" id="{9C25039A-7614-3893-BA3C-FFBA81DCD93D}"/>
+              </a:ext>
+            </a:extLst>
+          </p:cNvPr>
+          <p:cNvSpPr>
+            <a:spLocks noGrp="1"/>
+          </p:cNvSpPr>
+          <p:nvPr>
+            <p:ph sz="quarter" idx="4"/>
+          </p:nvPr>
+        </p:nvSpPr>
+        <p:spPr/>
+        <p:txBody>
+          <a:bodyPr>
+            <a:normAutofit fontScale="85000" lnSpcReduction="10000"/>
+          </a:bodyPr>
+          <a:lstStyle/>
+          <a:p>
+            <a:r>
+              <a:rPr lang="en-US" b="1" dirty="0">
+                <a:latin typeface="Times New Roman" panose="02020603050405020304" pitchFamily="18" charset="0"/>
+                <a:cs typeface="Times New Roman" panose="02020603050405020304" pitchFamily="18" charset="0"/>
+              </a:rPr>
+              <a:t>Look and feel requirements :</a:t>
+            </a:r>
+          </a:p>
+          <a:p>
+            <a:pPr lvl="1"/>
+            <a:r>
+              <a:rPr lang="en-US" sz="1800" b="0" dirty="0">
+                <a:latin typeface="Times New Roman" panose="02020603050405020304" pitchFamily="18" charset="0"/>
+                <a:cs typeface="Times New Roman" panose="02020603050405020304" pitchFamily="18" charset="0"/>
+              </a:rPr>
+              <a:t>The Application should give clear and straightforward feedback to the</a:t>
+            </a:r>
+          </a:p>
+          <a:p>
+            <a:r>
+              <a:rPr lang="en-US" b="1" dirty="0">
+                <a:latin typeface="Times New Roman" panose="02020603050405020304" pitchFamily="18" charset="0"/>
+                <a:cs typeface="Times New Roman" panose="02020603050405020304" pitchFamily="18" charset="0"/>
+              </a:rPr>
+              <a:t> Usability requirements : </a:t>
+            </a:r>
+          </a:p>
+          <a:p>
+            <a:pPr lvl="1"/>
+            <a:r>
+              <a:rPr lang="en-US" sz="1800" b="0" dirty="0">
+                <a:latin typeface="Times New Roman" panose="02020603050405020304" pitchFamily="18" charset="0"/>
+                <a:cs typeface="Times New Roman" panose="02020603050405020304" pitchFamily="18" charset="0"/>
+              </a:rPr>
+              <a:t>The application should be easy to use and have clear interfaces to make sure the user does not get confused or frustrated.</a:t>
+            </a:r>
+          </a:p>
+          <a:p>
+            <a:r>
+              <a:rPr lang="en-US" b="1" dirty="0">
+                <a:latin typeface="Times New Roman" panose="02020603050405020304" pitchFamily="18" charset="0"/>
+                <a:cs typeface="Times New Roman" panose="02020603050405020304" pitchFamily="18" charset="0"/>
+              </a:rPr>
+              <a:t>Security requirements :</a:t>
+            </a:r>
+          </a:p>
+          <a:p>
+            <a:pPr lvl="1"/>
+            <a:r>
+              <a:rPr lang="en-US" sz="1800" b="0" dirty="0">
+                <a:latin typeface="Times New Roman" panose="02020603050405020304" pitchFamily="18" charset="0"/>
+                <a:cs typeface="Times New Roman" panose="02020603050405020304" pitchFamily="18" charset="0"/>
+              </a:rPr>
+              <a:t>Users should not have the ability to see interfaces they do not have permission for example receptionist should not have the ability to complete the operations that the manger has the rights to.</a:t>
+            </a:r>
+          </a:p>
+          <a:p>
+            <a:endParaRPr lang="en-US" sz="1400" b="0" dirty="0">
+              <a:latin typeface="Times New Roman" panose="02020603050405020304" pitchFamily="18" charset="0"/>
+              <a:cs typeface="Times New Roman" panose="02020603050405020304" pitchFamily="18" charset="0"/>
+            </a:endParaRPr>
+          </a:p>
+          <a:p>
+            <a:endParaRPr lang="en-US" sz="1400" b="0" dirty="0"/>
+          </a:p>
+          <a:p>
+            <a:pPr marL="514350" indent="-285750"/>
+            <a:endParaRPr lang="en-US" sz="1600" b="0" dirty="0"/>
+          </a:p>
+        </p:txBody>
+      </p:sp>
+    </p:spTree>
+    <p:extLst>
+      <p:ext uri="{BB962C8B-B14F-4D97-AF65-F5344CB8AC3E}">
+        <p14:creationId xmlns:p14="http://schemas.microsoft.com/office/powerpoint/2010/main" val="3940938437"/>
+      </p:ext>
+    </p:extLst>
+  </p:cSld>
+  <p:clrMapOvr>
+    <a:masterClrMapping/>
+  </p:clrMapOvr>
+  <p:timing>
+    <p:tnLst>
+      <p:par>
+        <p:cTn id="1" dur="indefinite" restart="never" nodeType="tmRoot">
+          <p:childTnLst>
+            <p:seq concurrent="1" nextAc="seek">
+              <p:cTn id="2" dur="indefinite" nodeType="mainSeq">
+                <p:childTnLst>
+                  <p:par>
+                    <p:cTn id="3" fill="hold">
+                      <p:stCondLst>
+                        <p:cond delay="indefinite"/>
+                      </p:stCondLst>
+                      <p:childTnLst>
+                        <p:par>
+                          <p:cTn id="4" fill="hold">
+                            <p:stCondLst>
+                              <p:cond delay="0"/>
+                            </p:stCondLst>
+                            <p:childTnLst>
+                              <p:par>
+                                <p:cTn id="5" presetID="1" presetClass="entr" presetSubtype="0" fill="hold" grpId="0" nodeType="clickEffect">
+                                  <p:stCondLst>
+                                    <p:cond delay="0"/>
+                                  </p:stCondLst>
+                                  <p:childTnLst>
+                                    <p:set>
+                                      <p:cBhvr>
+                                        <p:cTn id="6" dur="1" fill="hold">
+                                          <p:stCondLst>
+                                            <p:cond delay="0"/>
+                                          </p:stCondLst>
+                                        </p:cTn>
+                                        <p:tgtEl>
+                                          <p:spTgt spid="4">
+                                            <p:txEl>
+                                              <p:pRg st="0" end="0"/>
+                                            </p:txEl>
+                                          </p:spTgt>
+                                        </p:tgtEl>
+                                        <p:attrNameLst>
+                                          <p:attrName>style.visibility</p:attrName>
+                                        </p:attrNameLst>
+                                      </p:cBhvr>
+                                      <p:to>
+                                        <p:strVal val="visible"/>
+                                      </p:to>
+                                    </p:set>
+                                  </p:childTnLst>
+                                </p:cTn>
+                              </p:par>
+                            </p:childTnLst>
+                          </p:cTn>
+                        </p:par>
+                      </p:childTnLst>
+                    </p:cTn>
+                  </p:par>
+                  <p:par>
+                    <p:cTn id="7" fill="hold">
+                      <p:stCondLst>
+                        <p:cond delay="indefinite"/>
+                      </p:stCondLst>
+                      <p:childTnLst>
+                        <p:par>
+                          <p:cTn id="8" fill="hold">
+                            <p:stCondLst>
+                              <p:cond delay="0"/>
+                            </p:stCondLst>
+                            <p:childTnLst>
+                              <p:par>
+                                <p:cTn id="9" presetID="1" presetClass="entr" presetSubtype="0" fill="hold" nodeType="clickEffect">
+                                  <p:stCondLst>
+                                    <p:cond delay="0"/>
+                                  </p:stCondLst>
+                                  <p:childTnLst>
+                                    <p:set>
+                                      <p:cBhvr>
+                                        <p:cTn id="10" dur="1" fill="hold">
+                                          <p:stCondLst>
+                                            <p:cond delay="0"/>
+                                          </p:stCondLst>
+                                        </p:cTn>
+                                        <p:tgtEl>
+                                          <p:spTgt spid="5">
+                                            <p:txEl>
+                                              <p:pRg st="0" end="0"/>
+                                            </p:txEl>
+                                          </p:spTgt>
+                                        </p:tgtEl>
+                                        <p:attrNameLst>
+                                          <p:attrName>style.visibility</p:attrName>
+                                        </p:attrNameLst>
+                                      </p:cBhvr>
+                                      <p:to>
+                                        <p:strVal val="visible"/>
+                                      </p:to>
+                                    </p:set>
+                                  </p:childTnLst>
+                                </p:cTn>
+                              </p:par>
+                            </p:childTnLst>
+                          </p:cTn>
+                        </p:par>
+                      </p:childTnLst>
+                    </p:cTn>
+                  </p:par>
+                  <p:par>
+                    <p:cTn id="11" fill="hold">
+                      <p:stCondLst>
+                        <p:cond delay="indefinite"/>
+                      </p:stCondLst>
+                      <p:childTnLst>
+                        <p:par>
+                          <p:cTn id="12" fill="hold">
+                            <p:stCondLst>
+                              <p:cond delay="0"/>
+                            </p:stCondLst>
+                            <p:childTnLst>
+                              <p:par>
+                                <p:cTn id="13" presetID="1" presetClass="entr" presetSubtype="0" fill="hold" nodeType="clickEffect">
+                                  <p:stCondLst>
+                                    <p:cond delay="0"/>
+                                  </p:stCondLst>
+                                  <p:childTnLst>
+                                    <p:set>
+                                      <p:cBhvr>
+                                        <p:cTn id="14" dur="1" fill="hold">
+                                          <p:stCondLst>
+                                            <p:cond delay="0"/>
+                                          </p:stCondLst>
+                                        </p:cTn>
+                                        <p:tgtEl>
+                                          <p:spTgt spid="5">
+                                            <p:txEl>
+                                              <p:pRg st="1" end="1"/>
+                                            </p:txEl>
+                                          </p:spTgt>
+                                        </p:tgtEl>
+                                        <p:attrNameLst>
+                                          <p:attrName>style.visibility</p:attrName>
+                                        </p:attrNameLst>
+                                      </p:cBhvr>
+                                      <p:to>
+                                        <p:strVal val="visible"/>
+                                      </p:to>
+                                    </p:set>
+                                  </p:childTnLst>
+                                </p:cTn>
+                              </p:par>
+                            </p:childTnLst>
+                          </p:cTn>
+                        </p:par>
+                      </p:childTnLst>
+                    </p:cTn>
+                  </p:par>
+                  <p:par>
+                    <p:cTn id="15" fill="hold">
+                      <p:stCondLst>
+                        <p:cond delay="indefinite"/>
+                      </p:stCondLst>
+                      <p:childTnLst>
+                        <p:par>
+                          <p:cTn id="16" fill="hold">
+                            <p:stCondLst>
+                              <p:cond delay="0"/>
+                            </p:stCondLst>
+                            <p:childTnLst>
+                              <p:par>
+                                <p:cTn id="17" presetID="1" presetClass="entr" presetSubtype="0" fill="hold" nodeType="clickEffect">
+                                  <p:stCondLst>
+                                    <p:cond delay="0"/>
+                                  </p:stCondLst>
+                                  <p:childTnLst>
+                                    <p:set>
+                                      <p:cBhvr>
+                                        <p:cTn id="18" dur="1" fill="hold">
+                                          <p:stCondLst>
+                                            <p:cond delay="0"/>
+                                          </p:stCondLst>
+                                        </p:cTn>
+                                        <p:tgtEl>
+                                          <p:spTgt spid="5">
+                                            <p:txEl>
+                                              <p:pRg st="2" end="2"/>
+                                            </p:txEl>
+                                          </p:spTgt>
+                                        </p:tgtEl>
+                                        <p:attrNameLst>
+                                          <p:attrName>style.visibility</p:attrName>
+                                        </p:attrNameLst>
+                                      </p:cBhvr>
+                                      <p:to>
+                                        <p:strVal val="visible"/>
+                                      </p:to>
+                                    </p:set>
+                                  </p:childTnLst>
+                                </p:cTn>
+                              </p:par>
+                            </p:childTnLst>
+                          </p:cTn>
+                        </p:par>
+                      </p:childTnLst>
+                    </p:cTn>
+                  </p:par>
+                  <p:par>
+                    <p:cTn id="19" fill="hold">
+                      <p:stCondLst>
+                        <p:cond delay="indefinite"/>
+                      </p:stCondLst>
+                      <p:childTnLst>
+                        <p:par>
+                          <p:cTn id="20" fill="hold">
+                            <p:stCondLst>
+                              <p:cond delay="0"/>
+                            </p:stCondLst>
+                            <p:childTnLst>
+                              <p:par>
+                                <p:cTn id="21" presetID="1" presetClass="entr" presetSubtype="0" fill="hold" nodeType="clickEffect">
+                                  <p:stCondLst>
+                                    <p:cond delay="0"/>
+                                  </p:stCondLst>
+                                  <p:childTnLst>
+                                    <p:set>
+                                      <p:cBhvr>
+                                        <p:cTn id="22" dur="1" fill="hold">
+                                          <p:stCondLst>
+                                            <p:cond delay="0"/>
+                                          </p:stCondLst>
+                                        </p:cTn>
+                                        <p:tgtEl>
+                                          <p:spTgt spid="5">
+                                            <p:txEl>
+                                              <p:pRg st="3" end="3"/>
+                                            </p:txEl>
+                                          </p:spTgt>
+                                        </p:tgtEl>
+                                        <p:attrNameLst>
+                                          <p:attrName>style.visibility</p:attrName>
+                                        </p:attrNameLst>
+                                      </p:cBhvr>
+                                      <p:to>
+                                        <p:strVal val="visible"/>
+                                      </p:to>
+                                    </p:set>
+                                  </p:childTnLst>
+                                </p:cTn>
+                              </p:par>
+                            </p:childTnLst>
+                          </p:cTn>
+                        </p:par>
+                      </p:childTnLst>
+                    </p:cTn>
+                  </p:par>
+                  <p:par>
+                    <p:cTn id="23" fill="hold">
+                      <p:stCondLst>
+                        <p:cond delay="indefinite"/>
+                      </p:stCondLst>
+                      <p:childTnLst>
+                        <p:par>
+                          <p:cTn id="24" fill="hold">
+                            <p:stCondLst>
+                              <p:cond delay="0"/>
+                            </p:stCondLst>
+                            <p:childTnLst>
+                              <p:par>
+                                <p:cTn id="25" presetID="1" presetClass="entr" presetSubtype="0" fill="hold" nodeType="clickEffect">
+                                  <p:stCondLst>
+                                    <p:cond delay="0"/>
+                                  </p:stCondLst>
+                                  <p:childTnLst>
+                                    <p:set>
+                                      <p:cBhvr>
+                                        <p:cTn id="26" dur="1" fill="hold">
+                                          <p:stCondLst>
+                                            <p:cond delay="0"/>
+                                          </p:stCondLst>
+                                        </p:cTn>
+                                        <p:tgtEl>
+                                          <p:spTgt spid="5">
+                                            <p:txEl>
+                                              <p:pRg st="4" end="4"/>
+                                            </p:txEl>
+                                          </p:spTgt>
+                                        </p:tgtEl>
+                                        <p:attrNameLst>
+                                          <p:attrName>style.visibility</p:attrName>
+                                        </p:attrNameLst>
+                                      </p:cBhvr>
+                                      <p:to>
+                                        <p:strVal val="visible"/>
+                                      </p:to>
+                                    </p:set>
+                                  </p:childTnLst>
+                                </p:cTn>
+                              </p:par>
+                            </p:childTnLst>
+                          </p:cTn>
+                        </p:par>
+                      </p:childTnLst>
+                    </p:cTn>
+                  </p:par>
+                  <p:par>
+                    <p:cTn id="27" fill="hold">
+                      <p:stCondLst>
+                        <p:cond delay="indefinite"/>
+                      </p:stCondLst>
+                      <p:childTnLst>
+                        <p:par>
+                          <p:cTn id="28" fill="hold">
+                            <p:stCondLst>
+                              <p:cond delay="0"/>
+                            </p:stCondLst>
+                            <p:childTnLst>
+                              <p:par>
+                                <p:cTn id="29" presetID="1" presetClass="entr" presetSubtype="0" fill="hold" nodeType="clickEffect">
+                                  <p:stCondLst>
+                                    <p:cond delay="0"/>
+                                  </p:stCondLst>
+                                  <p:childTnLst>
+                                    <p:set>
+                                      <p:cBhvr>
+                                        <p:cTn id="30" dur="1" fill="hold">
+                                          <p:stCondLst>
+                                            <p:cond delay="0"/>
+                                          </p:stCondLst>
+                                        </p:cTn>
+                                        <p:tgtEl>
+                                          <p:spTgt spid="5">
+                                            <p:txEl>
+                                              <p:pRg st="5" end="5"/>
+                                            </p:txEl>
+                                          </p:spTgt>
+                                        </p:tgtEl>
+                                        <p:attrNameLst>
+                                          <p:attrName>style.visibility</p:attrName>
+                                        </p:attrNameLst>
+                                      </p:cBhvr>
+                                      <p:to>
+                                        <p:strVal val="visible"/>
+                                      </p:to>
+                                    </p:set>
+                                  </p:childTnLst>
+                                </p:cTn>
+                              </p:par>
+                            </p:childTnLst>
+                          </p:cTn>
+                        </p:par>
+                      </p:childTnLst>
+                    </p:cTn>
+                  </p:par>
+                  <p:par>
+                    <p:cTn id="31" fill="hold">
+                      <p:stCondLst>
+                        <p:cond delay="indefinite"/>
+                      </p:stCondLst>
+                      <p:childTnLst>
+                        <p:par>
+                          <p:cTn id="32" fill="hold">
+                            <p:stCondLst>
+                              <p:cond delay="0"/>
+                            </p:stCondLst>
+                            <p:childTnLst>
+                              <p:par>
+                                <p:cTn id="33" presetID="1" presetClass="entr" presetSubtype="0" fill="hold" nodeType="clickEffect">
+                                  <p:stCondLst>
+                                    <p:cond delay="0"/>
+                                  </p:stCondLst>
+                                  <p:childTnLst>
+                                    <p:set>
+                                      <p:cBhvr>
+                                        <p:cTn id="34" dur="1" fill="hold">
+                                          <p:stCondLst>
+                                            <p:cond delay="0"/>
+                                          </p:stCondLst>
+                                        </p:cTn>
+                                        <p:tgtEl>
+                                          <p:spTgt spid="6">
+                                            <p:txEl>
+                                              <p:pRg st="0" end="0"/>
+                                            </p:txEl>
+                                          </p:spTgt>
+                                        </p:tgtEl>
+                                        <p:attrNameLst>
+                                          <p:attrName>style.visibility</p:attrName>
+                                        </p:attrNameLst>
+                                      </p:cBhvr>
+                                      <p:to>
+                                        <p:strVal val="visible"/>
+                                      </p:to>
+                                    </p:set>
+                                  </p:childTnLst>
+                                </p:cTn>
+                              </p:par>
+                            </p:childTnLst>
+                          </p:cTn>
+                        </p:par>
+                      </p:childTnLst>
+                    </p:cTn>
+                  </p:par>
+                  <p:par>
+                    <p:cTn id="35" fill="hold">
+                      <p:stCondLst>
+                        <p:cond delay="indefinite"/>
+                      </p:stCondLst>
+                      <p:childTnLst>
+                        <p:par>
+                          <p:cTn id="36" fill="hold">
+                            <p:stCondLst>
+                              <p:cond delay="0"/>
+                            </p:stCondLst>
+                            <p:childTnLst>
+                              <p:par>
+                                <p:cTn id="37" presetID="1" presetClass="entr" presetSubtype="0" fill="hold" nodeType="clickEffect">
+                                  <p:stCondLst>
+                                    <p:cond delay="0"/>
+                                  </p:stCondLst>
+                                  <p:childTnLst>
+                                    <p:set>
+                                      <p:cBhvr>
+                                        <p:cTn id="38" dur="1" fill="hold">
+                                          <p:stCondLst>
+                                            <p:cond delay="0"/>
+                                          </p:stCondLst>
+                                        </p:cTn>
+                                        <p:tgtEl>
+                                          <p:spTgt spid="7">
+                                            <p:txEl>
+                                              <p:pRg st="0" end="0"/>
+                                            </p:txEl>
+                                          </p:spTgt>
+                                        </p:tgtEl>
+                                        <p:attrNameLst>
+                                          <p:attrName>style.visibility</p:attrName>
+                                        </p:attrNameLst>
+                                      </p:cBhvr>
+                                      <p:to>
+                                        <p:strVal val="visible"/>
+                                      </p:to>
+                                    </p:set>
+                                  </p:childTnLst>
+                                </p:cTn>
+                              </p:par>
+                              <p:par>
+                                <p:cTn id="39" presetID="1" presetClass="entr" presetSubtype="0" fill="hold" nodeType="withEffect">
+                                  <p:stCondLst>
+                                    <p:cond delay="0"/>
+                                  </p:stCondLst>
+                                  <p:childTnLst>
+                                    <p:set>
+                                      <p:cBhvr>
+                                        <p:cTn id="40" dur="1" fill="hold">
+                                          <p:stCondLst>
+                                            <p:cond delay="0"/>
+                                          </p:stCondLst>
+                                        </p:cTn>
+                                        <p:tgtEl>
+                                          <p:spTgt spid="7">
+                                            <p:txEl>
+                                              <p:pRg st="1" end="1"/>
+                                            </p:txEl>
+                                          </p:spTgt>
+                                        </p:tgtEl>
+                                        <p:attrNameLst>
+                                          <p:attrName>style.visibility</p:attrName>
+                                        </p:attrNameLst>
+                                      </p:cBhvr>
+                                      <p:to>
+                                        <p:strVal val="visible"/>
+                                      </p:to>
+                                    </p:set>
+                                  </p:childTnLst>
+                                </p:cTn>
+                              </p:par>
+                            </p:childTnLst>
+                          </p:cTn>
+                        </p:par>
+                      </p:childTnLst>
+                    </p:cTn>
+                  </p:par>
+                  <p:par>
+                    <p:cTn id="41" fill="hold">
+                      <p:stCondLst>
+                        <p:cond delay="indefinite"/>
+                      </p:stCondLst>
+                      <p:childTnLst>
+                        <p:par>
+                          <p:cTn id="42" fill="hold">
+                            <p:stCondLst>
+                              <p:cond delay="0"/>
+                            </p:stCondLst>
+                            <p:childTnLst>
+                              <p:par>
+                                <p:cTn id="43" presetID="1" presetClass="entr" presetSubtype="0" fill="hold" nodeType="clickEffect">
+                                  <p:stCondLst>
+                                    <p:cond delay="0"/>
+                                  </p:stCondLst>
+                                  <p:childTnLst>
+                                    <p:set>
+                                      <p:cBhvr>
+                                        <p:cTn id="44" dur="1" fill="hold">
+                                          <p:stCondLst>
+                                            <p:cond delay="0"/>
+                                          </p:stCondLst>
+                                        </p:cTn>
+                                        <p:tgtEl>
+                                          <p:spTgt spid="7">
+                                            <p:txEl>
+                                              <p:pRg st="2" end="2"/>
+                                            </p:txEl>
+                                          </p:spTgt>
+                                        </p:tgtEl>
+                                        <p:attrNameLst>
+                                          <p:attrName>style.visibility</p:attrName>
+                                        </p:attrNameLst>
+                                      </p:cBhvr>
+                                      <p:to>
+                                        <p:strVal val="visible"/>
+                                      </p:to>
+                                    </p:set>
+                                  </p:childTnLst>
+                                </p:cTn>
+                              </p:par>
+                              <p:par>
+                                <p:cTn id="45" presetID="1" presetClass="entr" presetSubtype="0" fill="hold" nodeType="withEffect">
+                                  <p:stCondLst>
+                                    <p:cond delay="0"/>
+                                  </p:stCondLst>
+                                  <p:childTnLst>
+                                    <p:set>
+                                      <p:cBhvr>
+                                        <p:cTn id="46" dur="1" fill="hold">
+                                          <p:stCondLst>
+                                            <p:cond delay="0"/>
+                                          </p:stCondLst>
+                                        </p:cTn>
+                                        <p:tgtEl>
+                                          <p:spTgt spid="7">
+                                            <p:txEl>
+                                              <p:pRg st="3" end="3"/>
+                                            </p:txEl>
+                                          </p:spTgt>
+                                        </p:tgtEl>
+                                        <p:attrNameLst>
+                                          <p:attrName>style.visibility</p:attrName>
+                                        </p:attrNameLst>
+                                      </p:cBhvr>
+                                      <p:to>
+                                        <p:strVal val="visible"/>
+                                      </p:to>
+                                    </p:set>
+                                  </p:childTnLst>
+                                </p:cTn>
+                              </p:par>
+                            </p:childTnLst>
+                          </p:cTn>
+                        </p:par>
+                      </p:childTnLst>
+                    </p:cTn>
+                  </p:par>
+                  <p:par>
+                    <p:cTn id="47" fill="hold">
+                      <p:stCondLst>
+                        <p:cond delay="indefinite"/>
+                      </p:stCondLst>
+                      <p:childTnLst>
+                        <p:par>
+                          <p:cTn id="48" fill="hold">
+                            <p:stCondLst>
+                              <p:cond delay="0"/>
+                            </p:stCondLst>
+                            <p:childTnLst>
+                              <p:par>
+                                <p:cTn id="49" presetID="1" presetClass="entr" presetSubtype="0" fill="hold" nodeType="clickEffect">
+                                  <p:stCondLst>
+                                    <p:cond delay="0"/>
+                                  </p:stCondLst>
+                                  <p:childTnLst>
+                                    <p:set>
+                                      <p:cBhvr>
+                                        <p:cTn id="50" dur="1" fill="hold">
+                                          <p:stCondLst>
+                                            <p:cond delay="0"/>
+                                          </p:stCondLst>
+                                        </p:cTn>
+                                        <p:tgtEl>
+                                          <p:spTgt spid="7">
+                                            <p:txEl>
+                                              <p:pRg st="4" end="4"/>
+                                            </p:txEl>
+                                          </p:spTgt>
+                                        </p:tgtEl>
+                                        <p:attrNameLst>
+                                          <p:attrName>style.visibility</p:attrName>
+                                        </p:attrNameLst>
+                                      </p:cBhvr>
+                                      <p:to>
+                                        <p:strVal val="visible"/>
+                                      </p:to>
+                                    </p:set>
+                                  </p:childTnLst>
+                                </p:cTn>
+                              </p:par>
+                              <p:par>
+                                <p:cTn id="51" presetID="1" presetClass="entr" presetSubtype="0" fill="hold" nodeType="withEffect">
+                                  <p:stCondLst>
+                                    <p:cond delay="0"/>
+                                  </p:stCondLst>
+                                  <p:childTnLst>
+                                    <p:set>
+                                      <p:cBhvr>
+                                        <p:cTn id="52" dur="1" fill="hold">
+                                          <p:stCondLst>
+                                            <p:cond delay="0"/>
+                                          </p:stCondLst>
+                                        </p:cTn>
+                                        <p:tgtEl>
+                                          <p:spTgt spid="7">
+                                            <p:txEl>
+                                              <p:pRg st="5" end="5"/>
+                                            </p:txEl>
+                                          </p:spTgt>
+                                        </p:tgtEl>
+                                        <p:attrNameLst>
+                                          <p:attrName>style.visibility</p:attrName>
+                                        </p:attrNameLst>
+                                      </p:cBhvr>
+                                      <p:to>
+                                        <p:strVal val="visible"/>
+                                      </p:to>
+                                    </p:set>
+                                  </p:childTnLst>
+                                </p:cTn>
+                              </p:par>
+                            </p:childTnLst>
+                          </p:cTn>
+                        </p:par>
+                      </p:childTnLst>
+                    </p:cTn>
+                  </p:par>
+                </p:childTnLst>
+              </p:cTn>
+              <p:prevCondLst>
+                <p:cond evt="onPrev" delay="0">
+                  <p:tgtEl>
+                    <p:sldTgt/>
+                  </p:tgtEl>
+                </p:cond>
+              </p:prevCondLst>
+              <p:nextCondLst>
+                <p:cond evt="onNext" delay="0">
+                  <p:tgtEl>
+                    <p:sldTgt/>
+                  </p:tgtEl>
+                </p:cond>
+              </p:nextCondLst>
+            </p:seq>
+          </p:childTnLst>
+        </p:cTn>
+      </p:par>
+    </p:tnLst>
+    <p:bldLst>
+      <p:bldP spid="4" grpId="0" build="p"/>
+    </p:bldLst>
+  </p:timing>
+</p:sld>
+</file>
+
+<file path=ppt/slides/slide5.xml><?xml version="1.0" encoding="utf-8"?>
+<p:sld xmlns:a="http://schemas.openxmlformats.org/drawingml/2006/main" xmlns:r="http://schemas.openxmlformats.org/officeDocument/2006/relationships" xmlns:p="http://schemas.openxmlformats.org/presentationml/2006/main">
+  <p:cSld>
+    <p:spTree>
+      <p:nvGrpSpPr>
+        <p:cNvPr id="1" name=""/>
+        <p:cNvGrpSpPr/>
+        <p:nvPr/>
+      </p:nvGrpSpPr>
+      <p:grpSpPr>
+        <a:xfrm>
+          <a:off x="0" y="0"/>
+          <a:ext cx="0" cy="0"/>
+          <a:chOff x="0" y="0"/>
+          <a:chExt cx="0" cy="0"/>
+        </a:xfrm>
+      </p:grpSpPr>
+      <p:sp>
+        <p:nvSpPr>
+          <p:cNvPr id="7" name="Title 6">
+            <a:extLst>
+              <a:ext uri="{FF2B5EF4-FFF2-40B4-BE49-F238E27FC236}">
+                <a16:creationId xmlns:a16="http://schemas.microsoft.com/office/drawing/2014/main" id="{FECBF98C-8CF3-94FE-FA6C-3554777F30B1}"/>
+              </a:ext>
+            </a:extLst>
+          </p:cNvPr>
+          <p:cNvSpPr>
+            <a:spLocks noGrp="1"/>
+          </p:cNvSpPr>
+          <p:nvPr>
+            <p:ph type="title"/>
+          </p:nvPr>
+        </p:nvSpPr>
+        <p:spPr/>
+        <p:txBody>
+          <a:bodyPr/>
+          <a:lstStyle/>
+          <a:p>
+            <a:r>
+              <a:rPr lang="en-US" dirty="0"/>
+              <a:t>Design Considerations </a:t>
+            </a:r>
+          </a:p>
+        </p:txBody>
+      </p:sp>
+      <p:sp>
+        <p:nvSpPr>
+          <p:cNvPr id="8" name="Content Placeholder 7">
+            <a:extLst>
+              <a:ext uri="{FF2B5EF4-FFF2-40B4-BE49-F238E27FC236}">
+                <a16:creationId xmlns:a16="http://schemas.microsoft.com/office/drawing/2014/main" id="{6D2446A3-35B6-7F60-A97D-E56D793393E8}"/>
+              </a:ext>
+            </a:extLst>
+          </p:cNvPr>
+          <p:cNvSpPr>
+            <a:spLocks noGrp="1"/>
+          </p:cNvSpPr>
+          <p:nvPr>
+            <p:ph idx="1"/>
+          </p:nvPr>
+        </p:nvSpPr>
+        <p:spPr/>
+        <p:txBody>
+          <a:bodyPr/>
+          <a:lstStyle/>
+          <a:p>
+            <a:r>
+              <a:rPr lang="en-US" b="1" dirty="0">
+                <a:latin typeface="Times New Roman" panose="02020603050405020304" pitchFamily="18" charset="0"/>
+                <a:cs typeface="Times New Roman" panose="02020603050405020304" pitchFamily="18" charset="0"/>
+              </a:rPr>
+              <a:t>Software environment :</a:t>
+            </a:r>
+          </a:p>
+          <a:p>
+            <a:pPr marL="560070" lvl="1" indent="-285750">
+              <a:buFont typeface="Arial" panose="020B0604020202020204" pitchFamily="34" charset="0"/>
+              <a:buChar char="•"/>
+            </a:pPr>
+            <a:r>
+              <a:rPr lang="en-US" b="0" dirty="0">
+                <a:solidFill>
+                  <a:srgbClr val="000000"/>
+                </a:solidFill>
+                <a:effectLst/>
+                <a:latin typeface="Times New Roman" panose="02020603050405020304" pitchFamily="18" charset="0"/>
+                <a:ea typeface="Calibri" panose="020F0502020204030204" pitchFamily="34" charset="0"/>
+                <a:cs typeface="Times New Roman" panose="02020603050405020304" pitchFamily="18" charset="0"/>
+              </a:rPr>
+              <a:t>JavaFX</a:t>
+            </a:r>
+            <a:endParaRPr lang="en-US" b="0" dirty="0">
+              <a:solidFill>
+                <a:srgbClr val="000000"/>
+              </a:solidFill>
+              <a:effectLst/>
+              <a:latin typeface="Times New Roman" panose="02020603050405020304" pitchFamily="18" charset="0"/>
+              <a:ea typeface="Calibri" panose="020F0502020204030204" pitchFamily="34" charset="0"/>
+            </a:endParaRPr>
+          </a:p>
+          <a:p>
+            <a:pPr marL="560070" lvl="1" indent="-285750">
+              <a:buFont typeface="Arial" panose="020B0604020202020204" pitchFamily="34" charset="0"/>
+              <a:buChar char="•"/>
+            </a:pPr>
+            <a:r>
+              <a:rPr lang="en-US" b="0" dirty="0">
+                <a:latin typeface="Times New Roman" panose="02020603050405020304" pitchFamily="18" charset="0"/>
+                <a:cs typeface="Times New Roman" panose="02020603050405020304" pitchFamily="18" charset="0"/>
+              </a:rPr>
+              <a:t>MySQL</a:t>
+            </a:r>
+          </a:p>
+          <a:p>
+            <a:pPr marL="560070" lvl="1" indent="-285750">
+              <a:buFont typeface="Arial" panose="020B0604020202020204" pitchFamily="34" charset="0"/>
+              <a:buChar char="•"/>
+            </a:pPr>
+            <a:r>
+              <a:rPr lang="en-US" b="0" dirty="0">
+                <a:latin typeface="Times New Roman" panose="02020603050405020304" pitchFamily="18" charset="0"/>
+                <a:cs typeface="Times New Roman" panose="02020603050405020304" pitchFamily="18" charset="0"/>
+              </a:rPr>
+              <a:t>Juint</a:t>
+            </a:r>
+          </a:p>
+          <a:p>
+            <a:pPr marL="560070" lvl="1" indent="-285750">
+              <a:buFont typeface="Arial" panose="020B0604020202020204" pitchFamily="34" charset="0"/>
+              <a:buChar char="•"/>
+            </a:pPr>
+            <a:r>
+              <a:rPr lang="en-US" b="0" dirty="0">
+                <a:latin typeface="Times New Roman" panose="02020603050405020304" pitchFamily="18" charset="0"/>
+                <a:cs typeface="Times New Roman" panose="02020603050405020304" pitchFamily="18" charset="0"/>
+              </a:rPr>
+              <a:t>Java</a:t>
+            </a:r>
+            <a:endParaRPr lang="en-US" b="1" dirty="0">
+              <a:latin typeface="Times New Roman" panose="02020603050405020304" pitchFamily="18" charset="0"/>
+              <a:cs typeface="Times New Roman" panose="02020603050405020304" pitchFamily="18" charset="0"/>
+            </a:endParaRPr>
+          </a:p>
+          <a:p>
+            <a:r>
+              <a:rPr lang="en-US" b="1" dirty="0">
+                <a:solidFill>
+                  <a:srgbClr val="000000"/>
+                </a:solidFill>
+                <a:effectLst/>
+                <a:latin typeface="Times New Roman" panose="02020603050405020304" pitchFamily="18" charset="0"/>
+                <a:ea typeface="Calibri" panose="020F0502020204030204" pitchFamily="34" charset="0"/>
+              </a:rPr>
+              <a:t>End-User Characteristics: </a:t>
+            </a:r>
+          </a:p>
+          <a:p>
+            <a:pPr marL="457200" marR="0" indent="457200">
+              <a:spcBef>
+                <a:spcPts val="0"/>
+              </a:spcBef>
+              <a:spcAft>
+                <a:spcPts val="0"/>
+              </a:spcAft>
+            </a:pPr>
+            <a:r>
+              <a:rPr lang="en-US" sz="1800" dirty="0">
+                <a:solidFill>
+                  <a:srgbClr val="000000"/>
+                </a:solidFill>
+                <a:effectLst/>
+                <a:latin typeface="Times New Roman" panose="02020603050405020304" pitchFamily="18" charset="0"/>
+                <a:ea typeface="Calibri" panose="020F0502020204030204" pitchFamily="34" charset="0"/>
+                <a:cs typeface="Times New Roman" panose="02020603050405020304" pitchFamily="18" charset="0"/>
+              </a:rPr>
+              <a:t>The targeted audience of this system are clinic office personnel  such as the owner, manger, and receptionist as they will provide services  for the doctors and patients.</a:t>
+            </a:r>
+            <a:endParaRPr lang="en-US" sz="1800" dirty="0">
+              <a:solidFill>
+                <a:srgbClr val="000000"/>
+              </a:solidFill>
+              <a:effectLst/>
+              <a:latin typeface="Times New Roman" panose="02020603050405020304" pitchFamily="18" charset="0"/>
+              <a:ea typeface="Calibri" panose="020F0502020204030204" pitchFamily="34" charset="0"/>
+            </a:endParaRPr>
+          </a:p>
+          <a:p>
+            <a:endParaRPr lang="en-US" dirty="0"/>
+          </a:p>
+        </p:txBody>
+      </p:sp>
+    </p:spTree>
+    <p:extLst>
+      <p:ext uri="{BB962C8B-B14F-4D97-AF65-F5344CB8AC3E}">
+        <p14:creationId xmlns:p14="http://schemas.microsoft.com/office/powerpoint/2010/main" val="272466669"/>
+      </p:ext>
+    </p:extLst>
+  </p:cSld>
+  <p:clrMapOvr>
+    <a:masterClrMapping/>
+  </p:clrMapOvr>
+</p:sld>
+</file>
+
+<file path=ppt/slides/slide6.xml><?xml version="1.0" encoding="utf-8"?>
+<p:sld xmlns:a="http://schemas.openxmlformats.org/drawingml/2006/main" xmlns:r="http://schemas.openxmlformats.org/officeDocument/2006/relationships" xmlns:p="http://schemas.openxmlformats.org/presentationml/2006/main">
+  <p:cSld>
+    <p:spTree>
+      <p:nvGrpSpPr>
+        <p:cNvPr id="1" name=""/>
+        <p:cNvGrpSpPr/>
+        <p:nvPr/>
+      </p:nvGrpSpPr>
+      <p:grpSpPr>
+        <a:xfrm>
+          <a:off x="0" y="0"/>
+          <a:ext cx="0" cy="0"/>
+          <a:chOff x="0" y="0"/>
+          <a:chExt cx="0" cy="0"/>
+        </a:xfrm>
+      </p:grpSpPr>
+      <p:sp>
+        <p:nvSpPr>
+          <p:cNvPr id="10" name="Title 9">
+            <a:extLst>
+              <a:ext uri="{FF2B5EF4-FFF2-40B4-BE49-F238E27FC236}">
+                <a16:creationId xmlns:a16="http://schemas.microsoft.com/office/drawing/2014/main" id="{ABD5B33E-E98F-6D48-DF3C-08BF6994D9AF}"/>
+              </a:ext>
+            </a:extLst>
+          </p:cNvPr>
+          <p:cNvSpPr>
+            <a:spLocks noGrp="1"/>
+          </p:cNvSpPr>
+          <p:nvPr>
+            <p:ph type="title"/>
+          </p:nvPr>
+        </p:nvSpPr>
+        <p:spPr>
+          <a:xfrm>
+            <a:off x="1084726" y="457200"/>
+            <a:ext cx="8902553" cy="650240"/>
+          </a:xfrm>
+        </p:spPr>
+        <p:txBody>
+          <a:bodyPr>
+            <a:normAutofit/>
+          </a:bodyPr>
+          <a:lstStyle/>
+          <a:p>
+            <a:r>
+              <a:rPr lang="en-US" dirty="0"/>
+              <a:t>Project Management Strategies</a:t>
+            </a:r>
+          </a:p>
+        </p:txBody>
+      </p:sp>
+      <p:sp>
+        <p:nvSpPr>
+          <p:cNvPr id="11" name="Content Placeholder 10">
+            <a:extLst>
+              <a:ext uri="{FF2B5EF4-FFF2-40B4-BE49-F238E27FC236}">
+                <a16:creationId xmlns:a16="http://schemas.microsoft.com/office/drawing/2014/main" id="{1F3F6A25-82D0-A82C-4469-E60C60F0460A}"/>
+              </a:ext>
+            </a:extLst>
+          </p:cNvPr>
+          <p:cNvSpPr>
+            <a:spLocks noGrp="1"/>
+          </p:cNvSpPr>
+          <p:nvPr>
+            <p:ph idx="1"/>
+          </p:nvPr>
+        </p:nvSpPr>
+        <p:spPr>
+          <a:xfrm>
+            <a:off x="692468" y="1251585"/>
+            <a:ext cx="6258028" cy="4873625"/>
+          </a:xfrm>
+        </p:spPr>
+        <p:txBody>
+          <a:bodyPr>
+            <a:normAutofit lnSpcReduction="10000"/>
+          </a:bodyPr>
+          <a:lstStyle/>
+          <a:p>
+            <a:r>
+              <a:rPr lang="en-US" dirty="0"/>
+              <a:t>In this project we used the rapid application development methodology :</a:t>
+            </a:r>
+          </a:p>
+          <a:p>
+            <a:pPr marL="560070" lvl="1" indent="-285750">
+              <a:buFont typeface="Arial" panose="020B0604020202020204" pitchFamily="34" charset="0"/>
+              <a:buChar char="•"/>
+            </a:pPr>
+            <a:r>
+              <a:rPr lang="en-US" dirty="0"/>
+              <a:t>Rapid application development (RAD) is a condensed development process that produces a high-quality system with low investment costs</a:t>
+            </a:r>
+          </a:p>
+          <a:p>
+            <a:pPr lvl="1"/>
+            <a:endParaRPr lang="en-US" dirty="0"/>
+          </a:p>
+          <a:p>
+            <a:pPr marL="560070" lvl="1" indent="-285750">
+              <a:buFont typeface="Arial" panose="020B0604020202020204" pitchFamily="34" charset="0"/>
+              <a:buChar char="•"/>
+            </a:pPr>
+            <a:r>
+              <a:rPr lang="en-US" dirty="0"/>
+              <a:t> The rapid application development method contains four phases: requirements planning, user design, construction, and cutover. The user design and construction phases repeat until the user confirms that the product meets all requirements.</a:t>
+            </a:r>
+          </a:p>
+        </p:txBody>
+      </p:sp>
+      <p:pic>
+        <p:nvPicPr>
+          <p:cNvPr id="13" name="Picture 12">
+            <a:extLst>
+              <a:ext uri="{FF2B5EF4-FFF2-40B4-BE49-F238E27FC236}">
+                <a16:creationId xmlns:a16="http://schemas.microsoft.com/office/drawing/2014/main" id="{F5AEE263-AB45-DEAA-8727-26FDCFA5E7B0}"/>
+              </a:ext>
+            </a:extLst>
+          </p:cNvPr>
+          <p:cNvPicPr>
+            <a:picLocks noChangeAspect="1"/>
+          </p:cNvPicPr>
+          <p:nvPr/>
+        </p:nvPicPr>
+        <p:blipFill>
+          <a:blip r:embed="rId2"/>
+          <a:stretch>
+            <a:fillRect/>
+          </a:stretch>
+        </p:blipFill>
+        <p:spPr>
+          <a:xfrm>
+            <a:off x="6950496" y="2411201"/>
+            <a:ext cx="5163760" cy="1713124"/>
+          </a:xfrm>
+          <a:prstGeom prst="rect">
+            <a:avLst/>
+          </a:prstGeom>
+        </p:spPr>
+      </p:pic>
+    </p:spTree>
+    <p:extLst>
+      <p:ext uri="{BB962C8B-B14F-4D97-AF65-F5344CB8AC3E}">
+        <p14:creationId xmlns:p14="http://schemas.microsoft.com/office/powerpoint/2010/main" val="4126004809"/>
+      </p:ext>
+    </p:extLst>
+  </p:cSld>
+  <p:clrMapOvr>
+    <a:masterClrMapping/>
+  </p:clrMapOvr>
+</p:sld>
+</file>
+
+<file path=ppt/slides/slide7.xml><?xml version="1.0" encoding="utf-8"?>
+<p:sld xmlns:a="http://schemas.openxmlformats.org/drawingml/2006/main" xmlns:r="http://schemas.openxmlformats.org/officeDocument/2006/relationships" xmlns:p="http://schemas.openxmlformats.org/presentationml/2006/main">
+  <p:cSld>
+    <p:spTree>
+      <p:nvGrpSpPr>
+        <p:cNvPr id="1" name=""/>
+        <p:cNvGrpSpPr/>
+        <p:nvPr/>
+      </p:nvGrpSpPr>
+      <p:grpSpPr>
+        <a:xfrm>
+          <a:off x="0" y="0"/>
+          <a:ext cx="0" cy="0"/>
+          <a:chOff x="0" y="0"/>
+          <a:chExt cx="0" cy="0"/>
+        </a:xfrm>
+      </p:grpSpPr>
+      <p:sp>
+        <p:nvSpPr>
+          <p:cNvPr id="7" name="Title 6">
+            <a:extLst>
+              <a:ext uri="{FF2B5EF4-FFF2-40B4-BE49-F238E27FC236}">
+                <a16:creationId xmlns:a16="http://schemas.microsoft.com/office/drawing/2014/main" id="{EC98E541-3AFE-1244-630F-01F69C2E2A73}"/>
+              </a:ext>
+            </a:extLst>
+          </p:cNvPr>
+          <p:cNvSpPr>
+            <a:spLocks noGrp="1"/>
+          </p:cNvSpPr>
+          <p:nvPr>
+            <p:ph type="title"/>
+          </p:nvPr>
+        </p:nvSpPr>
+        <p:spPr/>
+        <p:txBody>
+          <a:bodyPr/>
+          <a:lstStyle/>
+          <a:p>
+            <a:r>
+              <a:rPr lang="en-US" dirty="0"/>
+              <a:t>Gannet Chart</a:t>
+            </a:r>
+          </a:p>
+        </p:txBody>
+      </p:sp>
+      <p:pic>
+        <p:nvPicPr>
+          <p:cNvPr id="10" name="Content Placeholder 9">
+            <a:extLst>
+              <a:ext uri="{FF2B5EF4-FFF2-40B4-BE49-F238E27FC236}">
+                <a16:creationId xmlns:a16="http://schemas.microsoft.com/office/drawing/2014/main" id="{90C0EF1D-7148-3B9F-A3DC-3292423C45BD}"/>
+              </a:ext>
+            </a:extLst>
+          </p:cNvPr>
+          <p:cNvPicPr>
+            <a:picLocks noGrp="1" noChangeAspect="1"/>
+          </p:cNvPicPr>
+          <p:nvPr>
+            <p:ph idx="1"/>
+          </p:nvPr>
+        </p:nvPicPr>
+        <p:blipFill>
+          <a:blip r:embed="rId2"/>
+          <a:stretch>
+            <a:fillRect/>
+          </a:stretch>
+        </p:blipFill>
+        <p:spPr>
+          <a:xfrm>
+            <a:off x="4772024" y="1505869"/>
+            <a:ext cx="7280567" cy="3615644"/>
+          </a:xfrm>
+          <a:prstGeom prst="rect">
+            <a:avLst/>
+          </a:prstGeom>
+        </p:spPr>
+      </p:pic>
+      <p:sp>
+        <p:nvSpPr>
+          <p:cNvPr id="9" name="Text Placeholder 8">
+            <a:extLst>
+              <a:ext uri="{FF2B5EF4-FFF2-40B4-BE49-F238E27FC236}">
+                <a16:creationId xmlns:a16="http://schemas.microsoft.com/office/drawing/2014/main" id="{A5E650C3-8AFD-2DB3-3705-7CF67E33660E}"/>
+              </a:ext>
+            </a:extLst>
+          </p:cNvPr>
+          <p:cNvSpPr>
+            <a:spLocks noGrp="1"/>
+          </p:cNvSpPr>
+          <p:nvPr>
+            <p:ph type="body" sz="half" idx="2"/>
+          </p:nvPr>
+        </p:nvSpPr>
+        <p:spPr/>
+        <p:txBody>
+          <a:bodyPr>
+            <a:normAutofit/>
+          </a:bodyPr>
+          <a:lstStyle/>
+          <a:p>
+            <a:r>
+              <a:rPr lang="en-US" dirty="0">
+                <a:latin typeface="Times New Roman" panose="02020603050405020304" pitchFamily="18" charset="0"/>
+                <a:cs typeface="Times New Roman" panose="02020603050405020304" pitchFamily="18" charset="0"/>
+              </a:rPr>
+              <a:t>A Gantt chart is a project management tool assisting in the planning and scheduling of projects of all sizes, although they are particularly useful for simplifying complex projects. </a:t>
+            </a:r>
+          </a:p>
+        </p:txBody>
+      </p:sp>
+    </p:spTree>
+    <p:extLst>
+      <p:ext uri="{BB962C8B-B14F-4D97-AF65-F5344CB8AC3E}">
+        <p14:creationId xmlns:p14="http://schemas.microsoft.com/office/powerpoint/2010/main" val="3913609034"/>
+      </p:ext>
+    </p:extLst>
+  </p:cSld>
+  <p:clrMapOvr>
+    <a:masterClrMapping/>
+  </p:clrMapOvr>
+</p:sld>
+</file>
+
+<file path=ppt/slides/slide8.xml><?xml version="1.0" encoding="utf-8"?>
+<p:sld xmlns:a="http://schemas.openxmlformats.org/drawingml/2006/main" xmlns:r="http://schemas.openxmlformats.org/officeDocument/2006/relationships" xmlns:p="http://schemas.openxmlformats.org/presentationml/2006/main">
+  <p:cSld>
+    <p:spTree>
+      <p:nvGrpSpPr>
+        <p:cNvPr id="1" name=""/>
+        <p:cNvGrpSpPr/>
+        <p:nvPr/>
+      </p:nvGrpSpPr>
+      <p:grpSpPr>
+        <a:xfrm>
+          <a:off x="0" y="0"/>
+          <a:ext cx="0" cy="0"/>
+          <a:chOff x="0" y="0"/>
+          <a:chExt cx="0" cy="0"/>
+        </a:xfrm>
+      </p:grpSpPr>
+      <p:sp>
+        <p:nvSpPr>
+          <p:cNvPr id="5" name="Title 4">
+            <a:extLst>
+              <a:ext uri="{FF2B5EF4-FFF2-40B4-BE49-F238E27FC236}">
+                <a16:creationId xmlns:a16="http://schemas.microsoft.com/office/drawing/2014/main" id="{3838FD62-666E-AE87-074A-403C98C04A6A}"/>
+              </a:ext>
+            </a:extLst>
+          </p:cNvPr>
+          <p:cNvSpPr>
+            <a:spLocks noGrp="1"/>
+          </p:cNvSpPr>
+          <p:nvPr>
+            <p:ph type="title"/>
+          </p:nvPr>
+        </p:nvSpPr>
+        <p:spPr/>
+        <p:txBody>
+          <a:bodyPr/>
+          <a:lstStyle/>
+          <a:p>
+            <a:r>
+              <a:rPr lang="en-US" dirty="0"/>
+              <a:t>System design </a:t>
+            </a:r>
+          </a:p>
+        </p:txBody>
+      </p:sp>
+      <p:sp>
+        <p:nvSpPr>
+          <p:cNvPr id="6" name="Content Placeholder 5">
+            <a:extLst>
+              <a:ext uri="{FF2B5EF4-FFF2-40B4-BE49-F238E27FC236}">
+                <a16:creationId xmlns:a16="http://schemas.microsoft.com/office/drawing/2014/main" id="{0B934638-B256-C607-5843-160E7A53D882}"/>
+              </a:ext>
+            </a:extLst>
+          </p:cNvPr>
+          <p:cNvSpPr>
+            <a:spLocks noGrp="1"/>
+          </p:cNvSpPr>
+          <p:nvPr>
+            <p:ph idx="1"/>
+          </p:nvPr>
+        </p:nvSpPr>
+        <p:spPr/>
+        <p:txBody>
+          <a:bodyPr/>
+          <a:lstStyle/>
+          <a:p>
+            <a:r>
+              <a:rPr lang="en-US" dirty="0">
+                <a:latin typeface="Times New Roman" panose="02020603050405020304" pitchFamily="18" charset="0"/>
+                <a:ea typeface="Calibri" panose="020F0502020204030204" pitchFamily="34" charset="0"/>
+                <a:cs typeface="Times New Roman" panose="02020603050405020304" pitchFamily="18" charset="0"/>
+              </a:rPr>
+              <a:t>System design is </a:t>
+            </a:r>
+            <a:r>
+              <a:rPr lang="en-US" sz="1800" dirty="0">
+                <a:effectLst/>
+                <a:latin typeface="Times New Roman" panose="02020603050405020304" pitchFamily="18" charset="0"/>
+                <a:ea typeface="Calibri" panose="020F0502020204030204" pitchFamily="34" charset="0"/>
+                <a:cs typeface="Times New Roman" panose="02020603050405020304" pitchFamily="18" charset="0"/>
+              </a:rPr>
+              <a:t>the process of designing the elements of a system such as the architecture, modules and components, the different interfaces of those components and the data that goes through that system.</a:t>
+            </a:r>
+          </a:p>
+          <a:p>
+            <a:r>
+              <a:rPr lang="en-US" dirty="0">
+                <a:latin typeface="Times New Roman" panose="02020603050405020304" pitchFamily="18" charset="0"/>
+                <a:cs typeface="Times New Roman" panose="02020603050405020304" pitchFamily="18" charset="0"/>
+              </a:rPr>
+              <a:t>The most often used tool for this is UML:</a:t>
+            </a:r>
+          </a:p>
+          <a:p>
+            <a:pPr lvl="1"/>
+            <a:r>
+              <a:rPr lang="en-US" dirty="0">
+                <a:effectLst/>
+                <a:latin typeface="Times New Roman" panose="02020603050405020304" pitchFamily="18" charset="0"/>
+                <a:ea typeface="Calibri" panose="020F0502020204030204" pitchFamily="34" charset="0"/>
+                <a:cs typeface="Times New Roman" panose="02020603050405020304" pitchFamily="18" charset="0"/>
+              </a:rPr>
+              <a:t>UML : </a:t>
+            </a:r>
+            <a:r>
+              <a:rPr lang="en-US" b="0" dirty="0">
+                <a:effectLst/>
+                <a:latin typeface="Times New Roman" panose="02020603050405020304" pitchFamily="18" charset="0"/>
+                <a:ea typeface="Calibri" panose="020F0502020204030204" pitchFamily="34" charset="0"/>
+                <a:cs typeface="Times New Roman" panose="02020603050405020304" pitchFamily="18" charset="0"/>
+              </a:rPr>
+              <a:t>Unified Modeling language is a standardized modeling language enabling developers to specify, visualize, construct and document artifacts of a software system.</a:t>
+            </a:r>
+          </a:p>
+          <a:p>
+            <a:endParaRPr lang="en-US" dirty="0"/>
+          </a:p>
+        </p:txBody>
+      </p:sp>
+    </p:spTree>
+    <p:extLst>
+      <p:ext uri="{BB962C8B-B14F-4D97-AF65-F5344CB8AC3E}">
+        <p14:creationId xmlns:p14="http://schemas.microsoft.com/office/powerpoint/2010/main" val="2031995057"/>
+      </p:ext>
+    </p:extLst>
+  </p:cSld>
+  <p:clrMapOvr>
+    <a:masterClrMapping/>
+  </p:clrMapOvr>
+</p:sld>
+</file>
+
+<file path=ppt/slides/slide9.xml><?xml version="1.0" encoding="utf-8"?>
+<p:sld xmlns:a="http://schemas.openxmlformats.org/drawingml/2006/main" xmlns:r="http://schemas.openxmlformats.org/officeDocument/2006/relationships" xmlns:p="http://schemas.openxmlformats.org/presentationml/2006/main">
+  <p:cSld>
+    <p:spTree>
+      <p:nvGrpSpPr>
+        <p:cNvPr id="1" name=""/>
+        <p:cNvGrpSpPr/>
+        <p:nvPr/>
+      </p:nvGrpSpPr>
+      <p:grpSpPr>
+        <a:xfrm>
+          <a:off x="0" y="0"/>
+          <a:ext cx="0" cy="0"/>
+          <a:chOff x="0" y="0"/>
+          <a:chExt cx="0" cy="0"/>
+        </a:xfrm>
+      </p:grpSpPr>
+      <p:sp>
+        <p:nvSpPr>
+          <p:cNvPr id="2" name="Title 1">
+            <a:extLst>
+              <a:ext uri="{FF2B5EF4-FFF2-40B4-BE49-F238E27FC236}">
+                <a16:creationId xmlns:a16="http://schemas.microsoft.com/office/drawing/2014/main" id="{C0A33E61-0EDB-99F9-2F52-2FABAB55AE94}"/>
+              </a:ext>
+            </a:extLst>
+          </p:cNvPr>
+          <p:cNvSpPr>
+            <a:spLocks noGrp="1"/>
+          </p:cNvSpPr>
+          <p:nvPr>
+            <p:ph type="title"/>
+          </p:nvPr>
+        </p:nvSpPr>
+        <p:spPr/>
+        <p:txBody>
+          <a:bodyPr/>
+          <a:lstStyle/>
+          <a:p>
+            <a:r>
+              <a:rPr lang="en-US" dirty="0"/>
+              <a:t>MVC Model</a:t>
+            </a:r>
+          </a:p>
+        </p:txBody>
+      </p:sp>
+      <p:pic>
+        <p:nvPicPr>
+          <p:cNvPr id="6" name="Content Placeholder 5" descr="Diagram&#10;&#10;Description automatically generated">
+            <a:extLst>
+              <a:ext uri="{FF2B5EF4-FFF2-40B4-BE49-F238E27FC236}">
+                <a16:creationId xmlns:a16="http://schemas.microsoft.com/office/drawing/2014/main" id="{84B445B8-5019-7794-AF42-BAEC1C003A54}"/>
+              </a:ext>
+            </a:extLst>
+          </p:cNvPr>
+          <p:cNvPicPr>
+            <a:picLocks noGrp="1" noChangeAspect="1"/>
+          </p:cNvPicPr>
+          <p:nvPr>
+            <p:ph idx="1"/>
+          </p:nvPr>
+        </p:nvPicPr>
+        <p:blipFill>
+          <a:blip r:embed="rId2">
+            <a:extLst>
+              <a:ext uri="{28A0092B-C50C-407E-A947-70E740481C1C}">
+                <a14:useLocalDpi xmlns:a14="http://schemas.microsoft.com/office/drawing/2010/main" val="0"/>
+              </a:ext>
+            </a:extLst>
+          </a:blip>
+          <a:stretch>
+            <a:fillRect/>
+          </a:stretch>
+        </p:blipFill>
+        <p:spPr>
+          <a:xfrm>
+            <a:off x="5183188" y="1446645"/>
+            <a:ext cx="6368732" cy="4310625"/>
+          </a:xfrm>
+        </p:spPr>
+      </p:pic>
+      <p:sp>
+        <p:nvSpPr>
+          <p:cNvPr id="4" name="Text Placeholder 3">
+            <a:extLst>
+              <a:ext uri="{FF2B5EF4-FFF2-40B4-BE49-F238E27FC236}">
+                <a16:creationId xmlns:a16="http://schemas.microsoft.com/office/drawing/2014/main" id="{CEE8FA8A-77AA-DEED-71EB-B35952E77554}"/>
+              </a:ext>
+            </a:extLst>
+          </p:cNvPr>
+          <p:cNvSpPr>
+            <a:spLocks noGrp="1"/>
+          </p:cNvSpPr>
+          <p:nvPr>
+            <p:ph type="body" sz="half" idx="2"/>
+          </p:nvPr>
+        </p:nvSpPr>
+        <p:spPr/>
+        <p:txBody>
+          <a:bodyPr/>
+          <a:lstStyle/>
+          <a:p>
+            <a:r>
+              <a:rPr lang="en-US" dirty="0"/>
+              <a:t>The Model View Controller (MVC) design pattern specifies that an application consist of a data model, presentation information, and control information. The pattern requires that each of these be separated into different objects.</a:t>
+            </a:r>
+          </a:p>
+        </p:txBody>
+      </p:sp>
+    </p:spTree>
+    <p:extLst>
+      <p:ext uri="{BB962C8B-B14F-4D97-AF65-F5344CB8AC3E}">
+        <p14:creationId xmlns:p14="http://schemas.microsoft.com/office/powerpoint/2010/main" val="31585606"/>
       </p:ext>
     </p:extLst>
   </p:cSld>

</xml_diff>

<commit_message>
added all the transitions to all the slides
</commit_message>
<xml_diff>
--- a/report presenatation.pptx
+++ b/report presenatation.pptx
@@ -4212,6 +4212,176 @@
   <p:clrMapOvr>
     <a:masterClrMapping/>
   </p:clrMapOvr>
+  <p:timing>
+    <p:tnLst>
+      <p:par>
+        <p:cTn id="1" dur="indefinite" restart="never" nodeType="tmRoot">
+          <p:childTnLst>
+            <p:seq concurrent="1" nextAc="seek">
+              <p:cTn id="2" dur="indefinite" nodeType="mainSeq">
+                <p:childTnLst>
+                  <p:par>
+                    <p:cTn id="3" fill="hold">
+                      <p:stCondLst>
+                        <p:cond delay="indefinite"/>
+                      </p:stCondLst>
+                      <p:childTnLst>
+                        <p:par>
+                          <p:cTn id="4" fill="hold">
+                            <p:stCondLst>
+                              <p:cond delay="0"/>
+                            </p:stCondLst>
+                            <p:childTnLst>
+                              <p:par>
+                                <p:cTn id="5" presetID="1" presetClass="entr" presetSubtype="0" fill="hold" nodeType="clickEffect">
+                                  <p:stCondLst>
+                                    <p:cond delay="0"/>
+                                  </p:stCondLst>
+                                  <p:childTnLst>
+                                    <p:set>
+                                      <p:cBhvr>
+                                        <p:cTn id="6" dur="1" fill="hold">
+                                          <p:stCondLst>
+                                            <p:cond delay="0"/>
+                                          </p:stCondLst>
+                                        </p:cTn>
+                                        <p:tgtEl>
+                                          <p:spTgt spid="5">
+                                            <p:txEl>
+                                              <p:pRg st="0" end="0"/>
+                                            </p:txEl>
+                                          </p:spTgt>
+                                        </p:tgtEl>
+                                        <p:attrNameLst>
+                                          <p:attrName>style.visibility</p:attrName>
+                                        </p:attrNameLst>
+                                      </p:cBhvr>
+                                      <p:to>
+                                        <p:strVal val="visible"/>
+                                      </p:to>
+                                    </p:set>
+                                  </p:childTnLst>
+                                </p:cTn>
+                              </p:par>
+                            </p:childTnLst>
+                          </p:cTn>
+                        </p:par>
+                      </p:childTnLst>
+                    </p:cTn>
+                  </p:par>
+                  <p:par>
+                    <p:cTn id="7" fill="hold">
+                      <p:stCondLst>
+                        <p:cond delay="indefinite"/>
+                      </p:stCondLst>
+                      <p:childTnLst>
+                        <p:par>
+                          <p:cTn id="8" fill="hold">
+                            <p:stCondLst>
+                              <p:cond delay="0"/>
+                            </p:stCondLst>
+                            <p:childTnLst>
+                              <p:par>
+                                <p:cTn id="9" presetID="2" presetClass="entr" presetSubtype="4" fill="hold" nodeType="clickEffect">
+                                  <p:stCondLst>
+                                    <p:cond delay="0"/>
+                                  </p:stCondLst>
+                                  <p:childTnLst>
+                                    <p:set>
+                                      <p:cBhvr>
+                                        <p:cTn id="10" dur="1" fill="hold">
+                                          <p:stCondLst>
+                                            <p:cond delay="0"/>
+                                          </p:stCondLst>
+                                        </p:cTn>
+                                        <p:tgtEl>
+                                          <p:spTgt spid="7"/>
+                                        </p:tgtEl>
+                                        <p:attrNameLst>
+                                          <p:attrName>style.visibility</p:attrName>
+                                        </p:attrNameLst>
+                                      </p:cBhvr>
+                                      <p:to>
+                                        <p:strVal val="visible"/>
+                                      </p:to>
+                                    </p:set>
+                                    <p:anim calcmode="lin" valueType="num">
+                                      <p:cBhvr additive="base">
+                                        <p:cTn id="11" dur="500" fill="hold"/>
+                                        <p:tgtEl>
+                                          <p:spTgt spid="7"/>
+                                        </p:tgtEl>
+                                        <p:attrNameLst>
+                                          <p:attrName>ppt_x</p:attrName>
+                                        </p:attrNameLst>
+                                      </p:cBhvr>
+                                      <p:tavLst>
+                                        <p:tav tm="0">
+                                          <p:val>
+                                            <p:strVal val="#ppt_x"/>
+                                          </p:val>
+                                        </p:tav>
+                                        <p:tav tm="100000">
+                                          <p:val>
+                                            <p:strVal val="#ppt_x"/>
+                                          </p:val>
+                                        </p:tav>
+                                      </p:tavLst>
+                                    </p:anim>
+                                    <p:anim calcmode="lin" valueType="num">
+                                      <p:cBhvr additive="base">
+                                        <p:cTn id="12" dur="500" fill="hold"/>
+                                        <p:tgtEl>
+                                          <p:spTgt spid="7"/>
+                                        </p:tgtEl>
+                                        <p:attrNameLst>
+                                          <p:attrName>ppt_y</p:attrName>
+                                        </p:attrNameLst>
+                                      </p:cBhvr>
+                                      <p:tavLst>
+                                        <p:tav tm="0">
+                                          <p:val>
+                                            <p:strVal val="1+#ppt_h/2"/>
+                                          </p:val>
+                                        </p:tav>
+                                        <p:tav tm="100000">
+                                          <p:val>
+                                            <p:strVal val="#ppt_y"/>
+                                          </p:val>
+                                        </p:tav>
+                                      </p:tavLst>
+                                    </p:anim>
+                                  </p:childTnLst>
+                                </p:cTn>
+                              </p:par>
+                            </p:childTnLst>
+                          </p:cTn>
+                        </p:par>
+                      </p:childTnLst>
+                    </p:cTn>
+                  </p:par>
+                </p:childTnLst>
+              </p:cTn>
+              <p:prevCondLst>
+                <p:cond evt="onPrev" delay="0">
+                  <p:tgtEl>
+                    <p:sldTgt/>
+                  </p:tgtEl>
+                </p:cond>
+              </p:prevCondLst>
+              <p:nextCondLst>
+                <p:cond evt="onNext" delay="0">
+                  <p:tgtEl>
+                    <p:sldTgt/>
+                  </p:tgtEl>
+                </p:cond>
+              </p:nextCondLst>
+            </p:seq>
+          </p:childTnLst>
+        </p:cTn>
+      </p:par>
+    </p:tnLst>
+  </p:timing>
 </p:sld>
 </file>
 
@@ -4320,7 +4490,7 @@
           <a:lstStyle/>
           <a:p>
             <a:r>
-              <a:rPr lang="en-US" sz="1800">
+              <a:rPr lang="en-US" sz="1800" dirty="0">
                 <a:effectLst/>
                 <a:latin typeface="Times New Roman" panose="02020603050405020304" pitchFamily="18" charset="0"/>
                 <a:ea typeface="Calibri" panose="020F0502020204030204" pitchFamily="34" charset="0"/>
@@ -4328,7 +4498,7 @@
               </a:rPr>
               <a:t>Software architecture is the defining and structuring of a solution that meets technical and operational requirements. Software architecture optimizes attributes involving a series of decisions, such as security, performance, and manageability. These decisions ultimately impact application quality, maintenance, performance, and overall success.</a:t>
             </a:r>
-            <a:endParaRPr lang="en-US" sz="1800">
+            <a:endParaRPr lang="en-US" sz="1800" dirty="0">
               <a:effectLst/>
               <a:latin typeface="Calibri" panose="020F0502020204030204" pitchFamily="34" charset="0"/>
               <a:ea typeface="Calibri" panose="020F0502020204030204" pitchFamily="34" charset="0"/>
@@ -4350,6 +4520,230 @@
   <p:clrMapOvr>
     <a:masterClrMapping/>
   </p:clrMapOvr>
+  <p:timing>
+    <p:tnLst>
+      <p:par>
+        <p:cTn id="1" dur="indefinite" restart="never" nodeType="tmRoot">
+          <p:childTnLst>
+            <p:seq concurrent="1" nextAc="seek">
+              <p:cTn id="2" dur="indefinite" nodeType="mainSeq">
+                <p:childTnLst>
+                  <p:par>
+                    <p:cTn id="3" fill="hold">
+                      <p:stCondLst>
+                        <p:cond delay="indefinite"/>
+                      </p:stCondLst>
+                      <p:childTnLst>
+                        <p:par>
+                          <p:cTn id="4" fill="hold">
+                            <p:stCondLst>
+                              <p:cond delay="0"/>
+                            </p:stCondLst>
+                            <p:childTnLst>
+                              <p:par>
+                                <p:cTn id="5" presetID="2" presetClass="entr" presetSubtype="4" fill="hold" nodeType="clickEffect">
+                                  <p:stCondLst>
+                                    <p:cond delay="0"/>
+                                  </p:stCondLst>
+                                  <p:childTnLst>
+                                    <p:set>
+                                      <p:cBhvr>
+                                        <p:cTn id="6" dur="1" fill="hold">
+                                          <p:stCondLst>
+                                            <p:cond delay="0"/>
+                                          </p:stCondLst>
+                                        </p:cTn>
+                                        <p:tgtEl>
+                                          <p:spTgt spid="4">
+                                            <p:txEl>
+                                              <p:pRg st="0" end="0"/>
+                                            </p:txEl>
+                                          </p:spTgt>
+                                        </p:tgtEl>
+                                        <p:attrNameLst>
+                                          <p:attrName>style.visibility</p:attrName>
+                                        </p:attrNameLst>
+                                      </p:cBhvr>
+                                      <p:to>
+                                        <p:strVal val="visible"/>
+                                      </p:to>
+                                    </p:set>
+                                    <p:anim calcmode="lin" valueType="num">
+                                      <p:cBhvr additive="base">
+                                        <p:cTn id="7" dur="500" fill="hold"/>
+                                        <p:tgtEl>
+                                          <p:spTgt spid="4">
+                                            <p:txEl>
+                                              <p:pRg st="0" end="0"/>
+                                            </p:txEl>
+                                          </p:spTgt>
+                                        </p:tgtEl>
+                                        <p:attrNameLst>
+                                          <p:attrName>ppt_x</p:attrName>
+                                        </p:attrNameLst>
+                                      </p:cBhvr>
+                                      <p:tavLst>
+                                        <p:tav tm="0">
+                                          <p:val>
+                                            <p:strVal val="#ppt_x"/>
+                                          </p:val>
+                                        </p:tav>
+                                        <p:tav tm="100000">
+                                          <p:val>
+                                            <p:strVal val="#ppt_x"/>
+                                          </p:val>
+                                        </p:tav>
+                                      </p:tavLst>
+                                    </p:anim>
+                                    <p:anim calcmode="lin" valueType="num">
+                                      <p:cBhvr additive="base">
+                                        <p:cTn id="8" dur="500" fill="hold"/>
+                                        <p:tgtEl>
+                                          <p:spTgt spid="4">
+                                            <p:txEl>
+                                              <p:pRg st="0" end="0"/>
+                                            </p:txEl>
+                                          </p:spTgt>
+                                        </p:tgtEl>
+                                        <p:attrNameLst>
+                                          <p:attrName>ppt_y</p:attrName>
+                                        </p:attrNameLst>
+                                      </p:cBhvr>
+                                      <p:tavLst>
+                                        <p:tav tm="0">
+                                          <p:val>
+                                            <p:strVal val="1+#ppt_h/2"/>
+                                          </p:val>
+                                        </p:tav>
+                                        <p:tav tm="100000">
+                                          <p:val>
+                                            <p:strVal val="#ppt_y"/>
+                                          </p:val>
+                                        </p:tav>
+                                      </p:tavLst>
+                                    </p:anim>
+                                  </p:childTnLst>
+                                </p:cTn>
+                              </p:par>
+                            </p:childTnLst>
+                          </p:cTn>
+                        </p:par>
+                      </p:childTnLst>
+                    </p:cTn>
+                  </p:par>
+                  <p:par>
+                    <p:cTn id="9" fill="hold">
+                      <p:stCondLst>
+                        <p:cond delay="indefinite"/>
+                      </p:stCondLst>
+                      <p:childTnLst>
+                        <p:par>
+                          <p:cTn id="10" fill="hold">
+                            <p:stCondLst>
+                              <p:cond delay="0"/>
+                            </p:stCondLst>
+                            <p:childTnLst>
+                              <p:par>
+                                <p:cTn id="11" presetID="2" presetClass="entr" presetSubtype="4" fill="hold" nodeType="clickEffect">
+                                  <p:stCondLst>
+                                    <p:cond delay="0"/>
+                                  </p:stCondLst>
+                                  <p:childTnLst>
+                                    <p:set>
+                                      <p:cBhvr>
+                                        <p:cTn id="12" dur="1" fill="hold">
+                                          <p:stCondLst>
+                                            <p:cond delay="0"/>
+                                          </p:stCondLst>
+                                        </p:cTn>
+                                        <p:tgtEl>
+                                          <p:spTgt spid="5"/>
+                                        </p:tgtEl>
+                                        <p:attrNameLst>
+                                          <p:attrName>style.visibility</p:attrName>
+                                        </p:attrNameLst>
+                                      </p:cBhvr>
+                                      <p:to>
+                                        <p:strVal val="visible"/>
+                                      </p:to>
+                                    </p:set>
+                                    <p:anim calcmode="lin" valueType="num">
+                                      <p:cBhvr additive="base">
+                                        <p:cTn id="13" dur="500" fill="hold"/>
+                                        <p:tgtEl>
+                                          <p:spTgt spid="5"/>
+                                        </p:tgtEl>
+                                        <p:attrNameLst>
+                                          <p:attrName>ppt_x</p:attrName>
+                                        </p:attrNameLst>
+                                      </p:cBhvr>
+                                      <p:tavLst>
+                                        <p:tav tm="0">
+                                          <p:val>
+                                            <p:strVal val="#ppt_x"/>
+                                          </p:val>
+                                        </p:tav>
+                                        <p:tav tm="100000">
+                                          <p:val>
+                                            <p:strVal val="#ppt_x"/>
+                                          </p:val>
+                                        </p:tav>
+                                      </p:tavLst>
+                                    </p:anim>
+                                    <p:anim calcmode="lin" valueType="num">
+                                      <p:cBhvr additive="base">
+                                        <p:cTn id="14" dur="500" fill="hold"/>
+                                        <p:tgtEl>
+                                          <p:spTgt spid="5"/>
+                                        </p:tgtEl>
+                                        <p:attrNameLst>
+                                          <p:attrName>ppt_y</p:attrName>
+                                        </p:attrNameLst>
+                                      </p:cBhvr>
+                                      <p:tavLst>
+                                        <p:tav tm="0">
+                                          <p:val>
+                                            <p:strVal val="1+#ppt_h/2"/>
+                                          </p:val>
+                                        </p:tav>
+                                        <p:tav tm="100000">
+                                          <p:val>
+                                            <p:strVal val="#ppt_y"/>
+                                          </p:val>
+                                        </p:tav>
+                                      </p:tavLst>
+                                    </p:anim>
+                                  </p:childTnLst>
+                                </p:cTn>
+                              </p:par>
+                            </p:childTnLst>
+                          </p:cTn>
+                        </p:par>
+                      </p:childTnLst>
+                    </p:cTn>
+                  </p:par>
+                </p:childTnLst>
+              </p:cTn>
+              <p:prevCondLst>
+                <p:cond evt="onPrev" delay="0">
+                  <p:tgtEl>
+                    <p:sldTgt/>
+                  </p:tgtEl>
+                </p:cond>
+              </p:prevCondLst>
+              <p:nextCondLst>
+                <p:cond evt="onNext" delay="0">
+                  <p:tgtEl>
+                    <p:sldTgt/>
+                  </p:tgtEl>
+                </p:cond>
+              </p:nextCondLst>
+            </p:seq>
+          </p:childTnLst>
+        </p:cTn>
+      </p:par>
+    </p:tnLst>
+  </p:timing>
 </p:sld>
 </file>
 
@@ -4484,6 +4878,176 @@
   <p:clrMapOvr>
     <a:masterClrMapping/>
   </p:clrMapOvr>
+  <p:timing>
+    <p:tnLst>
+      <p:par>
+        <p:cTn id="1" dur="indefinite" restart="never" nodeType="tmRoot">
+          <p:childTnLst>
+            <p:seq concurrent="1" nextAc="seek">
+              <p:cTn id="2" dur="indefinite" nodeType="mainSeq">
+                <p:childTnLst>
+                  <p:par>
+                    <p:cTn id="3" fill="hold">
+                      <p:stCondLst>
+                        <p:cond delay="indefinite"/>
+                      </p:stCondLst>
+                      <p:childTnLst>
+                        <p:par>
+                          <p:cTn id="4" fill="hold">
+                            <p:stCondLst>
+                              <p:cond delay="0"/>
+                            </p:stCondLst>
+                            <p:childTnLst>
+                              <p:par>
+                                <p:cTn id="5" presetID="1" presetClass="entr" presetSubtype="0" fill="hold" nodeType="clickEffect">
+                                  <p:stCondLst>
+                                    <p:cond delay="0"/>
+                                  </p:stCondLst>
+                                  <p:childTnLst>
+                                    <p:set>
+                                      <p:cBhvr>
+                                        <p:cTn id="6" dur="1" fill="hold">
+                                          <p:stCondLst>
+                                            <p:cond delay="0"/>
+                                          </p:stCondLst>
+                                        </p:cTn>
+                                        <p:tgtEl>
+                                          <p:spTgt spid="5">
+                                            <p:txEl>
+                                              <p:pRg st="0" end="0"/>
+                                            </p:txEl>
+                                          </p:spTgt>
+                                        </p:tgtEl>
+                                        <p:attrNameLst>
+                                          <p:attrName>style.visibility</p:attrName>
+                                        </p:attrNameLst>
+                                      </p:cBhvr>
+                                      <p:to>
+                                        <p:strVal val="visible"/>
+                                      </p:to>
+                                    </p:set>
+                                  </p:childTnLst>
+                                </p:cTn>
+                              </p:par>
+                            </p:childTnLst>
+                          </p:cTn>
+                        </p:par>
+                      </p:childTnLst>
+                    </p:cTn>
+                  </p:par>
+                  <p:par>
+                    <p:cTn id="7" fill="hold">
+                      <p:stCondLst>
+                        <p:cond delay="indefinite"/>
+                      </p:stCondLst>
+                      <p:childTnLst>
+                        <p:par>
+                          <p:cTn id="8" fill="hold">
+                            <p:stCondLst>
+                              <p:cond delay="0"/>
+                            </p:stCondLst>
+                            <p:childTnLst>
+                              <p:par>
+                                <p:cTn id="9" presetID="2" presetClass="entr" presetSubtype="4" fill="hold" nodeType="clickEffect">
+                                  <p:stCondLst>
+                                    <p:cond delay="0"/>
+                                  </p:stCondLst>
+                                  <p:childTnLst>
+                                    <p:set>
+                                      <p:cBhvr>
+                                        <p:cTn id="10" dur="1" fill="hold">
+                                          <p:stCondLst>
+                                            <p:cond delay="0"/>
+                                          </p:stCondLst>
+                                        </p:cTn>
+                                        <p:tgtEl>
+                                          <p:spTgt spid="6"/>
+                                        </p:tgtEl>
+                                        <p:attrNameLst>
+                                          <p:attrName>style.visibility</p:attrName>
+                                        </p:attrNameLst>
+                                      </p:cBhvr>
+                                      <p:to>
+                                        <p:strVal val="visible"/>
+                                      </p:to>
+                                    </p:set>
+                                    <p:anim calcmode="lin" valueType="num">
+                                      <p:cBhvr additive="base">
+                                        <p:cTn id="11" dur="500" fill="hold"/>
+                                        <p:tgtEl>
+                                          <p:spTgt spid="6"/>
+                                        </p:tgtEl>
+                                        <p:attrNameLst>
+                                          <p:attrName>ppt_x</p:attrName>
+                                        </p:attrNameLst>
+                                      </p:cBhvr>
+                                      <p:tavLst>
+                                        <p:tav tm="0">
+                                          <p:val>
+                                            <p:strVal val="#ppt_x"/>
+                                          </p:val>
+                                        </p:tav>
+                                        <p:tav tm="100000">
+                                          <p:val>
+                                            <p:strVal val="#ppt_x"/>
+                                          </p:val>
+                                        </p:tav>
+                                      </p:tavLst>
+                                    </p:anim>
+                                    <p:anim calcmode="lin" valueType="num">
+                                      <p:cBhvr additive="base">
+                                        <p:cTn id="12" dur="500" fill="hold"/>
+                                        <p:tgtEl>
+                                          <p:spTgt spid="6"/>
+                                        </p:tgtEl>
+                                        <p:attrNameLst>
+                                          <p:attrName>ppt_y</p:attrName>
+                                        </p:attrNameLst>
+                                      </p:cBhvr>
+                                      <p:tavLst>
+                                        <p:tav tm="0">
+                                          <p:val>
+                                            <p:strVal val="1+#ppt_h/2"/>
+                                          </p:val>
+                                        </p:tav>
+                                        <p:tav tm="100000">
+                                          <p:val>
+                                            <p:strVal val="#ppt_y"/>
+                                          </p:val>
+                                        </p:tav>
+                                      </p:tavLst>
+                                    </p:anim>
+                                  </p:childTnLst>
+                                </p:cTn>
+                              </p:par>
+                            </p:childTnLst>
+                          </p:cTn>
+                        </p:par>
+                      </p:childTnLst>
+                    </p:cTn>
+                  </p:par>
+                </p:childTnLst>
+              </p:cTn>
+              <p:prevCondLst>
+                <p:cond evt="onPrev" delay="0">
+                  <p:tgtEl>
+                    <p:sldTgt/>
+                  </p:tgtEl>
+                </p:cond>
+              </p:prevCondLst>
+              <p:nextCondLst>
+                <p:cond evt="onNext" delay="0">
+                  <p:tgtEl>
+                    <p:sldTgt/>
+                  </p:tgtEl>
+                </p:cond>
+              </p:nextCondLst>
+            </p:seq>
+          </p:childTnLst>
+        </p:cTn>
+      </p:par>
+    </p:tnLst>
+  </p:timing>
 </p:sld>
 </file>
 
@@ -4607,6 +5171,176 @@
   <p:clrMapOvr>
     <a:masterClrMapping/>
   </p:clrMapOvr>
+  <p:timing>
+    <p:tnLst>
+      <p:par>
+        <p:cTn id="1" dur="indefinite" restart="never" nodeType="tmRoot">
+          <p:childTnLst>
+            <p:seq concurrent="1" nextAc="seek">
+              <p:cTn id="2" dur="indefinite" nodeType="mainSeq">
+                <p:childTnLst>
+                  <p:par>
+                    <p:cTn id="3" fill="hold">
+                      <p:stCondLst>
+                        <p:cond delay="indefinite"/>
+                      </p:stCondLst>
+                      <p:childTnLst>
+                        <p:par>
+                          <p:cTn id="4" fill="hold">
+                            <p:stCondLst>
+                              <p:cond delay="0"/>
+                            </p:stCondLst>
+                            <p:childTnLst>
+                              <p:par>
+                                <p:cTn id="5" presetID="1" presetClass="entr" presetSubtype="0" fill="hold" nodeType="clickEffect">
+                                  <p:stCondLst>
+                                    <p:cond delay="0"/>
+                                  </p:stCondLst>
+                                  <p:childTnLst>
+                                    <p:set>
+                                      <p:cBhvr>
+                                        <p:cTn id="6" dur="1" fill="hold">
+                                          <p:stCondLst>
+                                            <p:cond delay="0"/>
+                                          </p:stCondLst>
+                                        </p:cTn>
+                                        <p:tgtEl>
+                                          <p:spTgt spid="4">
+                                            <p:txEl>
+                                              <p:pRg st="0" end="0"/>
+                                            </p:txEl>
+                                          </p:spTgt>
+                                        </p:tgtEl>
+                                        <p:attrNameLst>
+                                          <p:attrName>style.visibility</p:attrName>
+                                        </p:attrNameLst>
+                                      </p:cBhvr>
+                                      <p:to>
+                                        <p:strVal val="visible"/>
+                                      </p:to>
+                                    </p:set>
+                                  </p:childTnLst>
+                                </p:cTn>
+                              </p:par>
+                            </p:childTnLst>
+                          </p:cTn>
+                        </p:par>
+                      </p:childTnLst>
+                    </p:cTn>
+                  </p:par>
+                  <p:par>
+                    <p:cTn id="7" fill="hold">
+                      <p:stCondLst>
+                        <p:cond delay="indefinite"/>
+                      </p:stCondLst>
+                      <p:childTnLst>
+                        <p:par>
+                          <p:cTn id="8" fill="hold">
+                            <p:stCondLst>
+                              <p:cond delay="0"/>
+                            </p:stCondLst>
+                            <p:childTnLst>
+                              <p:par>
+                                <p:cTn id="9" presetID="2" presetClass="entr" presetSubtype="4" fill="hold" nodeType="clickEffect">
+                                  <p:stCondLst>
+                                    <p:cond delay="0"/>
+                                  </p:stCondLst>
+                                  <p:childTnLst>
+                                    <p:set>
+                                      <p:cBhvr>
+                                        <p:cTn id="10" dur="1" fill="hold">
+                                          <p:stCondLst>
+                                            <p:cond delay="0"/>
+                                          </p:stCondLst>
+                                        </p:cTn>
+                                        <p:tgtEl>
+                                          <p:spTgt spid="7"/>
+                                        </p:tgtEl>
+                                        <p:attrNameLst>
+                                          <p:attrName>style.visibility</p:attrName>
+                                        </p:attrNameLst>
+                                      </p:cBhvr>
+                                      <p:to>
+                                        <p:strVal val="visible"/>
+                                      </p:to>
+                                    </p:set>
+                                    <p:anim calcmode="lin" valueType="num">
+                                      <p:cBhvr additive="base">
+                                        <p:cTn id="11" dur="500" fill="hold"/>
+                                        <p:tgtEl>
+                                          <p:spTgt spid="7"/>
+                                        </p:tgtEl>
+                                        <p:attrNameLst>
+                                          <p:attrName>ppt_x</p:attrName>
+                                        </p:attrNameLst>
+                                      </p:cBhvr>
+                                      <p:tavLst>
+                                        <p:tav tm="0">
+                                          <p:val>
+                                            <p:strVal val="#ppt_x"/>
+                                          </p:val>
+                                        </p:tav>
+                                        <p:tav tm="100000">
+                                          <p:val>
+                                            <p:strVal val="#ppt_x"/>
+                                          </p:val>
+                                        </p:tav>
+                                      </p:tavLst>
+                                    </p:anim>
+                                    <p:anim calcmode="lin" valueType="num">
+                                      <p:cBhvr additive="base">
+                                        <p:cTn id="12" dur="500" fill="hold"/>
+                                        <p:tgtEl>
+                                          <p:spTgt spid="7"/>
+                                        </p:tgtEl>
+                                        <p:attrNameLst>
+                                          <p:attrName>ppt_y</p:attrName>
+                                        </p:attrNameLst>
+                                      </p:cBhvr>
+                                      <p:tavLst>
+                                        <p:tav tm="0">
+                                          <p:val>
+                                            <p:strVal val="1+#ppt_h/2"/>
+                                          </p:val>
+                                        </p:tav>
+                                        <p:tav tm="100000">
+                                          <p:val>
+                                            <p:strVal val="#ppt_y"/>
+                                          </p:val>
+                                        </p:tav>
+                                      </p:tavLst>
+                                    </p:anim>
+                                  </p:childTnLst>
+                                </p:cTn>
+                              </p:par>
+                            </p:childTnLst>
+                          </p:cTn>
+                        </p:par>
+                      </p:childTnLst>
+                    </p:cTn>
+                  </p:par>
+                </p:childTnLst>
+              </p:cTn>
+              <p:prevCondLst>
+                <p:cond evt="onPrev" delay="0">
+                  <p:tgtEl>
+                    <p:sldTgt/>
+                  </p:tgtEl>
+                </p:cond>
+              </p:prevCondLst>
+              <p:nextCondLst>
+                <p:cond evt="onNext" delay="0">
+                  <p:tgtEl>
+                    <p:sldTgt/>
+                  </p:tgtEl>
+                </p:cond>
+              </p:nextCondLst>
+            </p:seq>
+          </p:childTnLst>
+        </p:cTn>
+      </p:par>
+    </p:tnLst>
+  </p:timing>
 </p:sld>
 </file>
 
@@ -4715,6 +5449,85 @@
   <p:clrMapOvr>
     <a:masterClrMapping/>
   </p:clrMapOvr>
+  <p:timing>
+    <p:tnLst>
+      <p:par>
+        <p:cTn id="1" dur="indefinite" restart="never" nodeType="tmRoot">
+          <p:childTnLst>
+            <p:seq concurrent="1" nextAc="seek">
+              <p:cTn id="2" dur="indefinite" nodeType="mainSeq">
+                <p:childTnLst>
+                  <p:par>
+                    <p:cTn id="3" fill="hold">
+                      <p:stCondLst>
+                        <p:cond delay="indefinite"/>
+                      </p:stCondLst>
+                      <p:childTnLst>
+                        <p:par>
+                          <p:cTn id="4" fill="hold">
+                            <p:stCondLst>
+                              <p:cond delay="0"/>
+                            </p:stCondLst>
+                            <p:childTnLst>
+                              <p:par>
+                                <p:cTn id="5" presetID="1" presetClass="entr" presetSubtype="0" fill="hold" nodeType="clickEffect">
+                                  <p:stCondLst>
+                                    <p:cond delay="0"/>
+                                  </p:stCondLst>
+                                  <p:childTnLst>
+                                    <p:set>
+                                      <p:cBhvr>
+                                        <p:cTn id="6" dur="1" fill="hold">
+                                          <p:stCondLst>
+                                            <p:cond delay="0"/>
+                                          </p:stCondLst>
+                                        </p:cTn>
+                                        <p:tgtEl>
+                                          <p:spTgt spid="6">
+                                            <p:txEl>
+                                              <p:pRg st="0" end="0"/>
+                                            </p:txEl>
+                                          </p:spTgt>
+                                        </p:tgtEl>
+                                        <p:attrNameLst>
+                                          <p:attrName>style.visibility</p:attrName>
+                                        </p:attrNameLst>
+                                      </p:cBhvr>
+                                      <p:to>
+                                        <p:strVal val="visible"/>
+                                      </p:to>
+                                    </p:set>
+                                  </p:childTnLst>
+                                </p:cTn>
+                              </p:par>
+                            </p:childTnLst>
+                          </p:cTn>
+                        </p:par>
+                      </p:childTnLst>
+                    </p:cTn>
+                  </p:par>
+                </p:childTnLst>
+              </p:cTn>
+              <p:prevCondLst>
+                <p:cond evt="onPrev" delay="0">
+                  <p:tgtEl>
+                    <p:sldTgt/>
+                  </p:tgtEl>
+                </p:cond>
+              </p:prevCondLst>
+              <p:nextCondLst>
+                <p:cond evt="onNext" delay="0">
+                  <p:tgtEl>
+                    <p:sldTgt/>
+                  </p:tgtEl>
+                </p:cond>
+              </p:nextCondLst>
+            </p:seq>
+          </p:childTnLst>
+        </p:cTn>
+      </p:par>
+    </p:tnLst>
+  </p:timing>
 </p:sld>
 </file>
 
@@ -4856,6 +5669,225 @@
   <p:clrMapOvr>
     <a:masterClrMapping/>
   </p:clrMapOvr>
+  <p:timing>
+    <p:tnLst>
+      <p:par>
+        <p:cTn id="1" dur="indefinite" restart="never" nodeType="tmRoot">
+          <p:childTnLst>
+            <p:seq concurrent="1" nextAc="seek">
+              <p:cTn id="2" dur="indefinite" nodeType="mainSeq">
+                <p:childTnLst>
+                  <p:par>
+                    <p:cTn id="3" fill="hold">
+                      <p:stCondLst>
+                        <p:cond delay="indefinite"/>
+                      </p:stCondLst>
+                      <p:childTnLst>
+                        <p:par>
+                          <p:cTn id="4" fill="hold">
+                            <p:stCondLst>
+                              <p:cond delay="0"/>
+                            </p:stCondLst>
+                            <p:childTnLst>
+                              <p:par>
+                                <p:cTn id="5" presetID="1" presetClass="entr" presetSubtype="0" fill="hold" nodeType="clickEffect">
+                                  <p:stCondLst>
+                                    <p:cond delay="0"/>
+                                  </p:stCondLst>
+                                  <p:childTnLst>
+                                    <p:set>
+                                      <p:cBhvr>
+                                        <p:cTn id="6" dur="1" fill="hold">
+                                          <p:stCondLst>
+                                            <p:cond delay="0"/>
+                                          </p:stCondLst>
+                                        </p:cTn>
+                                        <p:tgtEl>
+                                          <p:spTgt spid="5">
+                                            <p:txEl>
+                                              <p:pRg st="0" end="0"/>
+                                            </p:txEl>
+                                          </p:spTgt>
+                                        </p:tgtEl>
+                                        <p:attrNameLst>
+                                          <p:attrName>style.visibility</p:attrName>
+                                        </p:attrNameLst>
+                                      </p:cBhvr>
+                                      <p:to>
+                                        <p:strVal val="visible"/>
+                                      </p:to>
+                                    </p:set>
+                                  </p:childTnLst>
+                                </p:cTn>
+                              </p:par>
+                            </p:childTnLst>
+                          </p:cTn>
+                        </p:par>
+                      </p:childTnLst>
+                    </p:cTn>
+                  </p:par>
+                  <p:par>
+                    <p:cTn id="7" fill="hold">
+                      <p:stCondLst>
+                        <p:cond delay="indefinite"/>
+                      </p:stCondLst>
+                      <p:childTnLst>
+                        <p:par>
+                          <p:cTn id="8" fill="hold">
+                            <p:stCondLst>
+                              <p:cond delay="0"/>
+                            </p:stCondLst>
+                            <p:childTnLst>
+                              <p:par>
+                                <p:cTn id="9" presetID="1" presetClass="entr" presetSubtype="0" fill="hold" nodeType="clickEffect">
+                                  <p:stCondLst>
+                                    <p:cond delay="0"/>
+                                  </p:stCondLst>
+                                  <p:childTnLst>
+                                    <p:set>
+                                      <p:cBhvr>
+                                        <p:cTn id="10" dur="1" fill="hold">
+                                          <p:stCondLst>
+                                            <p:cond delay="0"/>
+                                          </p:stCondLst>
+                                        </p:cTn>
+                                        <p:tgtEl>
+                                          <p:spTgt spid="5">
+                                            <p:txEl>
+                                              <p:pRg st="1" end="1"/>
+                                            </p:txEl>
+                                          </p:spTgt>
+                                        </p:tgtEl>
+                                        <p:attrNameLst>
+                                          <p:attrName>style.visibility</p:attrName>
+                                        </p:attrNameLst>
+                                      </p:cBhvr>
+                                      <p:to>
+                                        <p:strVal val="visible"/>
+                                      </p:to>
+                                    </p:set>
+                                  </p:childTnLst>
+                                </p:cTn>
+                              </p:par>
+                            </p:childTnLst>
+                          </p:cTn>
+                        </p:par>
+                      </p:childTnLst>
+                    </p:cTn>
+                  </p:par>
+                  <p:par>
+                    <p:cTn id="11" fill="hold">
+                      <p:stCondLst>
+                        <p:cond delay="indefinite"/>
+                      </p:stCondLst>
+                      <p:childTnLst>
+                        <p:par>
+                          <p:cTn id="12" fill="hold">
+                            <p:stCondLst>
+                              <p:cond delay="0"/>
+                            </p:stCondLst>
+                            <p:childTnLst>
+                              <p:par>
+                                <p:cTn id="13" presetID="2" presetClass="entr" presetSubtype="4" fill="hold" nodeType="clickEffect">
+                                  <p:stCondLst>
+                                    <p:cond delay="0"/>
+                                  </p:stCondLst>
+                                  <p:childTnLst>
+                                    <p:set>
+                                      <p:cBhvr>
+                                        <p:cTn id="14" dur="1" fill="hold">
+                                          <p:stCondLst>
+                                            <p:cond delay="0"/>
+                                          </p:stCondLst>
+                                        </p:cTn>
+                                        <p:tgtEl>
+                                          <p:spTgt spid="6"/>
+                                        </p:tgtEl>
+                                        <p:attrNameLst>
+                                          <p:attrName>style.visibility</p:attrName>
+                                        </p:attrNameLst>
+                                      </p:cBhvr>
+                                      <p:to>
+                                        <p:strVal val="visible"/>
+                                      </p:to>
+                                    </p:set>
+                                    <p:anim calcmode="lin" valueType="num">
+                                      <p:cBhvr additive="base">
+                                        <p:cTn id="15" dur="500" fill="hold"/>
+                                        <p:tgtEl>
+                                          <p:spTgt spid="6"/>
+                                        </p:tgtEl>
+                                        <p:attrNameLst>
+                                          <p:attrName>ppt_x</p:attrName>
+                                        </p:attrNameLst>
+                                      </p:cBhvr>
+                                      <p:tavLst>
+                                        <p:tav tm="0">
+                                          <p:val>
+                                            <p:strVal val="#ppt_x"/>
+                                          </p:val>
+                                        </p:tav>
+                                        <p:tav tm="100000">
+                                          <p:val>
+                                            <p:strVal val="#ppt_x"/>
+                                          </p:val>
+                                        </p:tav>
+                                      </p:tavLst>
+                                    </p:anim>
+                                    <p:anim calcmode="lin" valueType="num">
+                                      <p:cBhvr additive="base">
+                                        <p:cTn id="16" dur="500" fill="hold"/>
+                                        <p:tgtEl>
+                                          <p:spTgt spid="6"/>
+                                        </p:tgtEl>
+                                        <p:attrNameLst>
+                                          <p:attrName>ppt_y</p:attrName>
+                                        </p:attrNameLst>
+                                      </p:cBhvr>
+                                      <p:tavLst>
+                                        <p:tav tm="0">
+                                          <p:val>
+                                            <p:strVal val="1+#ppt_h/2"/>
+                                          </p:val>
+                                        </p:tav>
+                                        <p:tav tm="100000">
+                                          <p:val>
+                                            <p:strVal val="#ppt_y"/>
+                                          </p:val>
+                                        </p:tav>
+                                      </p:tavLst>
+                                    </p:anim>
+                                  </p:childTnLst>
+                                </p:cTn>
+                              </p:par>
+                            </p:childTnLst>
+                          </p:cTn>
+                        </p:par>
+                      </p:childTnLst>
+                    </p:cTn>
+                  </p:par>
+                </p:childTnLst>
+              </p:cTn>
+              <p:prevCondLst>
+                <p:cond evt="onPrev" delay="0">
+                  <p:tgtEl>
+                    <p:sldTgt/>
+                  </p:tgtEl>
+                </p:cond>
+              </p:prevCondLst>
+              <p:nextCondLst>
+                <p:cond evt="onNext" delay="0">
+                  <p:tgtEl>
+                    <p:sldTgt/>
+                  </p:tgtEl>
+                </p:cond>
+              </p:nextCondLst>
+            </p:seq>
+          </p:childTnLst>
+        </p:cTn>
+      </p:par>
+    </p:tnLst>
+  </p:timing>
 </p:sld>
 </file>
 
@@ -4966,7 +5998,7 @@
                 <a:ea typeface="Calibri" panose="020F0502020204030204" pitchFamily="34" charset="0"/>
                 <a:cs typeface="Arial" panose="020B0604020202020204" pitchFamily="34" charset="0"/>
               </a:rPr>
-              <a:t>The login method is inside the login Controller class and when the user clicks the login button the method is called, when its called it reads the prefix of the username and compares it to the user prefixes we specified in the </a:t>
+              <a:t>The login method is inside the login Controller class and when the user clicks the login button the method is called, when its called it reads the prefix of the username and compares it to the user prefixes, we specified in the </a:t>
             </a:r>
             <a:r>
               <a:rPr lang="en-US" sz="1800" b="1" dirty="0">
@@ -4991,6 +6023,176 @@
   <p:clrMapOvr>
     <a:masterClrMapping/>
   </p:clrMapOvr>
+  <p:timing>
+    <p:tnLst>
+      <p:par>
+        <p:cTn id="1" dur="indefinite" restart="never" nodeType="tmRoot">
+          <p:childTnLst>
+            <p:seq concurrent="1" nextAc="seek">
+              <p:cTn id="2" dur="indefinite" nodeType="mainSeq">
+                <p:childTnLst>
+                  <p:par>
+                    <p:cTn id="3" fill="hold">
+                      <p:stCondLst>
+                        <p:cond delay="indefinite"/>
+                      </p:stCondLst>
+                      <p:childTnLst>
+                        <p:par>
+                          <p:cTn id="4" fill="hold">
+                            <p:stCondLst>
+                              <p:cond delay="0"/>
+                            </p:stCondLst>
+                            <p:childTnLst>
+                              <p:par>
+                                <p:cTn id="5" presetID="1" presetClass="entr" presetSubtype="0" fill="hold" nodeType="clickEffect">
+                                  <p:stCondLst>
+                                    <p:cond delay="0"/>
+                                  </p:stCondLst>
+                                  <p:childTnLst>
+                                    <p:set>
+                                      <p:cBhvr>
+                                        <p:cTn id="6" dur="1" fill="hold">
+                                          <p:stCondLst>
+                                            <p:cond delay="0"/>
+                                          </p:stCondLst>
+                                        </p:cTn>
+                                        <p:tgtEl>
+                                          <p:spTgt spid="4">
+                                            <p:txEl>
+                                              <p:pRg st="0" end="0"/>
+                                            </p:txEl>
+                                          </p:spTgt>
+                                        </p:tgtEl>
+                                        <p:attrNameLst>
+                                          <p:attrName>style.visibility</p:attrName>
+                                        </p:attrNameLst>
+                                      </p:cBhvr>
+                                      <p:to>
+                                        <p:strVal val="visible"/>
+                                      </p:to>
+                                    </p:set>
+                                  </p:childTnLst>
+                                </p:cTn>
+                              </p:par>
+                            </p:childTnLst>
+                          </p:cTn>
+                        </p:par>
+                      </p:childTnLst>
+                    </p:cTn>
+                  </p:par>
+                  <p:par>
+                    <p:cTn id="7" fill="hold">
+                      <p:stCondLst>
+                        <p:cond delay="indefinite"/>
+                      </p:stCondLst>
+                      <p:childTnLst>
+                        <p:par>
+                          <p:cTn id="8" fill="hold">
+                            <p:stCondLst>
+                              <p:cond delay="0"/>
+                            </p:stCondLst>
+                            <p:childTnLst>
+                              <p:par>
+                                <p:cTn id="9" presetID="2" presetClass="entr" presetSubtype="4" fill="hold" nodeType="clickEffect">
+                                  <p:stCondLst>
+                                    <p:cond delay="0"/>
+                                  </p:stCondLst>
+                                  <p:childTnLst>
+                                    <p:set>
+                                      <p:cBhvr>
+                                        <p:cTn id="10" dur="1" fill="hold">
+                                          <p:stCondLst>
+                                            <p:cond delay="0"/>
+                                          </p:stCondLst>
+                                        </p:cTn>
+                                        <p:tgtEl>
+                                          <p:spTgt spid="5"/>
+                                        </p:tgtEl>
+                                        <p:attrNameLst>
+                                          <p:attrName>style.visibility</p:attrName>
+                                        </p:attrNameLst>
+                                      </p:cBhvr>
+                                      <p:to>
+                                        <p:strVal val="visible"/>
+                                      </p:to>
+                                    </p:set>
+                                    <p:anim calcmode="lin" valueType="num">
+                                      <p:cBhvr additive="base">
+                                        <p:cTn id="11" dur="500" fill="hold"/>
+                                        <p:tgtEl>
+                                          <p:spTgt spid="5"/>
+                                        </p:tgtEl>
+                                        <p:attrNameLst>
+                                          <p:attrName>ppt_x</p:attrName>
+                                        </p:attrNameLst>
+                                      </p:cBhvr>
+                                      <p:tavLst>
+                                        <p:tav tm="0">
+                                          <p:val>
+                                            <p:strVal val="#ppt_x"/>
+                                          </p:val>
+                                        </p:tav>
+                                        <p:tav tm="100000">
+                                          <p:val>
+                                            <p:strVal val="#ppt_x"/>
+                                          </p:val>
+                                        </p:tav>
+                                      </p:tavLst>
+                                    </p:anim>
+                                    <p:anim calcmode="lin" valueType="num">
+                                      <p:cBhvr additive="base">
+                                        <p:cTn id="12" dur="500" fill="hold"/>
+                                        <p:tgtEl>
+                                          <p:spTgt spid="5"/>
+                                        </p:tgtEl>
+                                        <p:attrNameLst>
+                                          <p:attrName>ppt_y</p:attrName>
+                                        </p:attrNameLst>
+                                      </p:cBhvr>
+                                      <p:tavLst>
+                                        <p:tav tm="0">
+                                          <p:val>
+                                            <p:strVal val="1+#ppt_h/2"/>
+                                          </p:val>
+                                        </p:tav>
+                                        <p:tav tm="100000">
+                                          <p:val>
+                                            <p:strVal val="#ppt_y"/>
+                                          </p:val>
+                                        </p:tav>
+                                      </p:tavLst>
+                                    </p:anim>
+                                  </p:childTnLst>
+                                </p:cTn>
+                              </p:par>
+                            </p:childTnLst>
+                          </p:cTn>
+                        </p:par>
+                      </p:childTnLst>
+                    </p:cTn>
+                  </p:par>
+                </p:childTnLst>
+              </p:cTn>
+              <p:prevCondLst>
+                <p:cond evt="onPrev" delay="0">
+                  <p:tgtEl>
+                    <p:sldTgt/>
+                  </p:tgtEl>
+                </p:cond>
+              </p:prevCondLst>
+              <p:nextCondLst>
+                <p:cond evt="onNext" delay="0">
+                  <p:tgtEl>
+                    <p:sldTgt/>
+                  </p:tgtEl>
+                </p:cond>
+              </p:nextCondLst>
+            </p:seq>
+          </p:childTnLst>
+        </p:cTn>
+      </p:par>
+    </p:tnLst>
+  </p:timing>
 </p:sld>
 </file>
 
@@ -5123,6 +6325,176 @@
   <p:clrMapOvr>
     <a:masterClrMapping/>
   </p:clrMapOvr>
+  <p:timing>
+    <p:tnLst>
+      <p:par>
+        <p:cTn id="1" dur="indefinite" restart="never" nodeType="tmRoot">
+          <p:childTnLst>
+            <p:seq concurrent="1" nextAc="seek">
+              <p:cTn id="2" dur="indefinite" nodeType="mainSeq">
+                <p:childTnLst>
+                  <p:par>
+                    <p:cTn id="3" fill="hold">
+                      <p:stCondLst>
+                        <p:cond delay="indefinite"/>
+                      </p:stCondLst>
+                      <p:childTnLst>
+                        <p:par>
+                          <p:cTn id="4" fill="hold">
+                            <p:stCondLst>
+                              <p:cond delay="0"/>
+                            </p:stCondLst>
+                            <p:childTnLst>
+                              <p:par>
+                                <p:cTn id="5" presetID="1" presetClass="entr" presetSubtype="0" fill="hold" nodeType="clickEffect">
+                                  <p:stCondLst>
+                                    <p:cond delay="0"/>
+                                  </p:stCondLst>
+                                  <p:childTnLst>
+                                    <p:set>
+                                      <p:cBhvr>
+                                        <p:cTn id="6" dur="1" fill="hold">
+                                          <p:stCondLst>
+                                            <p:cond delay="0"/>
+                                          </p:stCondLst>
+                                        </p:cTn>
+                                        <p:tgtEl>
+                                          <p:spTgt spid="4">
+                                            <p:txEl>
+                                              <p:pRg st="0" end="0"/>
+                                            </p:txEl>
+                                          </p:spTgt>
+                                        </p:tgtEl>
+                                        <p:attrNameLst>
+                                          <p:attrName>style.visibility</p:attrName>
+                                        </p:attrNameLst>
+                                      </p:cBhvr>
+                                      <p:to>
+                                        <p:strVal val="visible"/>
+                                      </p:to>
+                                    </p:set>
+                                  </p:childTnLst>
+                                </p:cTn>
+                              </p:par>
+                            </p:childTnLst>
+                          </p:cTn>
+                        </p:par>
+                      </p:childTnLst>
+                    </p:cTn>
+                  </p:par>
+                  <p:par>
+                    <p:cTn id="7" fill="hold">
+                      <p:stCondLst>
+                        <p:cond delay="indefinite"/>
+                      </p:stCondLst>
+                      <p:childTnLst>
+                        <p:par>
+                          <p:cTn id="8" fill="hold">
+                            <p:stCondLst>
+                              <p:cond delay="0"/>
+                            </p:stCondLst>
+                            <p:childTnLst>
+                              <p:par>
+                                <p:cTn id="9" presetID="2" presetClass="entr" presetSubtype="4" fill="hold" nodeType="clickEffect">
+                                  <p:stCondLst>
+                                    <p:cond delay="0"/>
+                                  </p:stCondLst>
+                                  <p:childTnLst>
+                                    <p:set>
+                                      <p:cBhvr>
+                                        <p:cTn id="10" dur="1" fill="hold">
+                                          <p:stCondLst>
+                                            <p:cond delay="0"/>
+                                          </p:stCondLst>
+                                        </p:cTn>
+                                        <p:tgtEl>
+                                          <p:spTgt spid="5"/>
+                                        </p:tgtEl>
+                                        <p:attrNameLst>
+                                          <p:attrName>style.visibility</p:attrName>
+                                        </p:attrNameLst>
+                                      </p:cBhvr>
+                                      <p:to>
+                                        <p:strVal val="visible"/>
+                                      </p:to>
+                                    </p:set>
+                                    <p:anim calcmode="lin" valueType="num">
+                                      <p:cBhvr additive="base">
+                                        <p:cTn id="11" dur="500" fill="hold"/>
+                                        <p:tgtEl>
+                                          <p:spTgt spid="5"/>
+                                        </p:tgtEl>
+                                        <p:attrNameLst>
+                                          <p:attrName>ppt_x</p:attrName>
+                                        </p:attrNameLst>
+                                      </p:cBhvr>
+                                      <p:tavLst>
+                                        <p:tav tm="0">
+                                          <p:val>
+                                            <p:strVal val="#ppt_x"/>
+                                          </p:val>
+                                        </p:tav>
+                                        <p:tav tm="100000">
+                                          <p:val>
+                                            <p:strVal val="#ppt_x"/>
+                                          </p:val>
+                                        </p:tav>
+                                      </p:tavLst>
+                                    </p:anim>
+                                    <p:anim calcmode="lin" valueType="num">
+                                      <p:cBhvr additive="base">
+                                        <p:cTn id="12" dur="500" fill="hold"/>
+                                        <p:tgtEl>
+                                          <p:spTgt spid="5"/>
+                                        </p:tgtEl>
+                                        <p:attrNameLst>
+                                          <p:attrName>ppt_y</p:attrName>
+                                        </p:attrNameLst>
+                                      </p:cBhvr>
+                                      <p:tavLst>
+                                        <p:tav tm="0">
+                                          <p:val>
+                                            <p:strVal val="1+#ppt_h/2"/>
+                                          </p:val>
+                                        </p:tav>
+                                        <p:tav tm="100000">
+                                          <p:val>
+                                            <p:strVal val="#ppt_y"/>
+                                          </p:val>
+                                        </p:tav>
+                                      </p:tavLst>
+                                    </p:anim>
+                                  </p:childTnLst>
+                                </p:cTn>
+                              </p:par>
+                            </p:childTnLst>
+                          </p:cTn>
+                        </p:par>
+                      </p:childTnLst>
+                    </p:cTn>
+                  </p:par>
+                </p:childTnLst>
+              </p:cTn>
+              <p:prevCondLst>
+                <p:cond evt="onPrev" delay="0">
+                  <p:tgtEl>
+                    <p:sldTgt/>
+                  </p:tgtEl>
+                </p:cond>
+              </p:prevCondLst>
+              <p:nextCondLst>
+                <p:cond evt="onNext" delay="0">
+                  <p:tgtEl>
+                    <p:sldTgt/>
+                  </p:tgtEl>
+                </p:cond>
+              </p:nextCondLst>
+            </p:seq>
+          </p:childTnLst>
+        </p:cTn>
+      </p:par>
+    </p:tnLst>
+  </p:timing>
 </p:sld>
 </file>
 
@@ -5266,6 +6638,176 @@
   <p:clrMapOvr>
     <a:masterClrMapping/>
   </p:clrMapOvr>
+  <p:timing>
+    <p:tnLst>
+      <p:par>
+        <p:cTn id="1" dur="indefinite" restart="never" nodeType="tmRoot">
+          <p:childTnLst>
+            <p:seq concurrent="1" nextAc="seek">
+              <p:cTn id="2" dur="indefinite" nodeType="mainSeq">
+                <p:childTnLst>
+                  <p:par>
+                    <p:cTn id="3" fill="hold">
+                      <p:stCondLst>
+                        <p:cond delay="indefinite"/>
+                      </p:stCondLst>
+                      <p:childTnLst>
+                        <p:par>
+                          <p:cTn id="4" fill="hold">
+                            <p:stCondLst>
+                              <p:cond delay="0"/>
+                            </p:stCondLst>
+                            <p:childTnLst>
+                              <p:par>
+                                <p:cTn id="5" presetID="1" presetClass="entr" presetSubtype="0" fill="hold" nodeType="clickEffect">
+                                  <p:stCondLst>
+                                    <p:cond delay="0"/>
+                                  </p:stCondLst>
+                                  <p:childTnLst>
+                                    <p:set>
+                                      <p:cBhvr>
+                                        <p:cTn id="6" dur="1" fill="hold">
+                                          <p:stCondLst>
+                                            <p:cond delay="0"/>
+                                          </p:stCondLst>
+                                        </p:cTn>
+                                        <p:tgtEl>
+                                          <p:spTgt spid="4">
+                                            <p:txEl>
+                                              <p:pRg st="0" end="0"/>
+                                            </p:txEl>
+                                          </p:spTgt>
+                                        </p:tgtEl>
+                                        <p:attrNameLst>
+                                          <p:attrName>style.visibility</p:attrName>
+                                        </p:attrNameLst>
+                                      </p:cBhvr>
+                                      <p:to>
+                                        <p:strVal val="visible"/>
+                                      </p:to>
+                                    </p:set>
+                                  </p:childTnLst>
+                                </p:cTn>
+                              </p:par>
+                            </p:childTnLst>
+                          </p:cTn>
+                        </p:par>
+                      </p:childTnLst>
+                    </p:cTn>
+                  </p:par>
+                  <p:par>
+                    <p:cTn id="7" fill="hold">
+                      <p:stCondLst>
+                        <p:cond delay="indefinite"/>
+                      </p:stCondLst>
+                      <p:childTnLst>
+                        <p:par>
+                          <p:cTn id="8" fill="hold">
+                            <p:stCondLst>
+                              <p:cond delay="0"/>
+                            </p:stCondLst>
+                            <p:childTnLst>
+                              <p:par>
+                                <p:cTn id="9" presetID="2" presetClass="entr" presetSubtype="4" fill="hold" nodeType="clickEffect">
+                                  <p:stCondLst>
+                                    <p:cond delay="0"/>
+                                  </p:stCondLst>
+                                  <p:childTnLst>
+                                    <p:set>
+                                      <p:cBhvr>
+                                        <p:cTn id="10" dur="1" fill="hold">
+                                          <p:stCondLst>
+                                            <p:cond delay="0"/>
+                                          </p:stCondLst>
+                                        </p:cTn>
+                                        <p:tgtEl>
+                                          <p:spTgt spid="5"/>
+                                        </p:tgtEl>
+                                        <p:attrNameLst>
+                                          <p:attrName>style.visibility</p:attrName>
+                                        </p:attrNameLst>
+                                      </p:cBhvr>
+                                      <p:to>
+                                        <p:strVal val="visible"/>
+                                      </p:to>
+                                    </p:set>
+                                    <p:anim calcmode="lin" valueType="num">
+                                      <p:cBhvr additive="base">
+                                        <p:cTn id="11" dur="500" fill="hold"/>
+                                        <p:tgtEl>
+                                          <p:spTgt spid="5"/>
+                                        </p:tgtEl>
+                                        <p:attrNameLst>
+                                          <p:attrName>ppt_x</p:attrName>
+                                        </p:attrNameLst>
+                                      </p:cBhvr>
+                                      <p:tavLst>
+                                        <p:tav tm="0">
+                                          <p:val>
+                                            <p:strVal val="#ppt_x"/>
+                                          </p:val>
+                                        </p:tav>
+                                        <p:tav tm="100000">
+                                          <p:val>
+                                            <p:strVal val="#ppt_x"/>
+                                          </p:val>
+                                        </p:tav>
+                                      </p:tavLst>
+                                    </p:anim>
+                                    <p:anim calcmode="lin" valueType="num">
+                                      <p:cBhvr additive="base">
+                                        <p:cTn id="12" dur="500" fill="hold"/>
+                                        <p:tgtEl>
+                                          <p:spTgt spid="5"/>
+                                        </p:tgtEl>
+                                        <p:attrNameLst>
+                                          <p:attrName>ppt_y</p:attrName>
+                                        </p:attrNameLst>
+                                      </p:cBhvr>
+                                      <p:tavLst>
+                                        <p:tav tm="0">
+                                          <p:val>
+                                            <p:strVal val="1+#ppt_h/2"/>
+                                          </p:val>
+                                        </p:tav>
+                                        <p:tav tm="100000">
+                                          <p:val>
+                                            <p:strVal val="#ppt_y"/>
+                                          </p:val>
+                                        </p:tav>
+                                      </p:tavLst>
+                                    </p:anim>
+                                  </p:childTnLst>
+                                </p:cTn>
+                              </p:par>
+                            </p:childTnLst>
+                          </p:cTn>
+                        </p:par>
+                      </p:childTnLst>
+                    </p:cTn>
+                  </p:par>
+                </p:childTnLst>
+              </p:cTn>
+              <p:prevCondLst>
+                <p:cond evt="onPrev" delay="0">
+                  <p:tgtEl>
+                    <p:sldTgt/>
+                  </p:tgtEl>
+                </p:cond>
+              </p:prevCondLst>
+              <p:nextCondLst>
+                <p:cond evt="onNext" delay="0">
+                  <p:tgtEl>
+                    <p:sldTgt/>
+                  </p:tgtEl>
+                </p:cond>
+              </p:nextCondLst>
+            </p:seq>
+          </p:childTnLst>
+        </p:cTn>
+      </p:par>
+    </p:tnLst>
+  </p:timing>
 </p:sld>
 </file>
 
@@ -6034,6 +7576,145 @@
   <p:clrMapOvr>
     <a:masterClrMapping/>
   </p:clrMapOvr>
+  <p:timing>
+    <p:tnLst>
+      <p:par>
+        <p:cTn id="1" dur="indefinite" restart="never" nodeType="tmRoot">
+          <p:childTnLst>
+            <p:seq concurrent="1" nextAc="seek">
+              <p:cTn id="2" dur="indefinite" nodeType="mainSeq">
+                <p:childTnLst>
+                  <p:par>
+                    <p:cTn id="3" fill="hold">
+                      <p:stCondLst>
+                        <p:cond delay="indefinite"/>
+                      </p:stCondLst>
+                      <p:childTnLst>
+                        <p:par>
+                          <p:cTn id="4" fill="hold">
+                            <p:stCondLst>
+                              <p:cond delay="0"/>
+                            </p:stCondLst>
+                            <p:childTnLst>
+                              <p:par>
+                                <p:cTn id="5" presetID="16" presetClass="entr" presetSubtype="21" fill="hold" nodeType="clickEffect">
+                                  <p:stCondLst>
+                                    <p:cond delay="0"/>
+                                  </p:stCondLst>
+                                  <p:childTnLst>
+                                    <p:set>
+                                      <p:cBhvr>
+                                        <p:cTn id="6" dur="1" fill="hold">
+                                          <p:stCondLst>
+                                            <p:cond delay="0"/>
+                                          </p:stCondLst>
+                                        </p:cTn>
+                                        <p:tgtEl>
+                                          <p:spTgt spid="22"/>
+                                        </p:tgtEl>
+                                        <p:attrNameLst>
+                                          <p:attrName>style.visibility</p:attrName>
+                                        </p:attrNameLst>
+                                      </p:cBhvr>
+                                      <p:to>
+                                        <p:strVal val="visible"/>
+                                      </p:to>
+                                    </p:set>
+                                    <p:animEffect transition="in" filter="barn(inVertical)">
+                                      <p:cBhvr>
+                                        <p:cTn id="7" dur="500"/>
+                                        <p:tgtEl>
+                                          <p:spTgt spid="22"/>
+                                        </p:tgtEl>
+                                      </p:cBhvr>
+                                    </p:animEffect>
+                                  </p:childTnLst>
+                                </p:cTn>
+                              </p:par>
+                            </p:childTnLst>
+                          </p:cTn>
+                        </p:par>
+                      </p:childTnLst>
+                    </p:cTn>
+                  </p:par>
+                  <p:par>
+                    <p:cTn id="8" fill="hold">
+                      <p:stCondLst>
+                        <p:cond delay="indefinite"/>
+                      </p:stCondLst>
+                      <p:childTnLst>
+                        <p:par>
+                          <p:cTn id="9" fill="hold">
+                            <p:stCondLst>
+                              <p:cond delay="0"/>
+                            </p:stCondLst>
+                            <p:childTnLst>
+                              <p:par>
+                                <p:cTn id="10" presetID="14" presetClass="entr" presetSubtype="10" fill="hold" grpId="0" nodeType="clickEffect">
+                                  <p:stCondLst>
+                                    <p:cond delay="0"/>
+                                  </p:stCondLst>
+                                  <p:childTnLst>
+                                    <p:set>
+                                      <p:cBhvr>
+                                        <p:cTn id="11" dur="1" fill="hold">
+                                          <p:stCondLst>
+                                            <p:cond delay="0"/>
+                                          </p:stCondLst>
+                                        </p:cTn>
+                                        <p:tgtEl>
+                                          <p:spTgt spid="4"/>
+                                        </p:tgtEl>
+                                        <p:attrNameLst>
+                                          <p:attrName>style.visibility</p:attrName>
+                                        </p:attrNameLst>
+                                      </p:cBhvr>
+                                      <p:to>
+                                        <p:strVal val="visible"/>
+                                      </p:to>
+                                    </p:set>
+                                    <p:animEffect transition="in" filter="randombar(horizontal)">
+                                      <p:cBhvr>
+                                        <p:cTn id="12" dur="500"/>
+                                        <p:tgtEl>
+                                          <p:spTgt spid="4"/>
+                                        </p:tgtEl>
+                                      </p:cBhvr>
+                                    </p:animEffect>
+                                  </p:childTnLst>
+                                </p:cTn>
+                              </p:par>
+                            </p:childTnLst>
+                          </p:cTn>
+                        </p:par>
+                      </p:childTnLst>
+                    </p:cTn>
+                  </p:par>
+                </p:childTnLst>
+              </p:cTn>
+              <p:prevCondLst>
+                <p:cond evt="onPrev" delay="0">
+                  <p:tgtEl>
+                    <p:sldTgt/>
+                  </p:tgtEl>
+                </p:cond>
+              </p:prevCondLst>
+              <p:nextCondLst>
+                <p:cond evt="onNext" delay="0">
+                  <p:tgtEl>
+                    <p:sldTgt/>
+                  </p:tgtEl>
+                </p:cond>
+              </p:nextCondLst>
+            </p:seq>
+          </p:childTnLst>
+        </p:cTn>
+      </p:par>
+    </p:tnLst>
+    <p:bldLst>
+      <p:bldP spid="4" grpId="0"/>
+    </p:bldLst>
+  </p:timing>
 </p:sld>
 </file>
 
@@ -6552,11 +8233,11 @@
                 <a:latin typeface="Times New Roman" panose="02020603050405020304" pitchFamily="18" charset="0"/>
                 <a:cs typeface="Times New Roman" panose="02020603050405020304" pitchFamily="18" charset="0"/>
               </a:rPr>
-              <a:t>Every system needs its requirements  set out to be able to know if they match the needs of the stakeholders and clients and there are two kinds of requirements :</a:t>
-            </a:r>
-          </a:p>
-          <a:p>
-            <a:pPr marL="742950" lvl="1" indent="-285750">
+              <a:t>Every system needs its requirements  set out to be able to know if they match the needs of the 	stakeholders and clients and there are two kinds of requirements :</a:t>
+            </a:r>
+          </a:p>
+          <a:p>
+            <a:pPr marL="1200150" lvl="2" indent="-285750">
               <a:buFont typeface="Arial" panose="020B0604020202020204" pitchFamily="34" charset="0"/>
               <a:buChar char="•"/>
             </a:pPr>
@@ -6576,7 +8257,7 @@
             </a:r>
           </a:p>
           <a:p>
-            <a:pPr marL="742950" lvl="1" indent="-285750">
+            <a:pPr marL="1200150" lvl="2" indent="-285750">
               <a:buFont typeface="Arial" panose="020B0604020202020204" pitchFamily="34" charset="0"/>
               <a:buChar char="•"/>
             </a:pPr>
@@ -6619,9 +8300,6 @@
                     <p:cTn id="3" fill="hold">
                       <p:stCondLst>
                         <p:cond delay="indefinite"/>
-                        <p:cond evt="onBegin" delay="0">
-                          <p:tn val="2"/>
-                        </p:cond>
                       </p:stCondLst>
                       <p:childTnLst>
                         <p:par>
@@ -6631,7 +8309,7 @@
                             </p:stCondLst>
                             <p:childTnLst>
                               <p:par>
-                                <p:cTn id="5" presetID="1" presetClass="entr" presetSubtype="0" fill="hold" nodeType="withEffect">
+                                <p:cTn id="5" presetID="1" presetClass="entr" presetSubtype="0" fill="hold" nodeType="clickEffect">
                                   <p:stCondLst>
                                     <p:cond delay="0"/>
                                   </p:stCondLst>
@@ -6646,7 +8324,7 @@
                                         <p:tgtEl>
                                           <p:spTgt spid="3">
                                             <p:txEl>
-                                              <p:pRg st="1" end="1"/>
+                                              <p:pRg st="0" end="0"/>
                                             </p:txEl>
                                           </p:spTgt>
                                         </p:tgtEl>
@@ -6677,37 +8355,6 @@
                                         <p:tgtEl>
                                           <p:spTgt spid="3">
                                             <p:txEl>
-                                              <p:pRg st="0" end="0"/>
-                                            </p:txEl>
-                                          </p:spTgt>
-                                        </p:tgtEl>
-                                        <p:attrNameLst>
-                                          <p:attrName>style.visibility</p:attrName>
-                                        </p:attrNameLst>
-                                      </p:cBhvr>
-                                      <p:to>
-                                        <p:strVal val="visible"/>
-                                      </p:to>
-                                    </p:set>
-                                  </p:childTnLst>
-                                </p:cTn>
-                              </p:par>
-                              <p:par>
-                                <p:cTn id="9" presetID="1" presetClass="entr" presetSubtype="0" fill="hold" nodeType="withEffect">
-                                  <p:stCondLst>
-                                    <p:cond delay="0"/>
-                                  </p:stCondLst>
-                                  <p:childTnLst>
-                                    <p:set>
-                                      <p:cBhvr>
-                                        <p:cTn id="10" dur="1" fill="hold">
-                                          <p:stCondLst>
-                                            <p:cond delay="0"/>
-                                          </p:stCondLst>
-                                        </p:cTn>
-                                        <p:tgtEl>
-                                          <p:spTgt spid="4">
-                                            <p:txEl>
                                               <p:pRg st="1" end="1"/>
                                             </p:txEl>
                                           </p:spTgt>
@@ -6723,8 +8370,26 @@
                                   </p:childTnLst>
                                 </p:cTn>
                               </p:par>
+                            </p:childTnLst>
+                          </p:cTn>
+                        </p:par>
+                      </p:childTnLst>
+                    </p:cTn>
+                  </p:par>
+                  <p:par>
+                    <p:cTn id="9" fill="hold">
+                      <p:stCondLst>
+                        <p:cond delay="indefinite"/>
+                      </p:stCondLst>
+                      <p:childTnLst>
+                        <p:par>
+                          <p:cTn id="10" fill="hold">
+                            <p:stCondLst>
+                              <p:cond delay="0"/>
+                            </p:stCondLst>
+                            <p:childTnLst>
                               <p:par>
-                                <p:cTn id="11" presetID="1" presetClass="entr" presetSubtype="0" fill="hold" nodeType="withEffect">
+                                <p:cTn id="11" presetID="1" presetClass="entr" presetSubtype="0" fill="hold" nodeType="clickEffect">
                                   <p:stCondLst>
                                     <p:cond delay="0"/>
                                   </p:stCondLst>
@@ -6754,6 +8419,37 @@
                                   </p:childTnLst>
                                 </p:cTn>
                               </p:par>
+                              <p:par>
+                                <p:cTn id="13" presetID="1" presetClass="entr" presetSubtype="0" fill="hold" nodeType="withEffect">
+                                  <p:stCondLst>
+                                    <p:cond delay="0"/>
+                                  </p:stCondLst>
+                                  <p:childTnLst>
+                                    <p:set>
+                                      <p:cBhvr>
+                                        <p:cTn id="14" dur="1" fill="hold">
+                                          <p:stCondLst>
+                                            <p:cond delay="0"/>
+                                          </p:stCondLst>
+                                        </p:cTn>
+                                        <p:tgtEl>
+                                          <p:spTgt spid="4">
+                                            <p:txEl>
+                                              <p:pRg st="1" end="1"/>
+                                            </p:txEl>
+                                          </p:spTgt>
+                                        </p:tgtEl>
+                                        <p:attrNameLst>
+                                          <p:attrName>style.visibility</p:attrName>
+                                        </p:attrNameLst>
+                                      </p:cBhvr>
+                                      <p:to>
+                                        <p:strVal val="visible"/>
+                                      </p:to>
+                                    </p:set>
+                                  </p:childTnLst>
+                                </p:cTn>
+                              </p:par>
                             </p:childTnLst>
                           </p:cTn>
                         </p:par>
@@ -6761,26 +8457,26 @@
                     </p:cTn>
                   </p:par>
                   <p:par>
-                    <p:cTn id="13" fill="hold">
+                    <p:cTn id="15" fill="hold">
                       <p:stCondLst>
                         <p:cond delay="indefinite"/>
                       </p:stCondLst>
                       <p:childTnLst>
                         <p:par>
-                          <p:cTn id="14" fill="hold">
+                          <p:cTn id="16" fill="hold">
                             <p:stCondLst>
                               <p:cond delay="0"/>
                             </p:stCondLst>
                             <p:childTnLst>
                               <p:par>
-                                <p:cTn id="15" presetID="1" presetClass="entr" presetSubtype="0" fill="hold" nodeType="clickEffect">
+                                <p:cTn id="17" presetID="1" presetClass="entr" presetSubtype="0" fill="hold" nodeType="clickEffect">
                                   <p:stCondLst>
                                     <p:cond delay="0"/>
                                   </p:stCondLst>
                                   <p:childTnLst>
                                     <p:set>
                                       <p:cBhvr>
-                                        <p:cTn id="16" dur="1" fill="hold">
+                                        <p:cTn id="18" dur="1" fill="hold">
                                           <p:stCondLst>
                                             <p:cond delay="0"/>
                                           </p:stCondLst>
@@ -6810,26 +8506,26 @@
                     </p:cTn>
                   </p:par>
                   <p:par>
-                    <p:cTn id="17" fill="hold">
+                    <p:cTn id="19" fill="hold">
                       <p:stCondLst>
                         <p:cond delay="indefinite"/>
                       </p:stCondLst>
                       <p:childTnLst>
                         <p:par>
-                          <p:cTn id="18" fill="hold">
+                          <p:cTn id="20" fill="hold">
                             <p:stCondLst>
                               <p:cond delay="0"/>
                             </p:stCondLst>
                             <p:childTnLst>
                               <p:par>
-                                <p:cTn id="19" presetID="1" presetClass="entr" presetSubtype="0" fill="hold" nodeType="clickEffect">
+                                <p:cTn id="21" presetID="1" presetClass="entr" presetSubtype="0" fill="hold" nodeType="clickEffect">
                                   <p:stCondLst>
                                     <p:cond delay="0"/>
                                   </p:stCondLst>
                                   <p:childTnLst>
                                     <p:set>
                                       <p:cBhvr>
-                                        <p:cTn id="20" dur="1" fill="hold">
+                                        <p:cTn id="22" dur="1" fill="hold">
                                           <p:stCondLst>
                                             <p:cond delay="0"/>
                                           </p:stCondLst>
@@ -8047,6 +9743,289 @@
   <p:clrMapOvr>
     <a:masterClrMapping/>
   </p:clrMapOvr>
+  <p:timing>
+    <p:tnLst>
+      <p:par>
+        <p:cTn id="1" dur="indefinite" restart="never" nodeType="tmRoot">
+          <p:childTnLst>
+            <p:seq concurrent="1" nextAc="seek">
+              <p:cTn id="2" dur="indefinite" nodeType="mainSeq">
+                <p:childTnLst>
+                  <p:par>
+                    <p:cTn id="3" fill="hold">
+                      <p:stCondLst>
+                        <p:cond delay="indefinite"/>
+                      </p:stCondLst>
+                      <p:childTnLst>
+                        <p:par>
+                          <p:cTn id="4" fill="hold">
+                            <p:stCondLst>
+                              <p:cond delay="0"/>
+                            </p:stCondLst>
+                            <p:childTnLst>
+                              <p:par>
+                                <p:cTn id="5" presetID="1" presetClass="entr" presetSubtype="0" fill="hold" nodeType="clickEffect">
+                                  <p:stCondLst>
+                                    <p:cond delay="0"/>
+                                  </p:stCondLst>
+                                  <p:childTnLst>
+                                    <p:set>
+                                      <p:cBhvr>
+                                        <p:cTn id="6" dur="1" fill="hold">
+                                          <p:stCondLst>
+                                            <p:cond delay="0"/>
+                                          </p:stCondLst>
+                                        </p:cTn>
+                                        <p:tgtEl>
+                                          <p:spTgt spid="8">
+                                            <p:txEl>
+                                              <p:pRg st="0" end="0"/>
+                                            </p:txEl>
+                                          </p:spTgt>
+                                        </p:tgtEl>
+                                        <p:attrNameLst>
+                                          <p:attrName>style.visibility</p:attrName>
+                                        </p:attrNameLst>
+                                      </p:cBhvr>
+                                      <p:to>
+                                        <p:strVal val="visible"/>
+                                      </p:to>
+                                    </p:set>
+                                  </p:childTnLst>
+                                </p:cTn>
+                              </p:par>
+                              <p:par>
+                                <p:cTn id="7" presetID="1" presetClass="entr" presetSubtype="0" fill="hold" nodeType="withEffect">
+                                  <p:stCondLst>
+                                    <p:cond delay="0"/>
+                                  </p:stCondLst>
+                                  <p:childTnLst>
+                                    <p:set>
+                                      <p:cBhvr>
+                                        <p:cTn id="8" dur="1" fill="hold">
+                                          <p:stCondLst>
+                                            <p:cond delay="0"/>
+                                          </p:stCondLst>
+                                        </p:cTn>
+                                        <p:tgtEl>
+                                          <p:spTgt spid="8">
+                                            <p:txEl>
+                                              <p:pRg st="1" end="1"/>
+                                            </p:txEl>
+                                          </p:spTgt>
+                                        </p:tgtEl>
+                                        <p:attrNameLst>
+                                          <p:attrName>style.visibility</p:attrName>
+                                        </p:attrNameLst>
+                                      </p:cBhvr>
+                                      <p:to>
+                                        <p:strVal val="visible"/>
+                                      </p:to>
+                                    </p:set>
+                                  </p:childTnLst>
+                                </p:cTn>
+                              </p:par>
+                              <p:par>
+                                <p:cTn id="9" presetID="1" presetClass="entr" presetSubtype="0" fill="hold" nodeType="withEffect">
+                                  <p:stCondLst>
+                                    <p:cond delay="0"/>
+                                  </p:stCondLst>
+                                  <p:childTnLst>
+                                    <p:set>
+                                      <p:cBhvr>
+                                        <p:cTn id="10" dur="1" fill="hold">
+                                          <p:stCondLst>
+                                            <p:cond delay="0"/>
+                                          </p:stCondLst>
+                                        </p:cTn>
+                                        <p:tgtEl>
+                                          <p:spTgt spid="8">
+                                            <p:txEl>
+                                              <p:pRg st="2" end="2"/>
+                                            </p:txEl>
+                                          </p:spTgt>
+                                        </p:tgtEl>
+                                        <p:attrNameLst>
+                                          <p:attrName>style.visibility</p:attrName>
+                                        </p:attrNameLst>
+                                      </p:cBhvr>
+                                      <p:to>
+                                        <p:strVal val="visible"/>
+                                      </p:to>
+                                    </p:set>
+                                  </p:childTnLst>
+                                </p:cTn>
+                              </p:par>
+                              <p:par>
+                                <p:cTn id="11" presetID="1" presetClass="entr" presetSubtype="0" fill="hold" nodeType="withEffect">
+                                  <p:stCondLst>
+                                    <p:cond delay="0"/>
+                                  </p:stCondLst>
+                                  <p:childTnLst>
+                                    <p:set>
+                                      <p:cBhvr>
+                                        <p:cTn id="12" dur="1" fill="hold">
+                                          <p:stCondLst>
+                                            <p:cond delay="0"/>
+                                          </p:stCondLst>
+                                        </p:cTn>
+                                        <p:tgtEl>
+                                          <p:spTgt spid="8">
+                                            <p:txEl>
+                                              <p:pRg st="3" end="3"/>
+                                            </p:txEl>
+                                          </p:spTgt>
+                                        </p:tgtEl>
+                                        <p:attrNameLst>
+                                          <p:attrName>style.visibility</p:attrName>
+                                        </p:attrNameLst>
+                                      </p:cBhvr>
+                                      <p:to>
+                                        <p:strVal val="visible"/>
+                                      </p:to>
+                                    </p:set>
+                                  </p:childTnLst>
+                                </p:cTn>
+                              </p:par>
+                              <p:par>
+                                <p:cTn id="13" presetID="1" presetClass="entr" presetSubtype="0" fill="hold" nodeType="withEffect">
+                                  <p:stCondLst>
+                                    <p:cond delay="0"/>
+                                  </p:stCondLst>
+                                  <p:childTnLst>
+                                    <p:set>
+                                      <p:cBhvr>
+                                        <p:cTn id="14" dur="1" fill="hold">
+                                          <p:stCondLst>
+                                            <p:cond delay="0"/>
+                                          </p:stCondLst>
+                                        </p:cTn>
+                                        <p:tgtEl>
+                                          <p:spTgt spid="8">
+                                            <p:txEl>
+                                              <p:pRg st="4" end="4"/>
+                                            </p:txEl>
+                                          </p:spTgt>
+                                        </p:tgtEl>
+                                        <p:attrNameLst>
+                                          <p:attrName>style.visibility</p:attrName>
+                                        </p:attrNameLst>
+                                      </p:cBhvr>
+                                      <p:to>
+                                        <p:strVal val="visible"/>
+                                      </p:to>
+                                    </p:set>
+                                  </p:childTnLst>
+                                </p:cTn>
+                              </p:par>
+                            </p:childTnLst>
+                          </p:cTn>
+                        </p:par>
+                      </p:childTnLst>
+                    </p:cTn>
+                  </p:par>
+                  <p:par>
+                    <p:cTn id="15" fill="hold">
+                      <p:stCondLst>
+                        <p:cond delay="indefinite"/>
+                      </p:stCondLst>
+                      <p:childTnLst>
+                        <p:par>
+                          <p:cTn id="16" fill="hold">
+                            <p:stCondLst>
+                              <p:cond delay="0"/>
+                            </p:stCondLst>
+                            <p:childTnLst>
+                              <p:par>
+                                <p:cTn id="17" presetID="1" presetClass="entr" presetSubtype="0" fill="hold" nodeType="clickEffect">
+                                  <p:stCondLst>
+                                    <p:cond delay="0"/>
+                                  </p:stCondLst>
+                                  <p:childTnLst>
+                                    <p:set>
+                                      <p:cBhvr>
+                                        <p:cTn id="18" dur="1" fill="hold">
+                                          <p:stCondLst>
+                                            <p:cond delay="0"/>
+                                          </p:stCondLst>
+                                        </p:cTn>
+                                        <p:tgtEl>
+                                          <p:spTgt spid="8">
+                                            <p:txEl>
+                                              <p:pRg st="5" end="5"/>
+                                            </p:txEl>
+                                          </p:spTgt>
+                                        </p:tgtEl>
+                                        <p:attrNameLst>
+                                          <p:attrName>style.visibility</p:attrName>
+                                        </p:attrNameLst>
+                                      </p:cBhvr>
+                                      <p:to>
+                                        <p:strVal val="visible"/>
+                                      </p:to>
+                                    </p:set>
+                                  </p:childTnLst>
+                                </p:cTn>
+                              </p:par>
+                              <p:par>
+                                <p:cTn id="19" presetID="1" presetClass="entr" presetSubtype="0" fill="hold" nodeType="withEffect">
+                                  <p:stCondLst>
+                                    <p:cond delay="0"/>
+                                  </p:stCondLst>
+                                  <p:childTnLst>
+                                    <p:set>
+                                      <p:cBhvr>
+                                        <p:cTn id="20" dur="1" fill="hold">
+                                          <p:stCondLst>
+                                            <p:cond delay="0"/>
+                                          </p:stCondLst>
+                                        </p:cTn>
+                                        <p:tgtEl>
+                                          <p:spTgt spid="8">
+                                            <p:txEl>
+                                              <p:pRg st="6" end="6"/>
+                                            </p:txEl>
+                                          </p:spTgt>
+                                        </p:tgtEl>
+                                        <p:attrNameLst>
+                                          <p:attrName>style.visibility</p:attrName>
+                                        </p:attrNameLst>
+                                      </p:cBhvr>
+                                      <p:to>
+                                        <p:strVal val="visible"/>
+                                      </p:to>
+                                    </p:set>
+                                  </p:childTnLst>
+                                </p:cTn>
+                              </p:par>
+                            </p:childTnLst>
+                          </p:cTn>
+                        </p:par>
+                      </p:childTnLst>
+                    </p:cTn>
+                  </p:par>
+                </p:childTnLst>
+              </p:cTn>
+              <p:prevCondLst>
+                <p:cond evt="onPrev" delay="0">
+                  <p:tgtEl>
+                    <p:sldTgt/>
+                  </p:tgtEl>
+                </p:cond>
+              </p:prevCondLst>
+              <p:nextCondLst>
+                <p:cond evt="onNext" delay="0">
+                  <p:tgtEl>
+                    <p:sldTgt/>
+                  </p:tgtEl>
+                </p:cond>
+              </p:nextCondLst>
+            </p:seq>
+          </p:childTnLst>
+        </p:cTn>
+      </p:par>
+    </p:tnLst>
+  </p:timing>
 </p:sld>
 </file>
 
@@ -8201,6 +10180,256 @@
   <p:clrMapOvr>
     <a:masterClrMapping/>
   </p:clrMapOvr>
+  <p:timing>
+    <p:tnLst>
+      <p:par>
+        <p:cTn id="1" dur="indefinite" restart="never" nodeType="tmRoot">
+          <p:childTnLst>
+            <p:seq concurrent="1" nextAc="seek">
+              <p:cTn id="2" dur="indefinite" nodeType="mainSeq">
+                <p:childTnLst>
+                  <p:par>
+                    <p:cTn id="3" fill="hold">
+                      <p:stCondLst>
+                        <p:cond delay="indefinite"/>
+                      </p:stCondLst>
+                      <p:childTnLst>
+                        <p:par>
+                          <p:cTn id="4" fill="hold">
+                            <p:stCondLst>
+                              <p:cond delay="0"/>
+                            </p:stCondLst>
+                            <p:childTnLst>
+                              <p:par>
+                                <p:cTn id="5" presetID="1" presetClass="entr" presetSubtype="0" fill="hold" nodeType="clickEffect">
+                                  <p:stCondLst>
+                                    <p:cond delay="0"/>
+                                  </p:stCondLst>
+                                  <p:childTnLst>
+                                    <p:set>
+                                      <p:cBhvr>
+                                        <p:cTn id="6" dur="1" fill="hold">
+                                          <p:stCondLst>
+                                            <p:cond delay="0"/>
+                                          </p:stCondLst>
+                                        </p:cTn>
+                                        <p:tgtEl>
+                                          <p:spTgt spid="11">
+                                            <p:txEl>
+                                              <p:pRg st="0" end="0"/>
+                                            </p:txEl>
+                                          </p:spTgt>
+                                        </p:tgtEl>
+                                        <p:attrNameLst>
+                                          <p:attrName>style.visibility</p:attrName>
+                                        </p:attrNameLst>
+                                      </p:cBhvr>
+                                      <p:to>
+                                        <p:strVal val="visible"/>
+                                      </p:to>
+                                    </p:set>
+                                  </p:childTnLst>
+                                </p:cTn>
+                              </p:par>
+                            </p:childTnLst>
+                          </p:cTn>
+                        </p:par>
+                      </p:childTnLst>
+                    </p:cTn>
+                  </p:par>
+                  <p:par>
+                    <p:cTn id="7" fill="hold">
+                      <p:stCondLst>
+                        <p:cond delay="indefinite"/>
+                      </p:stCondLst>
+                      <p:childTnLst>
+                        <p:par>
+                          <p:cTn id="8" fill="hold">
+                            <p:stCondLst>
+                              <p:cond delay="0"/>
+                            </p:stCondLst>
+                            <p:childTnLst>
+                              <p:par>
+                                <p:cTn id="9" presetID="1" presetClass="entr" presetSubtype="0" fill="hold" nodeType="clickEffect">
+                                  <p:stCondLst>
+                                    <p:cond delay="0"/>
+                                  </p:stCondLst>
+                                  <p:childTnLst>
+                                    <p:set>
+                                      <p:cBhvr>
+                                        <p:cTn id="10" dur="1" fill="hold">
+                                          <p:stCondLst>
+                                            <p:cond delay="0"/>
+                                          </p:stCondLst>
+                                        </p:cTn>
+                                        <p:tgtEl>
+                                          <p:spTgt spid="11">
+                                            <p:txEl>
+                                              <p:pRg st="1" end="1"/>
+                                            </p:txEl>
+                                          </p:spTgt>
+                                        </p:tgtEl>
+                                        <p:attrNameLst>
+                                          <p:attrName>style.visibility</p:attrName>
+                                        </p:attrNameLst>
+                                      </p:cBhvr>
+                                      <p:to>
+                                        <p:strVal val="visible"/>
+                                      </p:to>
+                                    </p:set>
+                                  </p:childTnLst>
+                                </p:cTn>
+                              </p:par>
+                              <p:par>
+                                <p:cTn id="11" presetID="1" presetClass="entr" presetSubtype="0" fill="hold" nodeType="withEffect">
+                                  <p:stCondLst>
+                                    <p:cond delay="0"/>
+                                  </p:stCondLst>
+                                  <p:childTnLst>
+                                    <p:set>
+                                      <p:cBhvr>
+                                        <p:cTn id="12" dur="1" fill="hold">
+                                          <p:stCondLst>
+                                            <p:cond delay="0"/>
+                                          </p:stCondLst>
+                                        </p:cTn>
+                                        <p:tgtEl>
+                                          <p:spTgt spid="11">
+                                            <p:txEl>
+                                              <p:pRg st="3" end="3"/>
+                                            </p:txEl>
+                                          </p:spTgt>
+                                        </p:tgtEl>
+                                        <p:attrNameLst>
+                                          <p:attrName>style.visibility</p:attrName>
+                                        </p:attrNameLst>
+                                      </p:cBhvr>
+                                      <p:to>
+                                        <p:strVal val="visible"/>
+                                      </p:to>
+                                    </p:set>
+                                  </p:childTnLst>
+                                </p:cTn>
+                              </p:par>
+                            </p:childTnLst>
+                          </p:cTn>
+                        </p:par>
+                      </p:childTnLst>
+                    </p:cTn>
+                  </p:par>
+                  <p:par>
+                    <p:cTn id="13" fill="hold">
+                      <p:stCondLst>
+                        <p:cond delay="indefinite"/>
+                      </p:stCondLst>
+                      <p:childTnLst>
+                        <p:par>
+                          <p:cTn id="14" fill="hold">
+                            <p:stCondLst>
+                              <p:cond delay="0"/>
+                            </p:stCondLst>
+                            <p:childTnLst>
+                              <p:par>
+                                <p:cTn id="15" presetID="2" presetClass="entr" presetSubtype="4" fill="hold" nodeType="clickEffect">
+                                  <p:stCondLst>
+                                    <p:cond delay="0"/>
+                                  </p:stCondLst>
+                                  <p:childTnLst>
+                                    <p:set>
+                                      <p:cBhvr>
+                                        <p:cTn id="16" dur="1" fill="hold">
+                                          <p:stCondLst>
+                                            <p:cond delay="0"/>
+                                          </p:stCondLst>
+                                        </p:cTn>
+                                        <p:tgtEl>
+                                          <p:spTgt spid="13"/>
+                                        </p:tgtEl>
+                                        <p:attrNameLst>
+                                          <p:attrName>style.visibility</p:attrName>
+                                        </p:attrNameLst>
+                                      </p:cBhvr>
+                                      <p:to>
+                                        <p:strVal val="visible"/>
+                                      </p:to>
+                                    </p:set>
+                                    <p:anim calcmode="lin" valueType="num">
+                                      <p:cBhvr additive="base">
+                                        <p:cTn id="17" dur="500" fill="hold"/>
+                                        <p:tgtEl>
+                                          <p:spTgt spid="13"/>
+                                        </p:tgtEl>
+                                        <p:attrNameLst>
+                                          <p:attrName>ppt_x</p:attrName>
+                                        </p:attrNameLst>
+                                      </p:cBhvr>
+                                      <p:tavLst>
+                                        <p:tav tm="0">
+                                          <p:val>
+                                            <p:strVal val="#ppt_x"/>
+                                          </p:val>
+                                        </p:tav>
+                                        <p:tav tm="100000">
+                                          <p:val>
+                                            <p:strVal val="#ppt_x"/>
+                                          </p:val>
+                                        </p:tav>
+                                      </p:tavLst>
+                                    </p:anim>
+                                    <p:anim calcmode="lin" valueType="num">
+                                      <p:cBhvr additive="base">
+                                        <p:cTn id="18" dur="500" fill="hold"/>
+                                        <p:tgtEl>
+                                          <p:spTgt spid="13"/>
+                                        </p:tgtEl>
+                                        <p:attrNameLst>
+                                          <p:attrName>ppt_y</p:attrName>
+                                        </p:attrNameLst>
+                                      </p:cBhvr>
+                                      <p:tavLst>
+                                        <p:tav tm="0">
+                                          <p:val>
+                                            <p:strVal val="1+#ppt_h/2"/>
+                                          </p:val>
+                                        </p:tav>
+                                        <p:tav tm="100000">
+                                          <p:val>
+                                            <p:strVal val="#ppt_y"/>
+                                          </p:val>
+                                        </p:tav>
+                                      </p:tavLst>
+                                    </p:anim>
+                                  </p:childTnLst>
+                                </p:cTn>
+                              </p:par>
+                            </p:childTnLst>
+                          </p:cTn>
+                        </p:par>
+                      </p:childTnLst>
+                    </p:cTn>
+                  </p:par>
+                </p:childTnLst>
+              </p:cTn>
+              <p:prevCondLst>
+                <p:cond evt="onPrev" delay="0">
+                  <p:tgtEl>
+                    <p:sldTgt/>
+                  </p:tgtEl>
+                </p:cond>
+              </p:prevCondLst>
+              <p:nextCondLst>
+                <p:cond evt="onNext" delay="0">
+                  <p:tgtEl>
+                    <p:sldTgt/>
+                  </p:tgtEl>
+                </p:cond>
+              </p:nextCondLst>
+            </p:seq>
+          </p:childTnLst>
+        </p:cTn>
+      </p:par>
+    </p:tnLst>
+  </p:timing>
 </p:sld>
 </file>
 
@@ -8324,6 +10553,176 @@
   <p:clrMapOvr>
     <a:masterClrMapping/>
   </p:clrMapOvr>
+  <p:timing>
+    <p:tnLst>
+      <p:par>
+        <p:cTn id="1" dur="indefinite" restart="never" nodeType="tmRoot">
+          <p:childTnLst>
+            <p:seq concurrent="1" nextAc="seek">
+              <p:cTn id="2" dur="indefinite" nodeType="mainSeq">
+                <p:childTnLst>
+                  <p:par>
+                    <p:cTn id="3" fill="hold">
+                      <p:stCondLst>
+                        <p:cond delay="indefinite"/>
+                      </p:stCondLst>
+                      <p:childTnLst>
+                        <p:par>
+                          <p:cTn id="4" fill="hold">
+                            <p:stCondLst>
+                              <p:cond delay="0"/>
+                            </p:stCondLst>
+                            <p:childTnLst>
+                              <p:par>
+                                <p:cTn id="5" presetID="1" presetClass="entr" presetSubtype="0" fill="hold" nodeType="clickEffect">
+                                  <p:stCondLst>
+                                    <p:cond delay="0"/>
+                                  </p:stCondLst>
+                                  <p:childTnLst>
+                                    <p:set>
+                                      <p:cBhvr>
+                                        <p:cTn id="6" dur="1" fill="hold">
+                                          <p:stCondLst>
+                                            <p:cond delay="0"/>
+                                          </p:stCondLst>
+                                        </p:cTn>
+                                        <p:tgtEl>
+                                          <p:spTgt spid="9">
+                                            <p:txEl>
+                                              <p:pRg st="0" end="0"/>
+                                            </p:txEl>
+                                          </p:spTgt>
+                                        </p:tgtEl>
+                                        <p:attrNameLst>
+                                          <p:attrName>style.visibility</p:attrName>
+                                        </p:attrNameLst>
+                                      </p:cBhvr>
+                                      <p:to>
+                                        <p:strVal val="visible"/>
+                                      </p:to>
+                                    </p:set>
+                                  </p:childTnLst>
+                                </p:cTn>
+                              </p:par>
+                            </p:childTnLst>
+                          </p:cTn>
+                        </p:par>
+                      </p:childTnLst>
+                    </p:cTn>
+                  </p:par>
+                  <p:par>
+                    <p:cTn id="7" fill="hold">
+                      <p:stCondLst>
+                        <p:cond delay="indefinite"/>
+                      </p:stCondLst>
+                      <p:childTnLst>
+                        <p:par>
+                          <p:cTn id="8" fill="hold">
+                            <p:stCondLst>
+                              <p:cond delay="0"/>
+                            </p:stCondLst>
+                            <p:childTnLst>
+                              <p:par>
+                                <p:cTn id="9" presetID="2" presetClass="entr" presetSubtype="4" fill="hold" nodeType="clickEffect">
+                                  <p:stCondLst>
+                                    <p:cond delay="0"/>
+                                  </p:stCondLst>
+                                  <p:childTnLst>
+                                    <p:set>
+                                      <p:cBhvr>
+                                        <p:cTn id="10" dur="1" fill="hold">
+                                          <p:stCondLst>
+                                            <p:cond delay="0"/>
+                                          </p:stCondLst>
+                                        </p:cTn>
+                                        <p:tgtEl>
+                                          <p:spTgt spid="10"/>
+                                        </p:tgtEl>
+                                        <p:attrNameLst>
+                                          <p:attrName>style.visibility</p:attrName>
+                                        </p:attrNameLst>
+                                      </p:cBhvr>
+                                      <p:to>
+                                        <p:strVal val="visible"/>
+                                      </p:to>
+                                    </p:set>
+                                    <p:anim calcmode="lin" valueType="num">
+                                      <p:cBhvr additive="base">
+                                        <p:cTn id="11" dur="500" fill="hold"/>
+                                        <p:tgtEl>
+                                          <p:spTgt spid="10"/>
+                                        </p:tgtEl>
+                                        <p:attrNameLst>
+                                          <p:attrName>ppt_x</p:attrName>
+                                        </p:attrNameLst>
+                                      </p:cBhvr>
+                                      <p:tavLst>
+                                        <p:tav tm="0">
+                                          <p:val>
+                                            <p:strVal val="#ppt_x"/>
+                                          </p:val>
+                                        </p:tav>
+                                        <p:tav tm="100000">
+                                          <p:val>
+                                            <p:strVal val="#ppt_x"/>
+                                          </p:val>
+                                        </p:tav>
+                                      </p:tavLst>
+                                    </p:anim>
+                                    <p:anim calcmode="lin" valueType="num">
+                                      <p:cBhvr additive="base">
+                                        <p:cTn id="12" dur="500" fill="hold"/>
+                                        <p:tgtEl>
+                                          <p:spTgt spid="10"/>
+                                        </p:tgtEl>
+                                        <p:attrNameLst>
+                                          <p:attrName>ppt_y</p:attrName>
+                                        </p:attrNameLst>
+                                      </p:cBhvr>
+                                      <p:tavLst>
+                                        <p:tav tm="0">
+                                          <p:val>
+                                            <p:strVal val="1+#ppt_h/2"/>
+                                          </p:val>
+                                        </p:tav>
+                                        <p:tav tm="100000">
+                                          <p:val>
+                                            <p:strVal val="#ppt_y"/>
+                                          </p:val>
+                                        </p:tav>
+                                      </p:tavLst>
+                                    </p:anim>
+                                  </p:childTnLst>
+                                </p:cTn>
+                              </p:par>
+                            </p:childTnLst>
+                          </p:cTn>
+                        </p:par>
+                      </p:childTnLst>
+                    </p:cTn>
+                  </p:par>
+                </p:childTnLst>
+              </p:cTn>
+              <p:prevCondLst>
+                <p:cond evt="onPrev" delay="0">
+                  <p:tgtEl>
+                    <p:sldTgt/>
+                  </p:tgtEl>
+                </p:cond>
+              </p:prevCondLst>
+              <p:nextCondLst>
+                <p:cond evt="onNext" delay="0">
+                  <p:tgtEl>
+                    <p:sldTgt/>
+                  </p:tgtEl>
+                </p:cond>
+              </p:nextCondLst>
+            </p:seq>
+          </p:childTnLst>
+        </p:cTn>
+      </p:par>
+    </p:tnLst>
+  </p:timing>
 </p:sld>
 </file>
 
@@ -8577,6 +10976,184 @@
   <p:clrMapOvr>
     <a:masterClrMapping/>
   </p:clrMapOvr>
+  <p:timing>
+    <p:tnLst>
+      <p:par>
+        <p:cTn id="1" dur="indefinite" restart="never" nodeType="tmRoot">
+          <p:childTnLst>
+            <p:seq concurrent="1" nextAc="seek">
+              <p:cTn id="2" dur="indefinite" nodeType="mainSeq">
+                <p:childTnLst>
+                  <p:par>
+                    <p:cTn id="3" fill="hold">
+                      <p:stCondLst>
+                        <p:cond delay="indefinite"/>
+                      </p:stCondLst>
+                      <p:childTnLst>
+                        <p:par>
+                          <p:cTn id="4" fill="hold">
+                            <p:stCondLst>
+                              <p:cond delay="0"/>
+                            </p:stCondLst>
+                            <p:childTnLst>
+                              <p:par>
+                                <p:cTn id="5" presetID="1" presetClass="entr" presetSubtype="0" fill="hold" nodeType="clickEffect">
+                                  <p:stCondLst>
+                                    <p:cond delay="0"/>
+                                  </p:stCondLst>
+                                  <p:childTnLst>
+                                    <p:set>
+                                      <p:cBhvr>
+                                        <p:cTn id="6" dur="1" fill="hold">
+                                          <p:stCondLst>
+                                            <p:cond delay="0"/>
+                                          </p:stCondLst>
+                                        </p:cTn>
+                                        <p:tgtEl>
+                                          <p:spTgt spid="4">
+                                            <p:txEl>
+                                              <p:pRg st="0" end="0"/>
+                                            </p:txEl>
+                                          </p:spTgt>
+                                        </p:tgtEl>
+                                        <p:attrNameLst>
+                                          <p:attrName>style.visibility</p:attrName>
+                                        </p:attrNameLst>
+                                      </p:cBhvr>
+                                      <p:to>
+                                        <p:strVal val="visible"/>
+                                      </p:to>
+                                    </p:set>
+                                  </p:childTnLst>
+                                </p:cTn>
+                              </p:par>
+                            </p:childTnLst>
+                          </p:cTn>
+                        </p:par>
+                      </p:childTnLst>
+                    </p:cTn>
+                  </p:par>
+                  <p:par>
+                    <p:cTn id="7" fill="hold">
+                      <p:stCondLst>
+                        <p:cond delay="indefinite"/>
+                      </p:stCondLst>
+                      <p:childTnLst>
+                        <p:par>
+                          <p:cTn id="8" fill="hold">
+                            <p:stCondLst>
+                              <p:cond delay="0"/>
+                            </p:stCondLst>
+                            <p:childTnLst>
+                              <p:par>
+                                <p:cTn id="9" presetID="42" presetClass="entr" presetSubtype="0" fill="hold" nodeType="clickEffect">
+                                  <p:stCondLst>
+                                    <p:cond delay="0"/>
+                                  </p:stCondLst>
+                                  <p:childTnLst>
+                                    <p:set>
+                                      <p:cBhvr>
+                                        <p:cTn id="10" dur="1" fill="hold">
+                                          <p:stCondLst>
+                                            <p:cond delay="0"/>
+                                          </p:stCondLst>
+                                        </p:cTn>
+                                        <p:tgtEl>
+                                          <p:spTgt spid="6"/>
+                                        </p:tgtEl>
+                                        <p:attrNameLst>
+                                          <p:attrName>style.visibility</p:attrName>
+                                        </p:attrNameLst>
+                                      </p:cBhvr>
+                                      <p:to>
+                                        <p:strVal val="visible"/>
+                                      </p:to>
+                                    </p:set>
+                                    <p:animEffect transition="in" filter="fade">
+                                      <p:cBhvr>
+                                        <p:cTn id="11" dur="1000"/>
+                                        <p:tgtEl>
+                                          <p:spTgt spid="6"/>
+                                        </p:tgtEl>
+                                      </p:cBhvr>
+                                    </p:animEffect>
+                                    <p:anim calcmode="lin" valueType="num">
+                                      <p:cBhvr>
+                                        <p:cTn id="12" dur="1000" fill="hold"/>
+                                        <p:tgtEl>
+                                          <p:spTgt spid="6"/>
+                                        </p:tgtEl>
+                                        <p:attrNameLst>
+                                          <p:attrName>ppt_x</p:attrName>
+                                        </p:attrNameLst>
+                                      </p:cBhvr>
+                                      <p:tavLst>
+                                        <p:tav tm="0">
+                                          <p:val>
+                                            <p:strVal val="#ppt_x"/>
+                                          </p:val>
+                                        </p:tav>
+                                        <p:tav tm="100000">
+                                          <p:val>
+                                            <p:strVal val="#ppt_x"/>
+                                          </p:val>
+                                        </p:tav>
+                                      </p:tavLst>
+                                    </p:anim>
+                                    <p:anim calcmode="lin" valueType="num">
+                                      <p:cBhvr>
+                                        <p:cTn id="13" dur="1000" fill="hold"/>
+                                        <p:tgtEl>
+                                          <p:spTgt spid="6"/>
+                                        </p:tgtEl>
+                                        <p:attrNameLst>
+                                          <p:attrName>ppt_y</p:attrName>
+                                        </p:attrNameLst>
+                                      </p:cBhvr>
+                                      <p:tavLst>
+                                        <p:tav tm="0">
+                                          <p:val>
+                                            <p:strVal val="#ppt_y+.1"/>
+                                          </p:val>
+                                        </p:tav>
+                                        <p:tav tm="100000">
+                                          <p:val>
+                                            <p:strVal val="#ppt_y"/>
+                                          </p:val>
+                                        </p:tav>
+                                      </p:tavLst>
+                                    </p:anim>
+                                  </p:childTnLst>
+                                </p:cTn>
+                              </p:par>
+                            </p:childTnLst>
+                          </p:cTn>
+                        </p:par>
+                      </p:childTnLst>
+                    </p:cTn>
+                  </p:par>
+                </p:childTnLst>
+              </p:cTn>
+              <p:prevCondLst>
+                <p:cond evt="onPrev" delay="0">
+                  <p:tgtEl>
+                    <p:sldTgt/>
+                  </p:tgtEl>
+                </p:cond>
+              </p:prevCondLst>
+              <p:nextCondLst>
+                <p:cond evt="onNext" delay="0">
+                  <p:tgtEl>
+                    <p:sldTgt/>
+                  </p:tgtEl>
+                </p:cond>
+              </p:nextCondLst>
+            </p:seq>
+          </p:childTnLst>
+        </p:cTn>
+      </p:par>
+    </p:tnLst>
+  </p:timing>
 </p:sld>
 </file>
 

</xml_diff>

<commit_message>
added some additional details to the testing chapter which show some of the testing code and set up and results fixed a spelling mistake in the power point added the pictures used in the  testing section to the code snippets folder
</commit_message>
<xml_diff>
--- a/report presenatation.pptx
+++ b/report presenatation.pptx
@@ -281,7 +281,7 @@
           <a:p>
             <a:fld id="{8C28A28C-4C6A-46EA-90C0-4EE0B89CC5C7}" type="datetimeFigureOut">
               <a:rPr lang="en-US" smtClean="0"/>
-              <a:t>5/20/2022</a:t>
+              <a:t>5/21/2022</a:t>
             </a:fld>
             <a:endParaRPr lang="en-US" dirty="0"/>
           </a:p>
@@ -479,7 +479,7 @@
           <a:p>
             <a:fld id="{8C28A28C-4C6A-46EA-90C0-4EE0B89CC5C7}" type="datetimeFigureOut">
               <a:rPr lang="en-US" smtClean="0"/>
-              <a:t>5/20/2022</a:t>
+              <a:t>5/21/2022</a:t>
             </a:fld>
             <a:endParaRPr lang="en-US"/>
           </a:p>
@@ -687,7 +687,7 @@
           <a:p>
             <a:fld id="{8C28A28C-4C6A-46EA-90C0-4EE0B89CC5C7}" type="datetimeFigureOut">
               <a:rPr lang="en-US" smtClean="0"/>
-              <a:t>5/20/2022</a:t>
+              <a:t>5/21/2022</a:t>
             </a:fld>
             <a:endParaRPr lang="en-US"/>
           </a:p>
@@ -885,7 +885,7 @@
           <a:p>
             <a:fld id="{8C28A28C-4C6A-46EA-90C0-4EE0B89CC5C7}" type="datetimeFigureOut">
               <a:rPr lang="en-US" smtClean="0"/>
-              <a:t>5/20/2022</a:t>
+              <a:t>5/21/2022</a:t>
             </a:fld>
             <a:endParaRPr lang="en-US"/>
           </a:p>
@@ -1162,7 +1162,7 @@
           <a:p>
             <a:fld id="{8C28A28C-4C6A-46EA-90C0-4EE0B89CC5C7}" type="datetimeFigureOut">
               <a:rPr lang="en-US" smtClean="0"/>
-              <a:t>5/20/2022</a:t>
+              <a:t>5/21/2022</a:t>
             </a:fld>
             <a:endParaRPr lang="en-US"/>
           </a:p>
@@ -1427,7 +1427,7 @@
           <a:p>
             <a:fld id="{8C28A28C-4C6A-46EA-90C0-4EE0B89CC5C7}" type="datetimeFigureOut">
               <a:rPr lang="en-US" smtClean="0"/>
-              <a:t>5/20/2022</a:t>
+              <a:t>5/21/2022</a:t>
             </a:fld>
             <a:endParaRPr lang="en-US"/>
           </a:p>
@@ -1839,7 +1839,7 @@
           <a:p>
             <a:fld id="{8C28A28C-4C6A-46EA-90C0-4EE0B89CC5C7}" type="datetimeFigureOut">
               <a:rPr lang="en-US" smtClean="0"/>
-              <a:t>5/20/2022</a:t>
+              <a:t>5/21/2022</a:t>
             </a:fld>
             <a:endParaRPr lang="en-US"/>
           </a:p>
@@ -1980,7 +1980,7 @@
           <a:p>
             <a:fld id="{8C28A28C-4C6A-46EA-90C0-4EE0B89CC5C7}" type="datetimeFigureOut">
               <a:rPr lang="en-US" smtClean="0"/>
-              <a:t>5/20/2022</a:t>
+              <a:t>5/21/2022</a:t>
             </a:fld>
             <a:endParaRPr lang="en-US"/>
           </a:p>
@@ -2093,7 +2093,7 @@
           <a:p>
             <a:fld id="{8C28A28C-4C6A-46EA-90C0-4EE0B89CC5C7}" type="datetimeFigureOut">
               <a:rPr lang="en-US" smtClean="0"/>
-              <a:t>5/20/2022</a:t>
+              <a:t>5/21/2022</a:t>
             </a:fld>
             <a:endParaRPr lang="en-US"/>
           </a:p>
@@ -2406,7 +2406,7 @@
           <a:p>
             <a:fld id="{8C28A28C-4C6A-46EA-90C0-4EE0B89CC5C7}" type="datetimeFigureOut">
               <a:rPr lang="en-US" smtClean="0"/>
-              <a:t>5/20/2022</a:t>
+              <a:t>5/21/2022</a:t>
             </a:fld>
             <a:endParaRPr lang="en-US"/>
           </a:p>
@@ -2694,7 +2694,7 @@
           <a:p>
             <a:fld id="{8C28A28C-4C6A-46EA-90C0-4EE0B89CC5C7}" type="datetimeFigureOut">
               <a:rPr lang="en-US" smtClean="0"/>
-              <a:t>5/20/2022</a:t>
+              <a:t>5/21/2022</a:t>
             </a:fld>
             <a:endParaRPr lang="en-US"/>
           </a:p>
@@ -3049,7 +3049,7 @@
             <a:fld id="{8C28A28C-4C6A-46EA-90C0-4EE0B89CC5C7}" type="datetimeFigureOut">
               <a:rPr lang="en-US" smtClean="0"/>
               <a:pPr/>
-              <a:t>5/20/2022</a:t>
+              <a:t>5/21/2022</a:t>
             </a:fld>
             <a:endParaRPr lang="en-US" dirty="0"/>
           </a:p>
@@ -5425,7 +5425,7 @@
                 <a:ea typeface="Calibri" panose="020F0502020204030204" pitchFamily="34" charset="0"/>
                 <a:cs typeface="Arial" panose="020B0604020202020204" pitchFamily="34" charset="0"/>
               </a:rPr>
-              <a:t> from the start up to how we coded some of the main functionality like logging and singing in for the different users.</a:t>
+              <a:t> from the start up to how we coded some of the main functionality like logging and signing  in for the different users.</a:t>
             </a:r>
             <a:endParaRPr lang="en-US" sz="1800" dirty="0">
               <a:effectLst/>

</xml_diff>